<commit_message>
Added information about SDSIO interfaces.
</commit_message>
<xml_diff>
--- a/documentation/images/overview.pptx
+++ b/documentation/images/overview.pptx
@@ -273,7 +273,7 @@
           <a:p>
             <a:fld id="{008FFADC-39A7-449E-8C68-8776E6FB3C1A}" type="datetimeFigureOut">
               <a:rPr lang="en-GB" smtClean="0"/>
-              <a:t>26/05/2025</a:t>
+              <a:t>27/08/2025</a:t>
             </a:fld>
             <a:endParaRPr lang="en-GB"/>
           </a:p>
@@ -450,7 +450,7 @@
           <a:p>
             <a:fld id="{30B9BAAB-B703-4BB5-9D08-B460FC03C23A}" type="datetimeFigureOut">
               <a:rPr lang="en-GB" smtClean="0"/>
-              <a:t>26/05/2025</a:t>
+              <a:t>27/08/2025</a:t>
             </a:fld>
             <a:endParaRPr lang="en-GB"/>
           </a:p>
@@ -29240,24 +29240,14 @@
               </a:spcAft>
             </a:pPr>
             <a:r>
-              <a:rPr lang="en-US" sz="1200" dirty="0" err="1">
+              <a:rPr lang="en-US" sz="1200" dirty="0">
                 <a:solidFill>
                   <a:srgbClr val="FFFFFF"/>
                 </a:solidFill>
                 <a:latin typeface="Aeonik" panose="020B0503030300000000" pitchFamily="34" charset="0"/>
                 <a:cs typeface="Calibri" panose="020F0502020204030204" pitchFamily="34" charset="0"/>
               </a:rPr>
-              <a:t>Semihosting</a:t>
-            </a:r>
-            <a:r>
-              <a:rPr lang="en-US" sz="1200" dirty="0">
-                <a:solidFill>
-                  <a:srgbClr val="FFFFFF"/>
-                </a:solidFill>
-                <a:latin typeface="Aeonik" panose="020B0503030300000000" pitchFamily="34" charset="0"/>
-                <a:cs typeface="Calibri" panose="020F0502020204030204" pitchFamily="34" charset="0"/>
-              </a:rPr>
-              <a:t> Interface</a:t>
+              <a:t>SDSIO Server</a:t>
             </a:r>
           </a:p>
         </p:txBody>

</xml_diff>

<commit_message>
Update docu, project structure, image templates
</commit_message>
<xml_diff>
--- a/documentation/images/overview.pptx
+++ b/documentation/images/overview.pptx
@@ -5,10 +5,10 @@
     <p:sldMasterId id="2147483661" r:id="rId1"/>
   </p:sldMasterIdLst>
   <p:notesMasterIdLst>
-    <p:notesMasterId r:id="rId17"/>
+    <p:notesMasterId r:id="rId18"/>
   </p:notesMasterIdLst>
   <p:handoutMasterIdLst>
-    <p:handoutMasterId r:id="rId18"/>
+    <p:handoutMasterId r:id="rId19"/>
   </p:handoutMasterIdLst>
   <p:sldIdLst>
     <p:sldId id="2147476961" r:id="rId2"/>
@@ -17,15 +17,16 @@
     <p:sldId id="2147476965" r:id="rId5"/>
     <p:sldId id="2147479520" r:id="rId6"/>
     <p:sldId id="2147476966" r:id="rId7"/>
-    <p:sldId id="2145705724" r:id="rId8"/>
-    <p:sldId id="2147476963" r:id="rId9"/>
-    <p:sldId id="2147476964" r:id="rId10"/>
-    <p:sldId id="2147479521" r:id="rId11"/>
-    <p:sldId id="2145705746" r:id="rId12"/>
-    <p:sldId id="2145705721" r:id="rId13"/>
-    <p:sldId id="2145705723" r:id="rId14"/>
-    <p:sldId id="2123260229" r:id="rId15"/>
-    <p:sldId id="2147476967" r:id="rId16"/>
+    <p:sldId id="2147479522" r:id="rId8"/>
+    <p:sldId id="2145705724" r:id="rId9"/>
+    <p:sldId id="2147476963" r:id="rId10"/>
+    <p:sldId id="2147476964" r:id="rId11"/>
+    <p:sldId id="2147479521" r:id="rId12"/>
+    <p:sldId id="2145705746" r:id="rId13"/>
+    <p:sldId id="2145705721" r:id="rId14"/>
+    <p:sldId id="2145705723" r:id="rId15"/>
+    <p:sldId id="2123260229" r:id="rId16"/>
+    <p:sldId id="2147476967" r:id="rId17"/>
   </p:sldIdLst>
   <p:sldSz cx="12192000" cy="6858000"/>
   <p:notesSz cx="6858000" cy="9144000"/>
@@ -273,7 +274,7 @@
           <a:p>
             <a:fld id="{008FFADC-39A7-449E-8C68-8776E6FB3C1A}" type="datetimeFigureOut">
               <a:rPr lang="en-GB" smtClean="0"/>
-              <a:t>27/08/2025</a:t>
+              <a:t>23/02/2026</a:t>
             </a:fld>
             <a:endParaRPr lang="en-GB"/>
           </a:p>
@@ -450,7 +451,7 @@
           <a:p>
             <a:fld id="{30B9BAAB-B703-4BB5-9D08-B460FC03C23A}" type="datetimeFigureOut">
               <a:rPr lang="en-GB" smtClean="0"/>
-              <a:t>27/08/2025</a:t>
+              <a:t>23/02/2026</a:t>
             </a:fld>
             <a:endParaRPr lang="en-GB"/>
           </a:p>
@@ -2234,7 +2235,7 @@
                 <a:tabLst/>
                 <a:defRPr/>
               </a:pPr>
-              <a:t>10</a:t>
+              <a:t>11</a:t>
             </a:fld>
             <a:endParaRPr kumimoji="0" lang="en-US" altLang="en-US" sz="1200" b="0" i="0" u="none" strike="noStrike" kern="1200" cap="none" spc="0" normalizeH="0" baseline="0" noProof="0">
               <a:ln>
@@ -2337,7 +2338,7 @@
               <a:pPr>
                 <a:defRPr/>
               </a:pPr>
-              <a:t>11</a:t>
+              <a:t>12</a:t>
             </a:fld>
             <a:endParaRPr lang="en-US" altLang="en-US"/>
           </a:p>
@@ -2427,7 +2428,7 @@
               <a:pPr>
                 <a:defRPr/>
               </a:pPr>
-              <a:t>12</a:t>
+              <a:t>13</a:t>
             </a:fld>
             <a:endParaRPr lang="en-US" altLang="en-US"/>
           </a:p>
@@ -11188,6 +11189,893 @@
   <p:cSld>
     <p:spTree>
       <p:nvGrpSpPr>
+        <p:cNvPr id="1" name=""/>
+        <p:cNvGrpSpPr/>
+        <p:nvPr/>
+      </p:nvGrpSpPr>
+      <p:grpSpPr>
+        <a:xfrm>
+          <a:off x="0" y="0"/>
+          <a:ext cx="0" cy="0"/>
+          <a:chOff x="0" y="0"/>
+          <a:chExt cx="0" cy="0"/>
+        </a:xfrm>
+      </p:grpSpPr>
+      <p:sp>
+        <p:nvSpPr>
+          <p:cNvPr id="2" name="Title 1">
+            <a:extLst>
+              <a:ext uri="{FF2B5EF4-FFF2-40B4-BE49-F238E27FC236}">
+                <a16:creationId xmlns:a16="http://schemas.microsoft.com/office/drawing/2014/main" id="{BFBCA5D4-C7CF-56B7-4D26-1D3745C85A28}"/>
+              </a:ext>
+            </a:extLst>
+          </p:cNvPr>
+          <p:cNvSpPr>
+            <a:spLocks noGrp="1"/>
+          </p:cNvSpPr>
+          <p:nvPr>
+            <p:ph type="title"/>
+          </p:nvPr>
+        </p:nvSpPr>
+        <p:spPr/>
+        <p:txBody>
+          <a:bodyPr/>
+          <a:lstStyle/>
+          <a:p>
+            <a:r>
+              <a:rPr lang="en-US"/>
+              <a:t>SDS Recorder </a:t>
+            </a:r>
+            <a:r>
+              <a:rPr lang="en-US">
+                <a:hlinkClick r:id="rId2"/>
+              </a:rPr>
+              <a:t>https://github.com/Arm-Examples/sds-examples</a:t>
+            </a:r>
+            <a:br>
+              <a:rPr lang="en-US"/>
+            </a:br>
+            <a:endParaRPr lang="en-US"/>
+          </a:p>
+        </p:txBody>
+      </p:sp>
+      <p:sp>
+        <p:nvSpPr>
+          <p:cNvPr id="4" name="Rectangle 3">
+            <a:extLst>
+              <a:ext uri="{FF2B5EF4-FFF2-40B4-BE49-F238E27FC236}">
+                <a16:creationId xmlns:a16="http://schemas.microsoft.com/office/drawing/2014/main" id="{268F30E4-EF9A-1A51-E8F1-2E8F1385FA61}"/>
+              </a:ext>
+            </a:extLst>
+          </p:cNvPr>
+          <p:cNvSpPr/>
+          <p:nvPr/>
+        </p:nvSpPr>
+        <p:spPr>
+          <a:xfrm>
+            <a:off x="627993" y="1411454"/>
+            <a:ext cx="4452085" cy="653684"/>
+          </a:xfrm>
+          <a:prstGeom prst="rect">
+            <a:avLst/>
+          </a:prstGeom>
+          <a:solidFill>
+            <a:schemeClr val="accent6">
+              <a:lumMod val="75000"/>
+            </a:schemeClr>
+          </a:solidFill>
+          <a:ln>
+            <a:noFill/>
+          </a:ln>
+        </p:spPr>
+        <p:style>
+          <a:lnRef idx="2">
+            <a:schemeClr val="accent1">
+              <a:shade val="50000"/>
+            </a:schemeClr>
+          </a:lnRef>
+          <a:fillRef idx="1">
+            <a:schemeClr val="accent1"/>
+          </a:fillRef>
+          <a:effectRef idx="0">
+            <a:schemeClr val="accent1"/>
+          </a:effectRef>
+          <a:fontRef idx="minor">
+            <a:schemeClr val="lt1"/>
+          </a:fontRef>
+        </p:style>
+        <p:txBody>
+          <a:bodyPr rtlCol="0" anchor="ctr"/>
+          <a:lstStyle/>
+          <a:p>
+            <a:pPr algn="ctr"/>
+            <a:r>
+              <a:rPr lang="en-US" sz="1600" b="1" dirty="0" err="1"/>
+              <a:t>SDS.csolution.yml</a:t>
+            </a:r>
+            <a:br>
+              <a:rPr lang="en-US" sz="1400" dirty="0"/>
+            </a:br>
+            <a:r>
+              <a:rPr lang="en-US" sz="1400" dirty="0"/>
+              <a:t>Data streaming test framework for DSP and </a:t>
+            </a:r>
+            <a:r>
+              <a:rPr lang="en-US" sz="1400"/>
+              <a:t>ML algorithms</a:t>
+            </a:r>
+            <a:endParaRPr lang="en-US" sz="1100" dirty="0"/>
+          </a:p>
+        </p:txBody>
+      </p:sp>
+      <p:sp>
+        <p:nvSpPr>
+          <p:cNvPr id="8" name="Rectangle 7">
+            <a:extLst>
+              <a:ext uri="{FF2B5EF4-FFF2-40B4-BE49-F238E27FC236}">
+                <a16:creationId xmlns:a16="http://schemas.microsoft.com/office/drawing/2014/main" id="{CE3974E6-B40A-AB0A-DFDB-B964F9612AEA}"/>
+              </a:ext>
+            </a:extLst>
+          </p:cNvPr>
+          <p:cNvSpPr/>
+          <p:nvPr/>
+        </p:nvSpPr>
+        <p:spPr>
+          <a:xfrm>
+            <a:off x="2942715" y="3519273"/>
+            <a:ext cx="2128632" cy="653684"/>
+          </a:xfrm>
+          <a:prstGeom prst="rect">
+            <a:avLst/>
+          </a:prstGeom>
+          <a:solidFill>
+            <a:schemeClr val="accent1"/>
+          </a:solidFill>
+          <a:ln>
+            <a:noFill/>
+          </a:ln>
+        </p:spPr>
+        <p:style>
+          <a:lnRef idx="2">
+            <a:schemeClr val="accent1">
+              <a:shade val="50000"/>
+            </a:schemeClr>
+          </a:lnRef>
+          <a:fillRef idx="1">
+            <a:schemeClr val="accent1"/>
+          </a:fillRef>
+          <a:effectRef idx="0">
+            <a:schemeClr val="accent1"/>
+          </a:effectRef>
+          <a:fontRef idx="minor">
+            <a:schemeClr val="lt1"/>
+          </a:fontRef>
+        </p:style>
+        <p:txBody>
+          <a:bodyPr rtlCol="0" anchor="ctr"/>
+          <a:lstStyle/>
+          <a:p>
+            <a:pPr algn="ctr"/>
+            <a:r>
+              <a:rPr lang="en-US" sz="1100" dirty="0"/>
+              <a:t>Record/Playback </a:t>
+            </a:r>
+            <a:br>
+              <a:rPr lang="en-US" sz="1100" dirty="0"/>
+            </a:br>
+            <a:r>
+              <a:rPr lang="en-US" sz="1100" dirty="0"/>
+              <a:t>SDS Data Files via</a:t>
+            </a:r>
+            <a:br>
+              <a:rPr lang="en-US" sz="1100" dirty="0"/>
+            </a:br>
+            <a:r>
+              <a:rPr lang="en-US" sz="1100" dirty="0"/>
+              <a:t>Network, USB, File System</a:t>
+            </a:r>
+            <a:endParaRPr lang="en-US" sz="1050" dirty="0"/>
+          </a:p>
+        </p:txBody>
+      </p:sp>
+      <p:sp>
+        <p:nvSpPr>
+          <p:cNvPr id="10" name="Rectangle 9">
+            <a:extLst>
+              <a:ext uri="{FF2B5EF4-FFF2-40B4-BE49-F238E27FC236}">
+                <a16:creationId xmlns:a16="http://schemas.microsoft.com/office/drawing/2014/main" id="{CEE742C1-9B27-441A-6C29-20D13149B32F}"/>
+              </a:ext>
+            </a:extLst>
+          </p:cNvPr>
+          <p:cNvSpPr/>
+          <p:nvPr/>
+        </p:nvSpPr>
+        <p:spPr>
+          <a:xfrm>
+            <a:off x="2942715" y="3255090"/>
+            <a:ext cx="2128632" cy="264183"/>
+          </a:xfrm>
+          <a:prstGeom prst="rect">
+            <a:avLst/>
+          </a:prstGeom>
+          <a:solidFill>
+            <a:schemeClr val="accent1">
+              <a:lumMod val="75000"/>
+            </a:schemeClr>
+          </a:solidFill>
+          <a:ln>
+            <a:noFill/>
+          </a:ln>
+        </p:spPr>
+        <p:style>
+          <a:lnRef idx="2">
+            <a:schemeClr val="accent1">
+              <a:shade val="50000"/>
+            </a:schemeClr>
+          </a:lnRef>
+          <a:fillRef idx="1">
+            <a:schemeClr val="accent1"/>
+          </a:fillRef>
+          <a:effectRef idx="0">
+            <a:schemeClr val="accent1"/>
+          </a:effectRef>
+          <a:fontRef idx="minor">
+            <a:schemeClr val="lt1"/>
+          </a:fontRef>
+        </p:style>
+        <p:txBody>
+          <a:bodyPr rtlCol="0" anchor="ctr"/>
+          <a:lstStyle/>
+          <a:p>
+            <a:pPr algn="ctr"/>
+            <a:r>
+              <a:rPr lang="en-US" sz="1400" dirty="0"/>
+              <a:t> Layer Type: SDSIO</a:t>
+            </a:r>
+          </a:p>
+        </p:txBody>
+      </p:sp>
+      <p:sp>
+        <p:nvSpPr>
+          <p:cNvPr id="16" name="Rectangle 15">
+            <a:extLst>
+              <a:ext uri="{FF2B5EF4-FFF2-40B4-BE49-F238E27FC236}">
+                <a16:creationId xmlns:a16="http://schemas.microsoft.com/office/drawing/2014/main" id="{8C61B6A3-A1BE-4248-57B1-609E5F0E8AAB}"/>
+              </a:ext>
+            </a:extLst>
+          </p:cNvPr>
+          <p:cNvSpPr/>
+          <p:nvPr/>
+        </p:nvSpPr>
+        <p:spPr>
+          <a:xfrm>
+            <a:off x="627994" y="3519273"/>
+            <a:ext cx="2128632" cy="653684"/>
+          </a:xfrm>
+          <a:prstGeom prst="rect">
+            <a:avLst/>
+          </a:prstGeom>
+          <a:solidFill>
+            <a:schemeClr val="accent1"/>
+          </a:solidFill>
+          <a:ln>
+            <a:noFill/>
+          </a:ln>
+        </p:spPr>
+        <p:style>
+          <a:lnRef idx="2">
+            <a:schemeClr val="accent1">
+              <a:shade val="50000"/>
+            </a:schemeClr>
+          </a:lnRef>
+          <a:fillRef idx="1">
+            <a:schemeClr val="accent1"/>
+          </a:fillRef>
+          <a:effectRef idx="0">
+            <a:schemeClr val="accent1"/>
+          </a:effectRef>
+          <a:fontRef idx="minor">
+            <a:schemeClr val="lt1"/>
+          </a:fontRef>
+        </p:style>
+        <p:txBody>
+          <a:bodyPr rtlCol="0" anchor="ctr"/>
+          <a:lstStyle/>
+          <a:p>
+            <a:pPr algn="ctr"/>
+            <a:r>
+              <a:rPr lang="en-US" sz="1100" dirty="0"/>
+              <a:t>Board Hardware Interface</a:t>
+            </a:r>
+            <a:br>
+              <a:rPr lang="en-US" sz="1100" dirty="0"/>
+            </a:br>
+            <a:r>
+              <a:rPr lang="en-US" sz="1100" dirty="0"/>
+              <a:t>Provided in BSP</a:t>
+            </a:r>
+            <a:endParaRPr lang="en-US" sz="1050" dirty="0"/>
+          </a:p>
+        </p:txBody>
+      </p:sp>
+      <p:sp>
+        <p:nvSpPr>
+          <p:cNvPr id="17" name="Rectangle 16">
+            <a:extLst>
+              <a:ext uri="{FF2B5EF4-FFF2-40B4-BE49-F238E27FC236}">
+                <a16:creationId xmlns:a16="http://schemas.microsoft.com/office/drawing/2014/main" id="{4DB6B1BC-4815-896E-9392-B226B5A4C231}"/>
+              </a:ext>
+            </a:extLst>
+          </p:cNvPr>
+          <p:cNvSpPr/>
+          <p:nvPr/>
+        </p:nvSpPr>
+        <p:spPr>
+          <a:xfrm>
+            <a:off x="627994" y="3255090"/>
+            <a:ext cx="2128632" cy="264183"/>
+          </a:xfrm>
+          <a:prstGeom prst="rect">
+            <a:avLst/>
+          </a:prstGeom>
+          <a:solidFill>
+            <a:schemeClr val="accent1">
+              <a:lumMod val="75000"/>
+            </a:schemeClr>
+          </a:solidFill>
+          <a:ln>
+            <a:noFill/>
+          </a:ln>
+        </p:spPr>
+        <p:style>
+          <a:lnRef idx="2">
+            <a:schemeClr val="accent1">
+              <a:shade val="50000"/>
+            </a:schemeClr>
+          </a:lnRef>
+          <a:fillRef idx="1">
+            <a:schemeClr val="accent1"/>
+          </a:fillRef>
+          <a:effectRef idx="0">
+            <a:schemeClr val="accent1"/>
+          </a:effectRef>
+          <a:fontRef idx="minor">
+            <a:schemeClr val="lt1"/>
+          </a:fontRef>
+        </p:style>
+        <p:txBody>
+          <a:bodyPr rtlCol="0" anchor="ctr"/>
+          <a:lstStyle/>
+          <a:p>
+            <a:pPr algn="ctr"/>
+            <a:r>
+              <a:rPr lang="en-US" sz="1400" dirty="0"/>
+              <a:t> Layer Type: Board</a:t>
+            </a:r>
+          </a:p>
+        </p:txBody>
+      </p:sp>
+      <p:sp>
+        <p:nvSpPr>
+          <p:cNvPr id="3" name="Rectangle 2">
+            <a:extLst>
+              <a:ext uri="{FF2B5EF4-FFF2-40B4-BE49-F238E27FC236}">
+                <a16:creationId xmlns:a16="http://schemas.microsoft.com/office/drawing/2014/main" id="{981466B6-29ED-CB94-AF4F-BC970DB65D25}"/>
+              </a:ext>
+            </a:extLst>
+          </p:cNvPr>
+          <p:cNvSpPr/>
+          <p:nvPr/>
+        </p:nvSpPr>
+        <p:spPr>
+          <a:xfrm>
+            <a:off x="627994" y="2460256"/>
+            <a:ext cx="2128632" cy="653684"/>
+          </a:xfrm>
+          <a:prstGeom prst="rect">
+            <a:avLst/>
+          </a:prstGeom>
+          <a:solidFill>
+            <a:schemeClr val="accent4">
+              <a:lumMod val="75000"/>
+            </a:schemeClr>
+          </a:solidFill>
+          <a:ln>
+            <a:noFill/>
+          </a:ln>
+        </p:spPr>
+        <p:style>
+          <a:lnRef idx="2">
+            <a:schemeClr val="accent1">
+              <a:shade val="50000"/>
+            </a:schemeClr>
+          </a:lnRef>
+          <a:fillRef idx="1">
+            <a:schemeClr val="accent1"/>
+          </a:fillRef>
+          <a:effectRef idx="0">
+            <a:schemeClr val="accent1"/>
+          </a:effectRef>
+          <a:fontRef idx="minor">
+            <a:schemeClr val="lt1"/>
+          </a:fontRef>
+        </p:style>
+        <p:txBody>
+          <a:bodyPr rtlCol="0" anchor="ctr"/>
+          <a:lstStyle/>
+          <a:p>
+            <a:pPr algn="ctr"/>
+            <a:r>
+              <a:rPr lang="en-US" sz="1100" dirty="0"/>
+              <a:t>Check SDSIO interface with</a:t>
+            </a:r>
+            <a:br>
+              <a:rPr lang="en-US" sz="1100" dirty="0"/>
+            </a:br>
+            <a:r>
+              <a:rPr lang="en-US" sz="1100" dirty="0"/>
+              <a:t>user configurable bandwidth parameters</a:t>
+            </a:r>
+            <a:endParaRPr lang="en-US" sz="1050" dirty="0"/>
+          </a:p>
+        </p:txBody>
+      </p:sp>
+      <p:sp>
+        <p:nvSpPr>
+          <p:cNvPr id="5" name="Rectangle 4">
+            <a:extLst>
+              <a:ext uri="{FF2B5EF4-FFF2-40B4-BE49-F238E27FC236}">
+                <a16:creationId xmlns:a16="http://schemas.microsoft.com/office/drawing/2014/main" id="{006CFF1E-7F8E-879E-76E9-6194FE53B86C}"/>
+              </a:ext>
+            </a:extLst>
+          </p:cNvPr>
+          <p:cNvSpPr/>
+          <p:nvPr/>
+        </p:nvSpPr>
+        <p:spPr>
+          <a:xfrm>
+            <a:off x="627994" y="2196073"/>
+            <a:ext cx="2128632" cy="264183"/>
+          </a:xfrm>
+          <a:prstGeom prst="rect">
+            <a:avLst/>
+          </a:prstGeom>
+          <a:solidFill>
+            <a:schemeClr val="accent4">
+              <a:lumMod val="50000"/>
+            </a:schemeClr>
+          </a:solidFill>
+          <a:ln>
+            <a:noFill/>
+          </a:ln>
+        </p:spPr>
+        <p:style>
+          <a:lnRef idx="2">
+            <a:schemeClr val="accent1">
+              <a:shade val="50000"/>
+            </a:schemeClr>
+          </a:lnRef>
+          <a:fillRef idx="1">
+            <a:schemeClr val="accent1"/>
+          </a:fillRef>
+          <a:effectRef idx="0">
+            <a:schemeClr val="accent1"/>
+          </a:effectRef>
+          <a:fontRef idx="minor">
+            <a:schemeClr val="lt1"/>
+          </a:fontRef>
+        </p:style>
+        <p:txBody>
+          <a:bodyPr rtlCol="0" anchor="ctr"/>
+          <a:lstStyle/>
+          <a:p>
+            <a:pPr algn="ctr"/>
+            <a:r>
+              <a:rPr lang="en-US" sz="1400" dirty="0" err="1"/>
+              <a:t>DataTest.cproject.yml</a:t>
+            </a:r>
+            <a:endParaRPr lang="en-US" sz="1400" dirty="0"/>
+          </a:p>
+        </p:txBody>
+      </p:sp>
+      <p:sp>
+        <p:nvSpPr>
+          <p:cNvPr id="6" name="Rectangle 5">
+            <a:extLst>
+              <a:ext uri="{FF2B5EF4-FFF2-40B4-BE49-F238E27FC236}">
+                <a16:creationId xmlns:a16="http://schemas.microsoft.com/office/drawing/2014/main" id="{E094A49A-EC2D-EEEF-132A-B6D2A8111BED}"/>
+              </a:ext>
+            </a:extLst>
+          </p:cNvPr>
+          <p:cNvSpPr/>
+          <p:nvPr/>
+        </p:nvSpPr>
+        <p:spPr>
+          <a:xfrm>
+            <a:off x="2942715" y="2460256"/>
+            <a:ext cx="2128632" cy="653684"/>
+          </a:xfrm>
+          <a:prstGeom prst="rect">
+            <a:avLst/>
+          </a:prstGeom>
+          <a:solidFill>
+            <a:schemeClr val="accent4">
+              <a:lumMod val="75000"/>
+            </a:schemeClr>
+          </a:solidFill>
+          <a:ln>
+            <a:noFill/>
+          </a:ln>
+        </p:spPr>
+        <p:style>
+          <a:lnRef idx="2">
+            <a:schemeClr val="accent1">
+              <a:shade val="50000"/>
+            </a:schemeClr>
+          </a:lnRef>
+          <a:fillRef idx="1">
+            <a:schemeClr val="accent1"/>
+          </a:fillRef>
+          <a:effectRef idx="0">
+            <a:schemeClr val="accent1"/>
+          </a:effectRef>
+          <a:fontRef idx="minor">
+            <a:schemeClr val="lt1"/>
+          </a:fontRef>
+        </p:style>
+        <p:txBody>
+          <a:bodyPr rtlCol="0" anchor="ctr"/>
+          <a:lstStyle/>
+          <a:p>
+            <a:pPr algn="ctr"/>
+            <a:r>
+              <a:rPr lang="en-US" sz="1100" dirty="0"/>
+              <a:t>Verify and optimized</a:t>
+            </a:r>
+            <a:br>
+              <a:rPr lang="en-US" sz="1100" dirty="0"/>
+            </a:br>
+            <a:r>
+              <a:rPr lang="en-US" sz="1100" dirty="0"/>
+              <a:t>user algorithms</a:t>
+            </a:r>
+            <a:br>
+              <a:rPr lang="en-US" sz="1100" dirty="0"/>
+            </a:br>
+            <a:r>
+              <a:rPr lang="en-US" sz="1100" dirty="0"/>
+              <a:t>with repeatable data</a:t>
+            </a:r>
+            <a:endParaRPr lang="en-US" sz="1050" dirty="0"/>
+          </a:p>
+        </p:txBody>
+      </p:sp>
+      <p:sp>
+        <p:nvSpPr>
+          <p:cNvPr id="7" name="Rectangle 6">
+            <a:extLst>
+              <a:ext uri="{FF2B5EF4-FFF2-40B4-BE49-F238E27FC236}">
+                <a16:creationId xmlns:a16="http://schemas.microsoft.com/office/drawing/2014/main" id="{02192468-F815-85E7-1987-BD05F8475585}"/>
+              </a:ext>
+            </a:extLst>
+          </p:cNvPr>
+          <p:cNvSpPr/>
+          <p:nvPr/>
+        </p:nvSpPr>
+        <p:spPr>
+          <a:xfrm>
+            <a:off x="2942715" y="2196073"/>
+            <a:ext cx="2128632" cy="264183"/>
+          </a:xfrm>
+          <a:prstGeom prst="rect">
+            <a:avLst/>
+          </a:prstGeom>
+          <a:solidFill>
+            <a:schemeClr val="accent4">
+              <a:lumMod val="50000"/>
+            </a:schemeClr>
+          </a:solidFill>
+          <a:ln>
+            <a:noFill/>
+          </a:ln>
+        </p:spPr>
+        <p:style>
+          <a:lnRef idx="2">
+            <a:schemeClr val="accent1">
+              <a:shade val="50000"/>
+            </a:schemeClr>
+          </a:lnRef>
+          <a:fillRef idx="1">
+            <a:schemeClr val="accent1"/>
+          </a:fillRef>
+          <a:effectRef idx="0">
+            <a:schemeClr val="accent1"/>
+          </a:effectRef>
+          <a:fontRef idx="minor">
+            <a:schemeClr val="lt1"/>
+          </a:fontRef>
+        </p:style>
+        <p:txBody>
+          <a:bodyPr rtlCol="0" anchor="ctr"/>
+          <a:lstStyle/>
+          <a:p>
+            <a:pPr algn="ctr"/>
+            <a:r>
+              <a:rPr lang="en-US" sz="1400" dirty="0" err="1"/>
+              <a:t>AlgorithmTest.cproject.yml</a:t>
+            </a:r>
+            <a:endParaRPr lang="en-US" sz="1400" dirty="0"/>
+          </a:p>
+        </p:txBody>
+      </p:sp>
+      <p:sp>
+        <p:nvSpPr>
+          <p:cNvPr id="20" name="Callout: Bent Line with Accent Bar 19">
+            <a:extLst>
+              <a:ext uri="{FF2B5EF4-FFF2-40B4-BE49-F238E27FC236}">
+                <a16:creationId xmlns:a16="http://schemas.microsoft.com/office/drawing/2014/main" id="{D1617B0D-C16A-73DF-D7EA-A87528EA450C}"/>
+              </a:ext>
+            </a:extLst>
+          </p:cNvPr>
+          <p:cNvSpPr/>
+          <p:nvPr/>
+        </p:nvSpPr>
+        <p:spPr>
+          <a:xfrm>
+            <a:off x="5492884" y="1431972"/>
+            <a:ext cx="1498060" cy="612648"/>
+          </a:xfrm>
+          <a:prstGeom prst="accentCallout2">
+            <a:avLst>
+              <a:gd name="adj1" fmla="val 18750"/>
+              <a:gd name="adj2" fmla="val -8333"/>
+              <a:gd name="adj3" fmla="val 18750"/>
+              <a:gd name="adj4" fmla="val -16667"/>
+              <a:gd name="adj5" fmla="val 60632"/>
+              <a:gd name="adj6" fmla="val -32482"/>
+            </a:avLst>
+          </a:prstGeom>
+          <a:noFill/>
+          <a:ln>
+            <a:solidFill>
+              <a:srgbClr val="C00000"/>
+            </a:solidFill>
+          </a:ln>
+        </p:spPr>
+        <p:style>
+          <a:lnRef idx="2">
+            <a:schemeClr val="accent1">
+              <a:shade val="50000"/>
+            </a:schemeClr>
+          </a:lnRef>
+          <a:fillRef idx="1">
+            <a:schemeClr val="accent1"/>
+          </a:fillRef>
+          <a:effectRef idx="0">
+            <a:schemeClr val="accent1"/>
+          </a:effectRef>
+          <a:fontRef idx="minor">
+            <a:schemeClr val="lt1"/>
+          </a:fontRef>
+        </p:style>
+        <p:txBody>
+          <a:bodyPr lIns="0" tIns="0" rIns="0" bIns="0" rtlCol="0" anchor="t"/>
+          <a:lstStyle/>
+          <a:p>
+            <a:r>
+              <a:rPr lang="en-US" sz="1200" dirty="0">
+                <a:solidFill>
+                  <a:schemeClr val="tx1"/>
+                </a:solidFill>
+              </a:rPr>
+              <a:t>target-types select between hardware</a:t>
+            </a:r>
+          </a:p>
+          <a:p>
+            <a:r>
+              <a:rPr lang="en-US" sz="1200" dirty="0">
+                <a:solidFill>
+                  <a:schemeClr val="tx1"/>
+                </a:solidFill>
+              </a:rPr>
+              <a:t>and simulation </a:t>
+            </a:r>
+          </a:p>
+        </p:txBody>
+      </p:sp>
+      <p:sp>
+        <p:nvSpPr>
+          <p:cNvPr id="21" name="Callout: Bent Line with Accent Bar 20">
+            <a:extLst>
+              <a:ext uri="{FF2B5EF4-FFF2-40B4-BE49-F238E27FC236}">
+                <a16:creationId xmlns:a16="http://schemas.microsoft.com/office/drawing/2014/main" id="{DCAC335D-914C-08BE-625E-F7D62ED092E1}"/>
+              </a:ext>
+            </a:extLst>
+          </p:cNvPr>
+          <p:cNvSpPr/>
+          <p:nvPr/>
+        </p:nvSpPr>
+        <p:spPr>
+          <a:xfrm>
+            <a:off x="5492884" y="2343531"/>
+            <a:ext cx="1498060" cy="612648"/>
+          </a:xfrm>
+          <a:prstGeom prst="accentCallout2">
+            <a:avLst>
+              <a:gd name="adj1" fmla="val 18750"/>
+              <a:gd name="adj2" fmla="val -8333"/>
+              <a:gd name="adj3" fmla="val 18750"/>
+              <a:gd name="adj4" fmla="val -16667"/>
+              <a:gd name="adj5" fmla="val 60632"/>
+              <a:gd name="adj6" fmla="val -32482"/>
+            </a:avLst>
+          </a:prstGeom>
+          <a:noFill/>
+          <a:ln>
+            <a:solidFill>
+              <a:srgbClr val="C00000"/>
+            </a:solidFill>
+          </a:ln>
+        </p:spPr>
+        <p:style>
+          <a:lnRef idx="2">
+            <a:schemeClr val="accent1">
+              <a:shade val="50000"/>
+            </a:schemeClr>
+          </a:lnRef>
+          <a:fillRef idx="1">
+            <a:schemeClr val="accent1"/>
+          </a:fillRef>
+          <a:effectRef idx="0">
+            <a:schemeClr val="accent1"/>
+          </a:effectRef>
+          <a:fontRef idx="minor">
+            <a:schemeClr val="lt1"/>
+          </a:fontRef>
+        </p:style>
+        <p:txBody>
+          <a:bodyPr lIns="0" tIns="0" rIns="0" bIns="0" rtlCol="0" anchor="t"/>
+          <a:lstStyle/>
+          <a:p>
+            <a:r>
+              <a:rPr lang="en-US" sz="1200" dirty="0">
+                <a:solidFill>
+                  <a:schemeClr val="tx1"/>
+                </a:solidFill>
+              </a:rPr>
+              <a:t>Add user algorithm</a:t>
+            </a:r>
+            <a:br>
+              <a:rPr lang="en-US" sz="1200" dirty="0">
+                <a:solidFill>
+                  <a:schemeClr val="tx1"/>
+                </a:solidFill>
+              </a:rPr>
+            </a:br>
+            <a:r>
+              <a:rPr lang="en-US" sz="1200" dirty="0">
+                <a:solidFill>
+                  <a:schemeClr val="tx1"/>
+                </a:solidFill>
+              </a:rPr>
+              <a:t>and data stream</a:t>
+            </a:r>
+            <a:br>
+              <a:rPr lang="en-US" sz="1200" dirty="0">
+                <a:solidFill>
+                  <a:schemeClr val="tx1"/>
+                </a:solidFill>
+              </a:rPr>
+            </a:br>
+            <a:r>
+              <a:rPr lang="en-US" sz="1200" dirty="0">
+                <a:solidFill>
+                  <a:schemeClr val="tx1"/>
+                </a:solidFill>
+              </a:rPr>
+              <a:t>input interface</a:t>
+            </a:r>
+          </a:p>
+        </p:txBody>
+      </p:sp>
+      <p:sp>
+        <p:nvSpPr>
+          <p:cNvPr id="22" name="Callout: Bent Line with Accent Bar 21">
+            <a:extLst>
+              <a:ext uri="{FF2B5EF4-FFF2-40B4-BE49-F238E27FC236}">
+                <a16:creationId xmlns:a16="http://schemas.microsoft.com/office/drawing/2014/main" id="{688DADD3-DBC8-96B6-7CE2-9CCEB7866880}"/>
+              </a:ext>
+            </a:extLst>
+          </p:cNvPr>
+          <p:cNvSpPr/>
+          <p:nvPr/>
+        </p:nvSpPr>
+        <p:spPr>
+          <a:xfrm>
+            <a:off x="5492884" y="3419606"/>
+            <a:ext cx="1498060" cy="612648"/>
+          </a:xfrm>
+          <a:prstGeom prst="accentCallout2">
+            <a:avLst>
+              <a:gd name="adj1" fmla="val 18750"/>
+              <a:gd name="adj2" fmla="val -8333"/>
+              <a:gd name="adj3" fmla="val 18750"/>
+              <a:gd name="adj4" fmla="val -16667"/>
+              <a:gd name="adj5" fmla="val 60632"/>
+              <a:gd name="adj6" fmla="val -32482"/>
+            </a:avLst>
+          </a:prstGeom>
+          <a:noFill/>
+          <a:ln>
+            <a:solidFill>
+              <a:srgbClr val="C00000"/>
+            </a:solidFill>
+          </a:ln>
+        </p:spPr>
+        <p:style>
+          <a:lnRef idx="2">
+            <a:schemeClr val="accent1">
+              <a:shade val="50000"/>
+            </a:schemeClr>
+          </a:lnRef>
+          <a:fillRef idx="1">
+            <a:schemeClr val="accent1"/>
+          </a:fillRef>
+          <a:effectRef idx="0">
+            <a:schemeClr val="accent1"/>
+          </a:effectRef>
+          <a:fontRef idx="minor">
+            <a:schemeClr val="lt1"/>
+          </a:fontRef>
+        </p:style>
+        <p:txBody>
+          <a:bodyPr lIns="0" tIns="0" rIns="0" bIns="0" rtlCol="0" anchor="t"/>
+          <a:lstStyle/>
+          <a:p>
+            <a:r>
+              <a:rPr lang="en-US" sz="1200" dirty="0">
+                <a:solidFill>
+                  <a:schemeClr val="tx1"/>
+                </a:solidFill>
+              </a:rPr>
+              <a:t>build-types select between recording</a:t>
+            </a:r>
+            <a:br>
+              <a:rPr lang="en-US" sz="1200" dirty="0">
+                <a:solidFill>
+                  <a:schemeClr val="tx1"/>
+                </a:solidFill>
+              </a:rPr>
+            </a:br>
+            <a:r>
+              <a:rPr lang="en-US" sz="1200" dirty="0">
+                <a:solidFill>
+                  <a:schemeClr val="tx1"/>
+                </a:solidFill>
+              </a:rPr>
+              <a:t>and playback</a:t>
+            </a:r>
+          </a:p>
+        </p:txBody>
+      </p:sp>
+    </p:spTree>
+    <p:extLst>
+      <p:ext uri="{BB962C8B-B14F-4D97-AF65-F5344CB8AC3E}">
+        <p14:creationId xmlns:p14="http://schemas.microsoft.com/office/powerpoint/2010/main" val="2612990511"/>
+      </p:ext>
+    </p:extLst>
+  </p:cSld>
+  <p:clrMapOvr>
+    <a:masterClrMapping/>
+  </p:clrMapOvr>
+</p:sld>
+</file>
+
+<file path=ppt/slides/slide11.xml><?xml version="1.0" encoding="utf-8"?>
+<p:sld xmlns:a="http://schemas.openxmlformats.org/drawingml/2006/main" xmlns:r="http://schemas.openxmlformats.org/officeDocument/2006/relationships" xmlns:p="http://schemas.openxmlformats.org/presentationml/2006/main">
+  <p:cSld>
+    <p:spTree>
+      <p:nvGrpSpPr>
         <p:cNvPr id="1" name="">
           <a:extLst>
             <a:ext uri="{FF2B5EF4-FFF2-40B4-BE49-F238E27FC236}">
@@ -15540,7 +16428,7 @@
 </p:sld>
 </file>
 
-<file path=ppt/slides/slide11.xml><?xml version="1.0" encoding="utf-8"?>
+<file path=ppt/slides/slide12.xml><?xml version="1.0" encoding="utf-8"?>
 <p:sld xmlns:a="http://schemas.openxmlformats.org/drawingml/2006/main" xmlns:r="http://schemas.openxmlformats.org/officeDocument/2006/relationships" xmlns:p="http://schemas.openxmlformats.org/presentationml/2006/main">
   <p:cSld>
     <p:spTree>
@@ -18338,7 +19226,7 @@
 </p:sld>
 </file>
 
-<file path=ppt/slides/slide12.xml><?xml version="1.0" encoding="utf-8"?>
+<file path=ppt/slides/slide13.xml><?xml version="1.0" encoding="utf-8"?>
 <p:sld xmlns:a="http://schemas.openxmlformats.org/drawingml/2006/main" xmlns:r="http://schemas.openxmlformats.org/officeDocument/2006/relationships" xmlns:p="http://schemas.openxmlformats.org/presentationml/2006/main">
   <p:cSld>
     <p:spTree>
@@ -21405,7 +22293,7 @@
 </p:sld>
 </file>
 
-<file path=ppt/slides/slide13.xml><?xml version="1.0" encoding="utf-8"?>
+<file path=ppt/slides/slide14.xml><?xml version="1.0" encoding="utf-8"?>
 <p:sld xmlns:a="http://schemas.openxmlformats.org/drawingml/2006/main" xmlns:r="http://schemas.openxmlformats.org/officeDocument/2006/relationships" xmlns:p="http://schemas.openxmlformats.org/presentationml/2006/main">
   <p:cSld>
     <p:spTree>
@@ -24902,7 +25790,7 @@
 </p:sld>
 </file>
 
-<file path=ppt/slides/slide14.xml><?xml version="1.0" encoding="utf-8"?>
+<file path=ppt/slides/slide15.xml><?xml version="1.0" encoding="utf-8"?>
 <p:sld xmlns:a="http://schemas.openxmlformats.org/drawingml/2006/main" xmlns:r="http://schemas.openxmlformats.org/officeDocument/2006/relationships" xmlns:p="http://schemas.openxmlformats.org/presentationml/2006/main">
   <p:cSld>
     <p:spTree>
@@ -26200,7 +27088,7 @@
 </p:sld>
 </file>
 
-<file path=ppt/slides/slide15.xml><?xml version="1.0" encoding="utf-8"?>
+<file path=ppt/slides/slide16.xml><?xml version="1.0" encoding="utf-8"?>
 <p:sld xmlns:a="http://schemas.openxmlformats.org/drawingml/2006/main" xmlns:r="http://schemas.openxmlformats.org/officeDocument/2006/relationships" xmlns:p="http://schemas.openxmlformats.org/presentationml/2006/main">
   <p:cSld>
     <p:spTree>
@@ -50883,6 +51771,1936 @@
       </p:grpSpPr>
       <p:sp>
         <p:nvSpPr>
+          <p:cNvPr id="2" name="Title 1">
+            <a:extLst>
+              <a:ext uri="{FF2B5EF4-FFF2-40B4-BE49-F238E27FC236}">
+                <a16:creationId xmlns:a16="http://schemas.microsoft.com/office/drawing/2014/main" id="{45E97B78-7363-3D4F-BA41-015E399EC325}"/>
+              </a:ext>
+            </a:extLst>
+          </p:cNvPr>
+          <p:cNvSpPr>
+            <a:spLocks noGrp="1"/>
+          </p:cNvSpPr>
+          <p:nvPr>
+            <p:ph type="title"/>
+          </p:nvPr>
+        </p:nvSpPr>
+        <p:spPr/>
+        <p:txBody>
+          <a:bodyPr/>
+          <a:lstStyle/>
+          <a:p>
+            <a:r>
+              <a:rPr lang="en-US" dirty="0"/>
+              <a:t>Data Labelling and Regression Test Configuration </a:t>
+            </a:r>
+          </a:p>
+        </p:txBody>
+      </p:sp>
+      <p:sp>
+        <p:nvSpPr>
+          <p:cNvPr id="3" name="Rectangle 2">
+            <a:extLst>
+              <a:ext uri="{FF2B5EF4-FFF2-40B4-BE49-F238E27FC236}">
+                <a16:creationId xmlns:a16="http://schemas.microsoft.com/office/drawing/2014/main" id="{F2EC980E-74CC-7028-7128-4A0D86FEA4A3}"/>
+              </a:ext>
+            </a:extLst>
+          </p:cNvPr>
+          <p:cNvSpPr/>
+          <p:nvPr/>
+        </p:nvSpPr>
+        <p:spPr>
+          <a:xfrm>
+            <a:off x="554859" y="2649774"/>
+            <a:ext cx="956032" cy="201038"/>
+          </a:xfrm>
+          <a:prstGeom prst="rect">
+            <a:avLst/>
+          </a:prstGeom>
+          <a:solidFill>
+            <a:schemeClr val="bg1">
+              <a:lumMod val="75000"/>
+            </a:schemeClr>
+          </a:solidFill>
+          <a:ln w="15875">
+            <a:solidFill>
+              <a:srgbClr val="00C1DE"/>
+            </a:solidFill>
+          </a:ln>
+        </p:spPr>
+        <p:style>
+          <a:lnRef idx="2">
+            <a:schemeClr val="accent1">
+              <a:shade val="50000"/>
+            </a:schemeClr>
+          </a:lnRef>
+          <a:fillRef idx="1">
+            <a:schemeClr val="accent1"/>
+          </a:fillRef>
+          <a:effectRef idx="0">
+            <a:schemeClr val="accent1"/>
+          </a:effectRef>
+          <a:fontRef idx="minor">
+            <a:schemeClr val="lt1"/>
+          </a:fontRef>
+        </p:style>
+        <p:txBody>
+          <a:bodyPr rtlCol="0" anchor="ctr"/>
+          <a:lstStyle/>
+          <a:p>
+            <a:pPr algn="ctr" defTabSz="1219170" eaLnBrk="0" fontAlgn="base" hangingPunct="0">
+              <a:spcBef>
+                <a:spcPct val="0"/>
+              </a:spcBef>
+              <a:spcAft>
+                <a:spcPct val="0"/>
+              </a:spcAft>
+            </a:pPr>
+            <a:r>
+              <a:rPr lang="en-US" sz="1200" dirty="0">
+                <a:solidFill>
+                  <a:schemeClr val="tx1"/>
+                </a:solidFill>
+                <a:latin typeface="Aeonik" panose="020B0503030300000000" pitchFamily="34" charset="0"/>
+                <a:cs typeface="Calibri" panose="020F0502020204030204" pitchFamily="34" charset="0"/>
+              </a:rPr>
+              <a:t>timestamp</a:t>
+            </a:r>
+          </a:p>
+        </p:txBody>
+      </p:sp>
+      <p:sp>
+        <p:nvSpPr>
+          <p:cNvPr id="4" name="Rectangle 3">
+            <a:extLst>
+              <a:ext uri="{FF2B5EF4-FFF2-40B4-BE49-F238E27FC236}">
+                <a16:creationId xmlns:a16="http://schemas.microsoft.com/office/drawing/2014/main" id="{D5560B2F-6BF4-C7C7-01EA-527C1B8E0E0D}"/>
+              </a:ext>
+            </a:extLst>
+          </p:cNvPr>
+          <p:cNvSpPr/>
+          <p:nvPr/>
+        </p:nvSpPr>
+        <p:spPr>
+          <a:xfrm>
+            <a:off x="554859" y="2850812"/>
+            <a:ext cx="956032" cy="201038"/>
+          </a:xfrm>
+          <a:prstGeom prst="rect">
+            <a:avLst/>
+          </a:prstGeom>
+          <a:solidFill>
+            <a:schemeClr val="bg1">
+              <a:lumMod val="75000"/>
+            </a:schemeClr>
+          </a:solidFill>
+          <a:ln w="15875">
+            <a:solidFill>
+              <a:srgbClr val="00C1DE"/>
+            </a:solidFill>
+          </a:ln>
+        </p:spPr>
+        <p:style>
+          <a:lnRef idx="2">
+            <a:schemeClr val="accent1">
+              <a:shade val="50000"/>
+            </a:schemeClr>
+          </a:lnRef>
+          <a:fillRef idx="1">
+            <a:schemeClr val="accent1"/>
+          </a:fillRef>
+          <a:effectRef idx="0">
+            <a:schemeClr val="accent1"/>
+          </a:effectRef>
+          <a:fontRef idx="minor">
+            <a:schemeClr val="lt1"/>
+          </a:fontRef>
+        </p:style>
+        <p:txBody>
+          <a:bodyPr rtlCol="0" anchor="ctr"/>
+          <a:lstStyle/>
+          <a:p>
+            <a:pPr algn="ctr" defTabSz="1219170" eaLnBrk="0" fontAlgn="base" hangingPunct="0">
+              <a:spcBef>
+                <a:spcPct val="0"/>
+              </a:spcBef>
+              <a:spcAft>
+                <a:spcPct val="0"/>
+              </a:spcAft>
+            </a:pPr>
+            <a:r>
+              <a:rPr lang="en-US" sz="1200" dirty="0">
+                <a:solidFill>
+                  <a:schemeClr val="tx1"/>
+                </a:solidFill>
+                <a:latin typeface="Aeonik" panose="020B0503030300000000" pitchFamily="34" charset="0"/>
+                <a:cs typeface="Calibri" panose="020F0502020204030204" pitchFamily="34" charset="0"/>
+              </a:rPr>
+              <a:t>block size</a:t>
+            </a:r>
+          </a:p>
+        </p:txBody>
+      </p:sp>
+      <p:sp>
+        <p:nvSpPr>
+          <p:cNvPr id="5" name="Rectangle 4">
+            <a:extLst>
+              <a:ext uri="{FF2B5EF4-FFF2-40B4-BE49-F238E27FC236}">
+                <a16:creationId xmlns:a16="http://schemas.microsoft.com/office/drawing/2014/main" id="{F58F0331-50E6-4DC0-3AA2-57FD495D86AD}"/>
+              </a:ext>
+            </a:extLst>
+          </p:cNvPr>
+          <p:cNvSpPr/>
+          <p:nvPr/>
+        </p:nvSpPr>
+        <p:spPr>
+          <a:xfrm>
+            <a:off x="554859" y="3051849"/>
+            <a:ext cx="956032" cy="606357"/>
+          </a:xfrm>
+          <a:prstGeom prst="rect">
+            <a:avLst/>
+          </a:prstGeom>
+          <a:solidFill>
+            <a:schemeClr val="bg1">
+              <a:lumMod val="75000"/>
+            </a:schemeClr>
+          </a:solidFill>
+          <a:ln w="15875">
+            <a:solidFill>
+              <a:srgbClr val="00C1DE"/>
+            </a:solidFill>
+          </a:ln>
+        </p:spPr>
+        <p:style>
+          <a:lnRef idx="2">
+            <a:schemeClr val="accent1">
+              <a:shade val="50000"/>
+            </a:schemeClr>
+          </a:lnRef>
+          <a:fillRef idx="1">
+            <a:schemeClr val="accent1"/>
+          </a:fillRef>
+          <a:effectRef idx="0">
+            <a:schemeClr val="accent1"/>
+          </a:effectRef>
+          <a:fontRef idx="minor">
+            <a:schemeClr val="lt1"/>
+          </a:fontRef>
+        </p:style>
+        <p:txBody>
+          <a:bodyPr rtlCol="0" anchor="ctr"/>
+          <a:lstStyle/>
+          <a:p>
+            <a:pPr algn="ctr" defTabSz="1219170" eaLnBrk="0" fontAlgn="base" hangingPunct="0">
+              <a:spcBef>
+                <a:spcPct val="0"/>
+              </a:spcBef>
+              <a:spcAft>
+                <a:spcPct val="0"/>
+              </a:spcAft>
+            </a:pPr>
+            <a:r>
+              <a:rPr lang="en-US" sz="1200" dirty="0">
+                <a:solidFill>
+                  <a:schemeClr val="tx1"/>
+                </a:solidFill>
+                <a:latin typeface="Aeonik" panose="020B0503030300000000" pitchFamily="34" charset="0"/>
+                <a:cs typeface="Calibri" panose="020F0502020204030204" pitchFamily="34" charset="0"/>
+              </a:rPr>
+              <a:t>data block</a:t>
+            </a:r>
+          </a:p>
+        </p:txBody>
+      </p:sp>
+      <p:sp>
+        <p:nvSpPr>
+          <p:cNvPr id="6" name="Rectangle 5">
+            <a:extLst>
+              <a:ext uri="{FF2B5EF4-FFF2-40B4-BE49-F238E27FC236}">
+                <a16:creationId xmlns:a16="http://schemas.microsoft.com/office/drawing/2014/main" id="{A1D9FC23-04EE-1E74-8DDB-F67529641187}"/>
+              </a:ext>
+            </a:extLst>
+          </p:cNvPr>
+          <p:cNvSpPr/>
+          <p:nvPr/>
+        </p:nvSpPr>
+        <p:spPr>
+          <a:xfrm>
+            <a:off x="554860" y="3651724"/>
+            <a:ext cx="956032" cy="201038"/>
+          </a:xfrm>
+          <a:prstGeom prst="rect">
+            <a:avLst/>
+          </a:prstGeom>
+          <a:solidFill>
+            <a:schemeClr val="bg1">
+              <a:lumMod val="95000"/>
+            </a:schemeClr>
+          </a:solidFill>
+          <a:ln w="15875">
+            <a:solidFill>
+              <a:srgbClr val="00C1DE"/>
+            </a:solidFill>
+          </a:ln>
+        </p:spPr>
+        <p:style>
+          <a:lnRef idx="2">
+            <a:schemeClr val="accent1">
+              <a:shade val="50000"/>
+            </a:schemeClr>
+          </a:lnRef>
+          <a:fillRef idx="1">
+            <a:schemeClr val="accent1"/>
+          </a:fillRef>
+          <a:effectRef idx="0">
+            <a:schemeClr val="accent1"/>
+          </a:effectRef>
+          <a:fontRef idx="minor">
+            <a:schemeClr val="lt1"/>
+          </a:fontRef>
+        </p:style>
+        <p:txBody>
+          <a:bodyPr rtlCol="0" anchor="ctr"/>
+          <a:lstStyle/>
+          <a:p>
+            <a:pPr algn="ctr" defTabSz="1219170" eaLnBrk="0" fontAlgn="base" hangingPunct="0">
+              <a:spcBef>
+                <a:spcPct val="0"/>
+              </a:spcBef>
+              <a:spcAft>
+                <a:spcPct val="0"/>
+              </a:spcAft>
+            </a:pPr>
+            <a:r>
+              <a:rPr lang="en-US" sz="1200" dirty="0">
+                <a:solidFill>
+                  <a:schemeClr val="tx1"/>
+                </a:solidFill>
+                <a:latin typeface="Aeonik" panose="020B0503030300000000" pitchFamily="34" charset="0"/>
+                <a:cs typeface="Calibri" panose="020F0502020204030204" pitchFamily="34" charset="0"/>
+              </a:rPr>
+              <a:t>timestamp</a:t>
+            </a:r>
+          </a:p>
+        </p:txBody>
+      </p:sp>
+      <p:sp>
+        <p:nvSpPr>
+          <p:cNvPr id="7" name="Rectangle 6">
+            <a:extLst>
+              <a:ext uri="{FF2B5EF4-FFF2-40B4-BE49-F238E27FC236}">
+                <a16:creationId xmlns:a16="http://schemas.microsoft.com/office/drawing/2014/main" id="{24481E57-FD43-4127-EB60-73CF406D5331}"/>
+              </a:ext>
+            </a:extLst>
+          </p:cNvPr>
+          <p:cNvSpPr/>
+          <p:nvPr/>
+        </p:nvSpPr>
+        <p:spPr>
+          <a:xfrm>
+            <a:off x="554860" y="3852762"/>
+            <a:ext cx="956032" cy="201038"/>
+          </a:xfrm>
+          <a:prstGeom prst="rect">
+            <a:avLst/>
+          </a:prstGeom>
+          <a:solidFill>
+            <a:schemeClr val="bg1">
+              <a:lumMod val="95000"/>
+            </a:schemeClr>
+          </a:solidFill>
+          <a:ln w="15875">
+            <a:solidFill>
+              <a:srgbClr val="00C1DE"/>
+            </a:solidFill>
+          </a:ln>
+        </p:spPr>
+        <p:style>
+          <a:lnRef idx="2">
+            <a:schemeClr val="accent1">
+              <a:shade val="50000"/>
+            </a:schemeClr>
+          </a:lnRef>
+          <a:fillRef idx="1">
+            <a:schemeClr val="accent1"/>
+          </a:fillRef>
+          <a:effectRef idx="0">
+            <a:schemeClr val="accent1"/>
+          </a:effectRef>
+          <a:fontRef idx="minor">
+            <a:schemeClr val="lt1"/>
+          </a:fontRef>
+        </p:style>
+        <p:txBody>
+          <a:bodyPr rtlCol="0" anchor="ctr"/>
+          <a:lstStyle/>
+          <a:p>
+            <a:pPr algn="ctr" defTabSz="1219170" eaLnBrk="0" fontAlgn="base" hangingPunct="0">
+              <a:spcBef>
+                <a:spcPct val="0"/>
+              </a:spcBef>
+              <a:spcAft>
+                <a:spcPct val="0"/>
+              </a:spcAft>
+            </a:pPr>
+            <a:r>
+              <a:rPr lang="en-US" sz="1200" dirty="0">
+                <a:solidFill>
+                  <a:schemeClr val="tx1"/>
+                </a:solidFill>
+                <a:latin typeface="Aeonik" panose="020B0503030300000000" pitchFamily="34" charset="0"/>
+                <a:cs typeface="Calibri" panose="020F0502020204030204" pitchFamily="34" charset="0"/>
+              </a:rPr>
+              <a:t>block size</a:t>
+            </a:r>
+          </a:p>
+        </p:txBody>
+      </p:sp>
+      <p:sp>
+        <p:nvSpPr>
+          <p:cNvPr id="8" name="Rectangle 7">
+            <a:extLst>
+              <a:ext uri="{FF2B5EF4-FFF2-40B4-BE49-F238E27FC236}">
+                <a16:creationId xmlns:a16="http://schemas.microsoft.com/office/drawing/2014/main" id="{D08FC379-5804-5B02-9332-0AF02165909B}"/>
+              </a:ext>
+            </a:extLst>
+          </p:cNvPr>
+          <p:cNvSpPr/>
+          <p:nvPr/>
+        </p:nvSpPr>
+        <p:spPr>
+          <a:xfrm>
+            <a:off x="554860" y="4053799"/>
+            <a:ext cx="956032" cy="606357"/>
+          </a:xfrm>
+          <a:prstGeom prst="rect">
+            <a:avLst/>
+          </a:prstGeom>
+          <a:solidFill>
+            <a:schemeClr val="bg1">
+              <a:lumMod val="95000"/>
+            </a:schemeClr>
+          </a:solidFill>
+          <a:ln w="15875">
+            <a:solidFill>
+              <a:srgbClr val="00C1DE"/>
+            </a:solidFill>
+          </a:ln>
+        </p:spPr>
+        <p:style>
+          <a:lnRef idx="2">
+            <a:schemeClr val="accent1">
+              <a:shade val="50000"/>
+            </a:schemeClr>
+          </a:lnRef>
+          <a:fillRef idx="1">
+            <a:schemeClr val="accent1"/>
+          </a:fillRef>
+          <a:effectRef idx="0">
+            <a:schemeClr val="accent1"/>
+          </a:effectRef>
+          <a:fontRef idx="minor">
+            <a:schemeClr val="lt1"/>
+          </a:fontRef>
+        </p:style>
+        <p:txBody>
+          <a:bodyPr rtlCol="0" anchor="ctr"/>
+          <a:lstStyle/>
+          <a:p>
+            <a:pPr algn="ctr" defTabSz="1219170" eaLnBrk="0" fontAlgn="base" hangingPunct="0">
+              <a:spcBef>
+                <a:spcPct val="0"/>
+              </a:spcBef>
+              <a:spcAft>
+                <a:spcPct val="0"/>
+              </a:spcAft>
+            </a:pPr>
+            <a:r>
+              <a:rPr lang="en-US" sz="1200" dirty="0">
+                <a:solidFill>
+                  <a:schemeClr val="tx1"/>
+                </a:solidFill>
+                <a:latin typeface="Aeonik" panose="020B0503030300000000" pitchFamily="34" charset="0"/>
+                <a:cs typeface="Calibri" panose="020F0502020204030204" pitchFamily="34" charset="0"/>
+              </a:rPr>
+              <a:t>data block</a:t>
+            </a:r>
+          </a:p>
+        </p:txBody>
+      </p:sp>
+      <p:sp>
+        <p:nvSpPr>
+          <p:cNvPr id="9" name="Rectangle 8">
+            <a:extLst>
+              <a:ext uri="{FF2B5EF4-FFF2-40B4-BE49-F238E27FC236}">
+                <a16:creationId xmlns:a16="http://schemas.microsoft.com/office/drawing/2014/main" id="{2762B8A7-327D-3F67-AFF2-F92810C171C7}"/>
+              </a:ext>
+            </a:extLst>
+          </p:cNvPr>
+          <p:cNvSpPr/>
+          <p:nvPr/>
+        </p:nvSpPr>
+        <p:spPr>
+          <a:xfrm>
+            <a:off x="554859" y="4666641"/>
+            <a:ext cx="956032" cy="201038"/>
+          </a:xfrm>
+          <a:prstGeom prst="rect">
+            <a:avLst/>
+          </a:prstGeom>
+          <a:solidFill>
+            <a:schemeClr val="bg1">
+              <a:lumMod val="75000"/>
+            </a:schemeClr>
+          </a:solidFill>
+          <a:ln w="15875">
+            <a:solidFill>
+              <a:srgbClr val="00C1DE"/>
+            </a:solidFill>
+          </a:ln>
+        </p:spPr>
+        <p:style>
+          <a:lnRef idx="2">
+            <a:schemeClr val="accent1">
+              <a:shade val="50000"/>
+            </a:schemeClr>
+          </a:lnRef>
+          <a:fillRef idx="1">
+            <a:schemeClr val="accent1"/>
+          </a:fillRef>
+          <a:effectRef idx="0">
+            <a:schemeClr val="accent1"/>
+          </a:effectRef>
+          <a:fontRef idx="minor">
+            <a:schemeClr val="lt1"/>
+          </a:fontRef>
+        </p:style>
+        <p:txBody>
+          <a:bodyPr rtlCol="0" anchor="ctr"/>
+          <a:lstStyle/>
+          <a:p>
+            <a:pPr algn="ctr" defTabSz="1219170" eaLnBrk="0" fontAlgn="base" hangingPunct="0">
+              <a:spcBef>
+                <a:spcPct val="0"/>
+              </a:spcBef>
+              <a:spcAft>
+                <a:spcPct val="0"/>
+              </a:spcAft>
+            </a:pPr>
+            <a:r>
+              <a:rPr lang="en-US" sz="1200" dirty="0">
+                <a:solidFill>
+                  <a:schemeClr val="tx1"/>
+                </a:solidFill>
+                <a:latin typeface="Aeonik" panose="020B0503030300000000" pitchFamily="34" charset="0"/>
+                <a:cs typeface="Calibri" panose="020F0502020204030204" pitchFamily="34" charset="0"/>
+              </a:rPr>
+              <a:t>timestamp</a:t>
+            </a:r>
+          </a:p>
+        </p:txBody>
+      </p:sp>
+      <p:sp>
+        <p:nvSpPr>
+          <p:cNvPr id="10" name="Rectangle 9">
+            <a:extLst>
+              <a:ext uri="{FF2B5EF4-FFF2-40B4-BE49-F238E27FC236}">
+                <a16:creationId xmlns:a16="http://schemas.microsoft.com/office/drawing/2014/main" id="{1A238A8D-5E1B-4B63-6B87-4B462F46D1A8}"/>
+              </a:ext>
+            </a:extLst>
+          </p:cNvPr>
+          <p:cNvSpPr/>
+          <p:nvPr/>
+        </p:nvSpPr>
+        <p:spPr>
+          <a:xfrm>
+            <a:off x="554859" y="4867679"/>
+            <a:ext cx="956032" cy="201038"/>
+          </a:xfrm>
+          <a:prstGeom prst="rect">
+            <a:avLst/>
+          </a:prstGeom>
+          <a:solidFill>
+            <a:schemeClr val="bg1">
+              <a:lumMod val="75000"/>
+            </a:schemeClr>
+          </a:solidFill>
+          <a:ln w="15875">
+            <a:solidFill>
+              <a:srgbClr val="00C1DE"/>
+            </a:solidFill>
+          </a:ln>
+        </p:spPr>
+        <p:style>
+          <a:lnRef idx="2">
+            <a:schemeClr val="accent1">
+              <a:shade val="50000"/>
+            </a:schemeClr>
+          </a:lnRef>
+          <a:fillRef idx="1">
+            <a:schemeClr val="accent1"/>
+          </a:fillRef>
+          <a:effectRef idx="0">
+            <a:schemeClr val="accent1"/>
+          </a:effectRef>
+          <a:fontRef idx="minor">
+            <a:schemeClr val="lt1"/>
+          </a:fontRef>
+        </p:style>
+        <p:txBody>
+          <a:bodyPr rtlCol="0" anchor="ctr"/>
+          <a:lstStyle/>
+          <a:p>
+            <a:pPr algn="ctr" defTabSz="1219170" eaLnBrk="0" fontAlgn="base" hangingPunct="0">
+              <a:spcBef>
+                <a:spcPct val="0"/>
+              </a:spcBef>
+              <a:spcAft>
+                <a:spcPct val="0"/>
+              </a:spcAft>
+            </a:pPr>
+            <a:r>
+              <a:rPr lang="en-US" sz="1200" dirty="0">
+                <a:solidFill>
+                  <a:schemeClr val="tx1"/>
+                </a:solidFill>
+                <a:latin typeface="Aeonik" panose="020B0503030300000000" pitchFamily="34" charset="0"/>
+                <a:cs typeface="Calibri" panose="020F0502020204030204" pitchFamily="34" charset="0"/>
+              </a:rPr>
+              <a:t>block size</a:t>
+            </a:r>
+          </a:p>
+        </p:txBody>
+      </p:sp>
+      <p:cxnSp>
+        <p:nvCxnSpPr>
+          <p:cNvPr id="11" name="Straight Connector 10">
+            <a:extLst>
+              <a:ext uri="{FF2B5EF4-FFF2-40B4-BE49-F238E27FC236}">
+                <a16:creationId xmlns:a16="http://schemas.microsoft.com/office/drawing/2014/main" id="{0277E518-22E2-4732-5259-8637BDB8C2CC}"/>
+              </a:ext>
+            </a:extLst>
+          </p:cNvPr>
+          <p:cNvCxnSpPr>
+            <a:cxnSpLocks/>
+          </p:cNvCxnSpPr>
+          <p:nvPr/>
+        </p:nvCxnSpPr>
+        <p:spPr>
+          <a:xfrm>
+            <a:off x="554859" y="5068717"/>
+            <a:ext cx="0" cy="295072"/>
+          </a:xfrm>
+          <a:prstGeom prst="line">
+            <a:avLst/>
+          </a:prstGeom>
+          <a:solidFill>
+            <a:schemeClr val="bg1">
+              <a:lumMod val="95000"/>
+            </a:schemeClr>
+          </a:solidFill>
+          <a:ln w="15875">
+            <a:solidFill>
+              <a:srgbClr val="00C1DE"/>
+            </a:solidFill>
+            <a:prstDash val="dash"/>
+          </a:ln>
+        </p:spPr>
+        <p:style>
+          <a:lnRef idx="2">
+            <a:schemeClr val="accent1">
+              <a:shade val="50000"/>
+            </a:schemeClr>
+          </a:lnRef>
+          <a:fillRef idx="1">
+            <a:schemeClr val="accent1"/>
+          </a:fillRef>
+          <a:effectRef idx="0">
+            <a:schemeClr val="accent1"/>
+          </a:effectRef>
+          <a:fontRef idx="minor">
+            <a:schemeClr val="lt1"/>
+          </a:fontRef>
+        </p:style>
+      </p:cxnSp>
+      <p:cxnSp>
+        <p:nvCxnSpPr>
+          <p:cNvPr id="12" name="Straight Connector 11">
+            <a:extLst>
+              <a:ext uri="{FF2B5EF4-FFF2-40B4-BE49-F238E27FC236}">
+                <a16:creationId xmlns:a16="http://schemas.microsoft.com/office/drawing/2014/main" id="{B76052C5-4EB0-AA1E-201F-295800017F99}"/>
+              </a:ext>
+            </a:extLst>
+          </p:cNvPr>
+          <p:cNvCxnSpPr>
+            <a:cxnSpLocks/>
+          </p:cNvCxnSpPr>
+          <p:nvPr/>
+        </p:nvCxnSpPr>
+        <p:spPr>
+          <a:xfrm>
+            <a:off x="1510891" y="5068717"/>
+            <a:ext cx="0" cy="295072"/>
+          </a:xfrm>
+          <a:prstGeom prst="line">
+            <a:avLst/>
+          </a:prstGeom>
+          <a:solidFill>
+            <a:schemeClr val="bg1">
+              <a:lumMod val="95000"/>
+            </a:schemeClr>
+          </a:solidFill>
+          <a:ln w="15875">
+            <a:solidFill>
+              <a:srgbClr val="00C1DE"/>
+            </a:solidFill>
+            <a:prstDash val="dash"/>
+          </a:ln>
+        </p:spPr>
+        <p:style>
+          <a:lnRef idx="2">
+            <a:schemeClr val="accent1">
+              <a:shade val="50000"/>
+            </a:schemeClr>
+          </a:lnRef>
+          <a:fillRef idx="1">
+            <a:schemeClr val="accent1"/>
+          </a:fillRef>
+          <a:effectRef idx="0">
+            <a:schemeClr val="accent1"/>
+          </a:effectRef>
+          <a:fontRef idx="minor">
+            <a:schemeClr val="lt1"/>
+          </a:fontRef>
+        </p:style>
+      </p:cxnSp>
+      <p:sp>
+        <p:nvSpPr>
+          <p:cNvPr id="13" name="TextBox 12">
+            <a:extLst>
+              <a:ext uri="{FF2B5EF4-FFF2-40B4-BE49-F238E27FC236}">
+                <a16:creationId xmlns:a16="http://schemas.microsoft.com/office/drawing/2014/main" id="{769D12FA-B1F8-E274-908D-FC76038A889F}"/>
+              </a:ext>
+            </a:extLst>
+          </p:cNvPr>
+          <p:cNvSpPr txBox="1"/>
+          <p:nvPr/>
+        </p:nvSpPr>
+        <p:spPr>
+          <a:xfrm>
+            <a:off x="539986" y="2358218"/>
+            <a:ext cx="1021408" cy="142347"/>
+          </a:xfrm>
+          <a:prstGeom prst="rect">
+            <a:avLst/>
+          </a:prstGeom>
+          <a:noFill/>
+        </p:spPr>
+        <p:txBody>
+          <a:bodyPr wrap="square" lIns="0" tIns="0" rIns="0" bIns="0" rtlCol="0">
+            <a:spAutoFit/>
+          </a:bodyPr>
+          <a:lstStyle/>
+          <a:p>
+            <a:pPr marL="0" indent="0" algn="l" defTabSz="914400" rtl="0" eaLnBrk="1" latinLnBrk="0" hangingPunct="1">
+              <a:lnSpc>
+                <a:spcPct val="90000"/>
+              </a:lnSpc>
+              <a:spcBef>
+                <a:spcPts val="0"/>
+              </a:spcBef>
+              <a:spcAft>
+                <a:spcPts val="600"/>
+              </a:spcAft>
+              <a:buFont typeface="Arial" panose="020B0604020202020204" pitchFamily="34" charset="0"/>
+              <a:buNone/>
+            </a:pPr>
+            <a:r>
+              <a:rPr lang="en-US" sz="1000" b="1" dirty="0">
+                <a:solidFill>
+                  <a:schemeClr val="tx2"/>
+                </a:solidFill>
+                <a:latin typeface="Courier New" panose="02070309020205020404" pitchFamily="49" charset="0"/>
+                <a:cs typeface="Courier New" panose="02070309020205020404" pitchFamily="49" charset="0"/>
+              </a:rPr>
+              <a:t>SCinput.0.sds</a:t>
+            </a:r>
+            <a:endParaRPr lang="en-US" sz="1000" b="1" kern="1200" dirty="0">
+              <a:solidFill>
+                <a:schemeClr val="tx2"/>
+              </a:solidFill>
+              <a:latin typeface="Courier New" panose="02070309020205020404" pitchFamily="49" charset="0"/>
+              <a:cs typeface="Courier New" panose="02070309020205020404" pitchFamily="49" charset="0"/>
+            </a:endParaRPr>
+          </a:p>
+        </p:txBody>
+      </p:sp>
+      <p:sp>
+        <p:nvSpPr>
+          <p:cNvPr id="14" name="Rectangle 13">
+            <a:extLst>
+              <a:ext uri="{FF2B5EF4-FFF2-40B4-BE49-F238E27FC236}">
+                <a16:creationId xmlns:a16="http://schemas.microsoft.com/office/drawing/2014/main" id="{B1D5F663-8FDF-D142-D206-934EA2CDC203}"/>
+              </a:ext>
+            </a:extLst>
+          </p:cNvPr>
+          <p:cNvSpPr/>
+          <p:nvPr/>
+        </p:nvSpPr>
+        <p:spPr>
+          <a:xfrm>
+            <a:off x="2339506" y="2665440"/>
+            <a:ext cx="956032" cy="201038"/>
+          </a:xfrm>
+          <a:prstGeom prst="rect">
+            <a:avLst/>
+          </a:prstGeom>
+          <a:solidFill>
+            <a:schemeClr val="bg1">
+              <a:lumMod val="75000"/>
+            </a:schemeClr>
+          </a:solidFill>
+          <a:ln w="15875">
+            <a:solidFill>
+              <a:srgbClr val="00C1DE"/>
+            </a:solidFill>
+          </a:ln>
+        </p:spPr>
+        <p:style>
+          <a:lnRef idx="2">
+            <a:schemeClr val="accent1">
+              <a:shade val="50000"/>
+            </a:schemeClr>
+          </a:lnRef>
+          <a:fillRef idx="1">
+            <a:schemeClr val="accent1"/>
+          </a:fillRef>
+          <a:effectRef idx="0">
+            <a:schemeClr val="accent1"/>
+          </a:effectRef>
+          <a:fontRef idx="minor">
+            <a:schemeClr val="lt1"/>
+          </a:fontRef>
+        </p:style>
+        <p:txBody>
+          <a:bodyPr rtlCol="0" anchor="ctr"/>
+          <a:lstStyle/>
+          <a:p>
+            <a:pPr algn="ctr" defTabSz="1219170" eaLnBrk="0" fontAlgn="base" hangingPunct="0">
+              <a:spcBef>
+                <a:spcPct val="0"/>
+              </a:spcBef>
+              <a:spcAft>
+                <a:spcPct val="0"/>
+              </a:spcAft>
+            </a:pPr>
+            <a:r>
+              <a:rPr lang="en-US" sz="1200" dirty="0">
+                <a:solidFill>
+                  <a:schemeClr val="tx1"/>
+                </a:solidFill>
+                <a:latin typeface="Aeonik" panose="020B0503030300000000" pitchFamily="34" charset="0"/>
+                <a:cs typeface="Calibri" panose="020F0502020204030204" pitchFamily="34" charset="0"/>
+              </a:rPr>
+              <a:t>timestamp</a:t>
+            </a:r>
+          </a:p>
+        </p:txBody>
+      </p:sp>
+      <p:sp>
+        <p:nvSpPr>
+          <p:cNvPr id="15" name="Rectangle 14">
+            <a:extLst>
+              <a:ext uri="{FF2B5EF4-FFF2-40B4-BE49-F238E27FC236}">
+                <a16:creationId xmlns:a16="http://schemas.microsoft.com/office/drawing/2014/main" id="{C17155FF-F44A-80BF-47D9-CE669DD8C0BD}"/>
+              </a:ext>
+            </a:extLst>
+          </p:cNvPr>
+          <p:cNvSpPr/>
+          <p:nvPr/>
+        </p:nvSpPr>
+        <p:spPr>
+          <a:xfrm>
+            <a:off x="2339506" y="2866478"/>
+            <a:ext cx="956032" cy="201038"/>
+          </a:xfrm>
+          <a:prstGeom prst="rect">
+            <a:avLst/>
+          </a:prstGeom>
+          <a:solidFill>
+            <a:schemeClr val="bg1">
+              <a:lumMod val="75000"/>
+            </a:schemeClr>
+          </a:solidFill>
+          <a:ln w="15875">
+            <a:solidFill>
+              <a:srgbClr val="00C1DE"/>
+            </a:solidFill>
+          </a:ln>
+        </p:spPr>
+        <p:style>
+          <a:lnRef idx="2">
+            <a:schemeClr val="accent1">
+              <a:shade val="50000"/>
+            </a:schemeClr>
+          </a:lnRef>
+          <a:fillRef idx="1">
+            <a:schemeClr val="accent1"/>
+          </a:fillRef>
+          <a:effectRef idx="0">
+            <a:schemeClr val="accent1"/>
+          </a:effectRef>
+          <a:fontRef idx="minor">
+            <a:schemeClr val="lt1"/>
+          </a:fontRef>
+        </p:style>
+        <p:txBody>
+          <a:bodyPr rtlCol="0" anchor="ctr"/>
+          <a:lstStyle/>
+          <a:p>
+            <a:pPr algn="ctr" defTabSz="1219170" eaLnBrk="0" fontAlgn="base" hangingPunct="0">
+              <a:spcBef>
+                <a:spcPct val="0"/>
+              </a:spcBef>
+              <a:spcAft>
+                <a:spcPct val="0"/>
+              </a:spcAft>
+            </a:pPr>
+            <a:r>
+              <a:rPr lang="en-US" sz="1200" dirty="0">
+                <a:solidFill>
+                  <a:schemeClr val="tx1"/>
+                </a:solidFill>
+                <a:latin typeface="Aeonik" panose="020B0503030300000000" pitchFamily="34" charset="0"/>
+                <a:cs typeface="Calibri" panose="020F0502020204030204" pitchFamily="34" charset="0"/>
+              </a:rPr>
+              <a:t>block size</a:t>
+            </a:r>
+          </a:p>
+        </p:txBody>
+      </p:sp>
+      <p:sp>
+        <p:nvSpPr>
+          <p:cNvPr id="16" name="Rectangle 15">
+            <a:extLst>
+              <a:ext uri="{FF2B5EF4-FFF2-40B4-BE49-F238E27FC236}">
+                <a16:creationId xmlns:a16="http://schemas.microsoft.com/office/drawing/2014/main" id="{D99ED505-C388-0CFC-29D7-94E5B9B5ABBD}"/>
+              </a:ext>
+            </a:extLst>
+          </p:cNvPr>
+          <p:cNvSpPr/>
+          <p:nvPr/>
+        </p:nvSpPr>
+        <p:spPr>
+          <a:xfrm>
+            <a:off x="2339506" y="3067515"/>
+            <a:ext cx="956032" cy="606357"/>
+          </a:xfrm>
+          <a:prstGeom prst="rect">
+            <a:avLst/>
+          </a:prstGeom>
+          <a:solidFill>
+            <a:schemeClr val="bg1">
+              <a:lumMod val="75000"/>
+            </a:schemeClr>
+          </a:solidFill>
+          <a:ln w="15875">
+            <a:solidFill>
+              <a:srgbClr val="00C1DE"/>
+            </a:solidFill>
+          </a:ln>
+        </p:spPr>
+        <p:style>
+          <a:lnRef idx="2">
+            <a:schemeClr val="accent1">
+              <a:shade val="50000"/>
+            </a:schemeClr>
+          </a:lnRef>
+          <a:fillRef idx="1">
+            <a:schemeClr val="accent1"/>
+          </a:fillRef>
+          <a:effectRef idx="0">
+            <a:schemeClr val="accent1"/>
+          </a:effectRef>
+          <a:fontRef idx="minor">
+            <a:schemeClr val="lt1"/>
+          </a:fontRef>
+        </p:style>
+        <p:txBody>
+          <a:bodyPr rtlCol="0" anchor="ctr"/>
+          <a:lstStyle/>
+          <a:p>
+            <a:pPr algn="ctr" defTabSz="1219170" eaLnBrk="0" fontAlgn="base" hangingPunct="0">
+              <a:spcBef>
+                <a:spcPct val="0"/>
+              </a:spcBef>
+              <a:spcAft>
+                <a:spcPct val="0"/>
+              </a:spcAft>
+            </a:pPr>
+            <a:r>
+              <a:rPr lang="en-US" sz="1200" dirty="0">
+                <a:solidFill>
+                  <a:schemeClr val="tx1"/>
+                </a:solidFill>
+                <a:latin typeface="Aeonik" panose="020B0503030300000000" pitchFamily="34" charset="0"/>
+                <a:cs typeface="Calibri" panose="020F0502020204030204" pitchFamily="34" charset="0"/>
+              </a:rPr>
+              <a:t>data block</a:t>
+            </a:r>
+          </a:p>
+        </p:txBody>
+      </p:sp>
+      <p:sp>
+        <p:nvSpPr>
+          <p:cNvPr id="17" name="Rectangle 16">
+            <a:extLst>
+              <a:ext uri="{FF2B5EF4-FFF2-40B4-BE49-F238E27FC236}">
+                <a16:creationId xmlns:a16="http://schemas.microsoft.com/office/drawing/2014/main" id="{AA974E03-B1B0-6E63-A51F-88E7E505A721}"/>
+              </a:ext>
+            </a:extLst>
+          </p:cNvPr>
+          <p:cNvSpPr/>
+          <p:nvPr/>
+        </p:nvSpPr>
+        <p:spPr>
+          <a:xfrm>
+            <a:off x="2339507" y="3667390"/>
+            <a:ext cx="956032" cy="201038"/>
+          </a:xfrm>
+          <a:prstGeom prst="rect">
+            <a:avLst/>
+          </a:prstGeom>
+          <a:solidFill>
+            <a:schemeClr val="bg1">
+              <a:lumMod val="95000"/>
+            </a:schemeClr>
+          </a:solidFill>
+          <a:ln w="15875">
+            <a:solidFill>
+              <a:srgbClr val="00C1DE"/>
+            </a:solidFill>
+          </a:ln>
+        </p:spPr>
+        <p:style>
+          <a:lnRef idx="2">
+            <a:schemeClr val="accent1">
+              <a:shade val="50000"/>
+            </a:schemeClr>
+          </a:lnRef>
+          <a:fillRef idx="1">
+            <a:schemeClr val="accent1"/>
+          </a:fillRef>
+          <a:effectRef idx="0">
+            <a:schemeClr val="accent1"/>
+          </a:effectRef>
+          <a:fontRef idx="minor">
+            <a:schemeClr val="lt1"/>
+          </a:fontRef>
+        </p:style>
+        <p:txBody>
+          <a:bodyPr rtlCol="0" anchor="ctr"/>
+          <a:lstStyle/>
+          <a:p>
+            <a:pPr algn="ctr" defTabSz="1219170" eaLnBrk="0" fontAlgn="base" hangingPunct="0">
+              <a:spcBef>
+                <a:spcPct val="0"/>
+              </a:spcBef>
+              <a:spcAft>
+                <a:spcPct val="0"/>
+              </a:spcAft>
+            </a:pPr>
+            <a:r>
+              <a:rPr lang="en-US" sz="1200" dirty="0">
+                <a:solidFill>
+                  <a:schemeClr val="tx1"/>
+                </a:solidFill>
+                <a:latin typeface="Aeonik" panose="020B0503030300000000" pitchFamily="34" charset="0"/>
+                <a:cs typeface="Calibri" panose="020F0502020204030204" pitchFamily="34" charset="0"/>
+              </a:rPr>
+              <a:t>timestamp</a:t>
+            </a:r>
+          </a:p>
+        </p:txBody>
+      </p:sp>
+      <p:sp>
+        <p:nvSpPr>
+          <p:cNvPr id="18" name="Rectangle 17">
+            <a:extLst>
+              <a:ext uri="{FF2B5EF4-FFF2-40B4-BE49-F238E27FC236}">
+                <a16:creationId xmlns:a16="http://schemas.microsoft.com/office/drawing/2014/main" id="{7211C269-FD62-DB9D-78E6-F4D731D27F39}"/>
+              </a:ext>
+            </a:extLst>
+          </p:cNvPr>
+          <p:cNvSpPr/>
+          <p:nvPr/>
+        </p:nvSpPr>
+        <p:spPr>
+          <a:xfrm>
+            <a:off x="2339507" y="3868428"/>
+            <a:ext cx="956032" cy="201038"/>
+          </a:xfrm>
+          <a:prstGeom prst="rect">
+            <a:avLst/>
+          </a:prstGeom>
+          <a:solidFill>
+            <a:schemeClr val="bg1">
+              <a:lumMod val="95000"/>
+            </a:schemeClr>
+          </a:solidFill>
+          <a:ln w="15875">
+            <a:solidFill>
+              <a:srgbClr val="00C1DE"/>
+            </a:solidFill>
+          </a:ln>
+        </p:spPr>
+        <p:style>
+          <a:lnRef idx="2">
+            <a:schemeClr val="accent1">
+              <a:shade val="50000"/>
+            </a:schemeClr>
+          </a:lnRef>
+          <a:fillRef idx="1">
+            <a:schemeClr val="accent1"/>
+          </a:fillRef>
+          <a:effectRef idx="0">
+            <a:schemeClr val="accent1"/>
+          </a:effectRef>
+          <a:fontRef idx="minor">
+            <a:schemeClr val="lt1"/>
+          </a:fontRef>
+        </p:style>
+        <p:txBody>
+          <a:bodyPr rtlCol="0" anchor="ctr"/>
+          <a:lstStyle/>
+          <a:p>
+            <a:pPr algn="ctr" defTabSz="1219170" eaLnBrk="0" fontAlgn="base" hangingPunct="0">
+              <a:spcBef>
+                <a:spcPct val="0"/>
+              </a:spcBef>
+              <a:spcAft>
+                <a:spcPct val="0"/>
+              </a:spcAft>
+            </a:pPr>
+            <a:r>
+              <a:rPr lang="en-US" sz="1200" dirty="0">
+                <a:solidFill>
+                  <a:schemeClr val="tx1"/>
+                </a:solidFill>
+                <a:latin typeface="Aeonik" panose="020B0503030300000000" pitchFamily="34" charset="0"/>
+                <a:cs typeface="Calibri" panose="020F0502020204030204" pitchFamily="34" charset="0"/>
+              </a:rPr>
+              <a:t>block size</a:t>
+            </a:r>
+          </a:p>
+        </p:txBody>
+      </p:sp>
+      <p:sp>
+        <p:nvSpPr>
+          <p:cNvPr id="19" name="Rectangle 18">
+            <a:extLst>
+              <a:ext uri="{FF2B5EF4-FFF2-40B4-BE49-F238E27FC236}">
+                <a16:creationId xmlns:a16="http://schemas.microsoft.com/office/drawing/2014/main" id="{ACC94616-5F9B-AFCA-CC1D-A6DD3995BC07}"/>
+              </a:ext>
+            </a:extLst>
+          </p:cNvPr>
+          <p:cNvSpPr/>
+          <p:nvPr/>
+        </p:nvSpPr>
+        <p:spPr>
+          <a:xfrm>
+            <a:off x="2339507" y="4069465"/>
+            <a:ext cx="956032" cy="606357"/>
+          </a:xfrm>
+          <a:prstGeom prst="rect">
+            <a:avLst/>
+          </a:prstGeom>
+          <a:solidFill>
+            <a:schemeClr val="bg1">
+              <a:lumMod val="95000"/>
+            </a:schemeClr>
+          </a:solidFill>
+          <a:ln w="15875">
+            <a:solidFill>
+              <a:srgbClr val="00C1DE"/>
+            </a:solidFill>
+          </a:ln>
+        </p:spPr>
+        <p:style>
+          <a:lnRef idx="2">
+            <a:schemeClr val="accent1">
+              <a:shade val="50000"/>
+            </a:schemeClr>
+          </a:lnRef>
+          <a:fillRef idx="1">
+            <a:schemeClr val="accent1"/>
+          </a:fillRef>
+          <a:effectRef idx="0">
+            <a:schemeClr val="accent1"/>
+          </a:effectRef>
+          <a:fontRef idx="minor">
+            <a:schemeClr val="lt1"/>
+          </a:fontRef>
+        </p:style>
+        <p:txBody>
+          <a:bodyPr rtlCol="0" anchor="ctr"/>
+          <a:lstStyle/>
+          <a:p>
+            <a:pPr algn="ctr" defTabSz="1219170" eaLnBrk="0" fontAlgn="base" hangingPunct="0">
+              <a:spcBef>
+                <a:spcPct val="0"/>
+              </a:spcBef>
+              <a:spcAft>
+                <a:spcPct val="0"/>
+              </a:spcAft>
+            </a:pPr>
+            <a:r>
+              <a:rPr lang="en-US" sz="1200" dirty="0">
+                <a:solidFill>
+                  <a:schemeClr val="tx1"/>
+                </a:solidFill>
+                <a:latin typeface="Aeonik" panose="020B0503030300000000" pitchFamily="34" charset="0"/>
+                <a:cs typeface="Calibri" panose="020F0502020204030204" pitchFamily="34" charset="0"/>
+              </a:rPr>
+              <a:t>data block</a:t>
+            </a:r>
+          </a:p>
+        </p:txBody>
+      </p:sp>
+      <p:sp>
+        <p:nvSpPr>
+          <p:cNvPr id="20" name="Rectangle 19">
+            <a:extLst>
+              <a:ext uri="{FF2B5EF4-FFF2-40B4-BE49-F238E27FC236}">
+                <a16:creationId xmlns:a16="http://schemas.microsoft.com/office/drawing/2014/main" id="{8E616A00-C10B-457A-2ADD-A33349A77D8B}"/>
+              </a:ext>
+            </a:extLst>
+          </p:cNvPr>
+          <p:cNvSpPr/>
+          <p:nvPr/>
+        </p:nvSpPr>
+        <p:spPr>
+          <a:xfrm>
+            <a:off x="2339506" y="5126689"/>
+            <a:ext cx="956032" cy="201038"/>
+          </a:xfrm>
+          <a:prstGeom prst="rect">
+            <a:avLst/>
+          </a:prstGeom>
+          <a:solidFill>
+            <a:schemeClr val="bg1">
+              <a:lumMod val="75000"/>
+            </a:schemeClr>
+          </a:solidFill>
+          <a:ln w="15875">
+            <a:solidFill>
+              <a:srgbClr val="00C1DE"/>
+            </a:solidFill>
+          </a:ln>
+        </p:spPr>
+        <p:style>
+          <a:lnRef idx="2">
+            <a:schemeClr val="accent1">
+              <a:shade val="50000"/>
+            </a:schemeClr>
+          </a:lnRef>
+          <a:fillRef idx="1">
+            <a:schemeClr val="accent1"/>
+          </a:fillRef>
+          <a:effectRef idx="0">
+            <a:schemeClr val="accent1"/>
+          </a:effectRef>
+          <a:fontRef idx="minor">
+            <a:schemeClr val="lt1"/>
+          </a:fontRef>
+        </p:style>
+        <p:txBody>
+          <a:bodyPr rtlCol="0" anchor="ctr"/>
+          <a:lstStyle/>
+          <a:p>
+            <a:pPr algn="ctr" defTabSz="1219170" eaLnBrk="0" fontAlgn="base" hangingPunct="0">
+              <a:spcBef>
+                <a:spcPct val="0"/>
+              </a:spcBef>
+              <a:spcAft>
+                <a:spcPct val="0"/>
+              </a:spcAft>
+            </a:pPr>
+            <a:r>
+              <a:rPr lang="en-US" sz="1200" dirty="0">
+                <a:solidFill>
+                  <a:schemeClr val="tx1"/>
+                </a:solidFill>
+                <a:latin typeface="Aeonik" panose="020B0503030300000000" pitchFamily="34" charset="0"/>
+                <a:cs typeface="Calibri" panose="020F0502020204030204" pitchFamily="34" charset="0"/>
+              </a:rPr>
+              <a:t>timestamp</a:t>
+            </a:r>
+          </a:p>
+        </p:txBody>
+      </p:sp>
+      <p:sp>
+        <p:nvSpPr>
+          <p:cNvPr id="21" name="Rectangle 20">
+            <a:extLst>
+              <a:ext uri="{FF2B5EF4-FFF2-40B4-BE49-F238E27FC236}">
+                <a16:creationId xmlns:a16="http://schemas.microsoft.com/office/drawing/2014/main" id="{E8374B28-549A-2E7A-88EC-023C1831C96F}"/>
+              </a:ext>
+            </a:extLst>
+          </p:cNvPr>
+          <p:cNvSpPr/>
+          <p:nvPr/>
+        </p:nvSpPr>
+        <p:spPr>
+          <a:xfrm>
+            <a:off x="2339506" y="5327727"/>
+            <a:ext cx="956032" cy="201038"/>
+          </a:xfrm>
+          <a:prstGeom prst="rect">
+            <a:avLst/>
+          </a:prstGeom>
+          <a:solidFill>
+            <a:schemeClr val="bg1">
+              <a:lumMod val="75000"/>
+            </a:schemeClr>
+          </a:solidFill>
+          <a:ln w="15875">
+            <a:solidFill>
+              <a:srgbClr val="00C1DE"/>
+            </a:solidFill>
+          </a:ln>
+        </p:spPr>
+        <p:style>
+          <a:lnRef idx="2">
+            <a:schemeClr val="accent1">
+              <a:shade val="50000"/>
+            </a:schemeClr>
+          </a:lnRef>
+          <a:fillRef idx="1">
+            <a:schemeClr val="accent1"/>
+          </a:fillRef>
+          <a:effectRef idx="0">
+            <a:schemeClr val="accent1"/>
+          </a:effectRef>
+          <a:fontRef idx="minor">
+            <a:schemeClr val="lt1"/>
+          </a:fontRef>
+        </p:style>
+        <p:txBody>
+          <a:bodyPr rtlCol="0" anchor="ctr"/>
+          <a:lstStyle/>
+          <a:p>
+            <a:pPr algn="ctr" defTabSz="1219170" eaLnBrk="0" fontAlgn="base" hangingPunct="0">
+              <a:spcBef>
+                <a:spcPct val="0"/>
+              </a:spcBef>
+              <a:spcAft>
+                <a:spcPct val="0"/>
+              </a:spcAft>
+            </a:pPr>
+            <a:r>
+              <a:rPr lang="en-US" sz="1200" dirty="0">
+                <a:solidFill>
+                  <a:schemeClr val="tx1"/>
+                </a:solidFill>
+                <a:latin typeface="Aeonik" panose="020B0503030300000000" pitchFamily="34" charset="0"/>
+                <a:cs typeface="Calibri" panose="020F0502020204030204" pitchFamily="34" charset="0"/>
+              </a:rPr>
+              <a:t>block size</a:t>
+            </a:r>
+          </a:p>
+        </p:txBody>
+      </p:sp>
+      <p:cxnSp>
+        <p:nvCxnSpPr>
+          <p:cNvPr id="22" name="Straight Connector 21">
+            <a:extLst>
+              <a:ext uri="{FF2B5EF4-FFF2-40B4-BE49-F238E27FC236}">
+                <a16:creationId xmlns:a16="http://schemas.microsoft.com/office/drawing/2014/main" id="{72103992-B9A6-5F27-98F9-914D63613318}"/>
+              </a:ext>
+            </a:extLst>
+          </p:cNvPr>
+          <p:cNvCxnSpPr>
+            <a:cxnSpLocks/>
+          </p:cNvCxnSpPr>
+          <p:nvPr/>
+        </p:nvCxnSpPr>
+        <p:spPr>
+          <a:xfrm>
+            <a:off x="2339506" y="5528765"/>
+            <a:ext cx="0" cy="295072"/>
+          </a:xfrm>
+          <a:prstGeom prst="line">
+            <a:avLst/>
+          </a:prstGeom>
+          <a:solidFill>
+            <a:schemeClr val="bg1">
+              <a:lumMod val="95000"/>
+            </a:schemeClr>
+          </a:solidFill>
+          <a:ln w="15875">
+            <a:solidFill>
+              <a:srgbClr val="00C1DE"/>
+            </a:solidFill>
+            <a:prstDash val="dash"/>
+          </a:ln>
+        </p:spPr>
+        <p:style>
+          <a:lnRef idx="2">
+            <a:schemeClr val="accent1">
+              <a:shade val="50000"/>
+            </a:schemeClr>
+          </a:lnRef>
+          <a:fillRef idx="1">
+            <a:schemeClr val="accent1"/>
+          </a:fillRef>
+          <a:effectRef idx="0">
+            <a:schemeClr val="accent1"/>
+          </a:effectRef>
+          <a:fontRef idx="minor">
+            <a:schemeClr val="lt1"/>
+          </a:fontRef>
+        </p:style>
+      </p:cxnSp>
+      <p:cxnSp>
+        <p:nvCxnSpPr>
+          <p:cNvPr id="23" name="Straight Connector 22">
+            <a:extLst>
+              <a:ext uri="{FF2B5EF4-FFF2-40B4-BE49-F238E27FC236}">
+                <a16:creationId xmlns:a16="http://schemas.microsoft.com/office/drawing/2014/main" id="{BD5BF75B-75B0-A9D9-57E6-1ABC29B7115F}"/>
+              </a:ext>
+            </a:extLst>
+          </p:cNvPr>
+          <p:cNvCxnSpPr>
+            <a:cxnSpLocks/>
+          </p:cNvCxnSpPr>
+          <p:nvPr/>
+        </p:nvCxnSpPr>
+        <p:spPr>
+          <a:xfrm>
+            <a:off x="3295538" y="5528765"/>
+            <a:ext cx="0" cy="295072"/>
+          </a:xfrm>
+          <a:prstGeom prst="line">
+            <a:avLst/>
+          </a:prstGeom>
+          <a:solidFill>
+            <a:schemeClr val="bg1">
+              <a:lumMod val="95000"/>
+            </a:schemeClr>
+          </a:solidFill>
+          <a:ln w="15875">
+            <a:solidFill>
+              <a:srgbClr val="00C1DE"/>
+            </a:solidFill>
+            <a:prstDash val="dash"/>
+          </a:ln>
+        </p:spPr>
+        <p:style>
+          <a:lnRef idx="2">
+            <a:schemeClr val="accent1">
+              <a:shade val="50000"/>
+            </a:schemeClr>
+          </a:lnRef>
+          <a:fillRef idx="1">
+            <a:schemeClr val="accent1"/>
+          </a:fillRef>
+          <a:effectRef idx="0">
+            <a:schemeClr val="accent1"/>
+          </a:effectRef>
+          <a:fontRef idx="minor">
+            <a:schemeClr val="lt1"/>
+          </a:fontRef>
+        </p:style>
+      </p:cxnSp>
+      <p:sp>
+        <p:nvSpPr>
+          <p:cNvPr id="24" name="TextBox 23">
+            <a:extLst>
+              <a:ext uri="{FF2B5EF4-FFF2-40B4-BE49-F238E27FC236}">
+                <a16:creationId xmlns:a16="http://schemas.microsoft.com/office/drawing/2014/main" id="{3ED302BD-2E2C-7BE9-C366-022C280BCA31}"/>
+              </a:ext>
+            </a:extLst>
+          </p:cNvPr>
+          <p:cNvSpPr txBox="1"/>
+          <p:nvPr/>
+        </p:nvSpPr>
+        <p:spPr>
+          <a:xfrm>
+            <a:off x="2076630" y="2373884"/>
+            <a:ext cx="1572422" cy="142347"/>
+          </a:xfrm>
+          <a:prstGeom prst="rect">
+            <a:avLst/>
+          </a:prstGeom>
+          <a:noFill/>
+        </p:spPr>
+        <p:txBody>
+          <a:bodyPr wrap="square" lIns="0" tIns="0" rIns="0" bIns="0" rtlCol="0">
+            <a:spAutoFit/>
+          </a:bodyPr>
+          <a:lstStyle/>
+          <a:p>
+            <a:pPr marL="0" indent="0" algn="l" defTabSz="914400" rtl="0" eaLnBrk="1" latinLnBrk="0" hangingPunct="1">
+              <a:lnSpc>
+                <a:spcPct val="90000"/>
+              </a:lnSpc>
+              <a:spcBef>
+                <a:spcPts val="0"/>
+              </a:spcBef>
+              <a:spcAft>
+                <a:spcPts val="600"/>
+              </a:spcAft>
+              <a:buFont typeface="Arial" panose="020B0604020202020204" pitchFamily="34" charset="0"/>
+              <a:buNone/>
+            </a:pPr>
+            <a:r>
+              <a:rPr lang="en-US" sz="1000" b="1" dirty="0">
+                <a:solidFill>
+                  <a:schemeClr val="tx2"/>
+                </a:solidFill>
+                <a:latin typeface="Courier New" panose="02070309020205020404" pitchFamily="49" charset="0"/>
+                <a:cs typeface="Courier New" panose="02070309020205020404" pitchFamily="49" charset="0"/>
+              </a:rPr>
+              <a:t>SCinput.0+LabelA.sds</a:t>
+            </a:r>
+            <a:endParaRPr lang="en-US" sz="1000" b="1" kern="1200" dirty="0">
+              <a:solidFill>
+                <a:schemeClr val="tx2"/>
+              </a:solidFill>
+              <a:latin typeface="Courier New" panose="02070309020205020404" pitchFamily="49" charset="0"/>
+              <a:cs typeface="Courier New" panose="02070309020205020404" pitchFamily="49" charset="0"/>
+            </a:endParaRPr>
+          </a:p>
+        </p:txBody>
+      </p:sp>
+      <p:sp>
+        <p:nvSpPr>
+          <p:cNvPr id="25" name="TextBox 24">
+            <a:extLst>
+              <a:ext uri="{FF2B5EF4-FFF2-40B4-BE49-F238E27FC236}">
+                <a16:creationId xmlns:a16="http://schemas.microsoft.com/office/drawing/2014/main" id="{AEE0BC72-5746-E17C-0D41-9B7DEFEBDD96}"/>
+              </a:ext>
+            </a:extLst>
+          </p:cNvPr>
+          <p:cNvSpPr txBox="1"/>
+          <p:nvPr/>
+        </p:nvSpPr>
+        <p:spPr>
+          <a:xfrm>
+            <a:off x="2031311" y="4930601"/>
+            <a:ext cx="1572422" cy="142347"/>
+          </a:xfrm>
+          <a:prstGeom prst="rect">
+            <a:avLst/>
+          </a:prstGeom>
+          <a:noFill/>
+        </p:spPr>
+        <p:txBody>
+          <a:bodyPr wrap="square" lIns="0" tIns="0" rIns="0" bIns="0" rtlCol="0">
+            <a:spAutoFit/>
+          </a:bodyPr>
+          <a:lstStyle/>
+          <a:p>
+            <a:pPr marL="0" indent="0" algn="l" defTabSz="914400" rtl="0" eaLnBrk="1" latinLnBrk="0" hangingPunct="1">
+              <a:lnSpc>
+                <a:spcPct val="90000"/>
+              </a:lnSpc>
+              <a:spcBef>
+                <a:spcPts val="0"/>
+              </a:spcBef>
+              <a:spcAft>
+                <a:spcPts val="600"/>
+              </a:spcAft>
+              <a:buFont typeface="Arial" panose="020B0604020202020204" pitchFamily="34" charset="0"/>
+              <a:buNone/>
+            </a:pPr>
+            <a:r>
+              <a:rPr lang="en-US" sz="1000" b="1" dirty="0">
+                <a:solidFill>
+                  <a:schemeClr val="tx2"/>
+                </a:solidFill>
+                <a:latin typeface="Courier New" panose="02070309020205020404" pitchFamily="49" charset="0"/>
+                <a:cs typeface="Courier New" panose="02070309020205020404" pitchFamily="49" charset="0"/>
+              </a:rPr>
+              <a:t>SCinput.0+LabelB.sds</a:t>
+            </a:r>
+            <a:endParaRPr lang="en-US" sz="1000" b="1" kern="1200" dirty="0">
+              <a:solidFill>
+                <a:schemeClr val="tx2"/>
+              </a:solidFill>
+              <a:latin typeface="Courier New" panose="02070309020205020404" pitchFamily="49" charset="0"/>
+              <a:cs typeface="Courier New" panose="02070309020205020404" pitchFamily="49" charset="0"/>
+            </a:endParaRPr>
+          </a:p>
+        </p:txBody>
+      </p:sp>
+      <p:sp>
+        <p:nvSpPr>
+          <p:cNvPr id="27" name="TextBox 26">
+            <a:extLst>
+              <a:ext uri="{FF2B5EF4-FFF2-40B4-BE49-F238E27FC236}">
+                <a16:creationId xmlns:a16="http://schemas.microsoft.com/office/drawing/2014/main" id="{328A0765-0423-838E-2BB8-764205998CD4}"/>
+              </a:ext>
+            </a:extLst>
+          </p:cNvPr>
+          <p:cNvSpPr txBox="1"/>
+          <p:nvPr/>
+        </p:nvSpPr>
+        <p:spPr>
+          <a:xfrm>
+            <a:off x="4523578" y="2373884"/>
+            <a:ext cx="1572422" cy="142347"/>
+          </a:xfrm>
+          <a:prstGeom prst="rect">
+            <a:avLst/>
+          </a:prstGeom>
+          <a:noFill/>
+        </p:spPr>
+        <p:txBody>
+          <a:bodyPr wrap="square" lIns="0" tIns="0" rIns="0" bIns="0" rtlCol="0">
+            <a:spAutoFit/>
+          </a:bodyPr>
+          <a:lstStyle/>
+          <a:p>
+            <a:pPr marL="0" indent="0" algn="l" defTabSz="914400" rtl="0" eaLnBrk="1" latinLnBrk="0" hangingPunct="1">
+              <a:lnSpc>
+                <a:spcPct val="90000"/>
+              </a:lnSpc>
+              <a:spcBef>
+                <a:spcPts val="0"/>
+              </a:spcBef>
+              <a:spcAft>
+                <a:spcPts val="600"/>
+              </a:spcAft>
+              <a:buFont typeface="Arial" panose="020B0604020202020204" pitchFamily="34" charset="0"/>
+              <a:buNone/>
+            </a:pPr>
+            <a:r>
+              <a:rPr lang="en-US" sz="1000" b="1" dirty="0" err="1">
+                <a:solidFill>
+                  <a:schemeClr val="tx2"/>
+                </a:solidFill>
+                <a:latin typeface="Courier New" panose="02070309020205020404" pitchFamily="49" charset="0"/>
+                <a:cs typeface="Courier New" panose="02070309020205020404" pitchFamily="49" charset="0"/>
+              </a:rPr>
+              <a:t>sdsio.yml</a:t>
+            </a:r>
+            <a:endParaRPr lang="en-US" sz="1000" b="1" kern="1200" dirty="0">
+              <a:solidFill>
+                <a:schemeClr val="tx2"/>
+              </a:solidFill>
+              <a:latin typeface="Courier New" panose="02070309020205020404" pitchFamily="49" charset="0"/>
+              <a:cs typeface="Courier New" panose="02070309020205020404" pitchFamily="49" charset="0"/>
+            </a:endParaRPr>
+          </a:p>
+        </p:txBody>
+      </p:sp>
+      <p:sp>
+        <p:nvSpPr>
+          <p:cNvPr id="28" name="TextBox 27">
+            <a:extLst>
+              <a:ext uri="{FF2B5EF4-FFF2-40B4-BE49-F238E27FC236}">
+                <a16:creationId xmlns:a16="http://schemas.microsoft.com/office/drawing/2014/main" id="{CEC9E031-ABF2-D557-56FE-BCBD9F7B362A}"/>
+              </a:ext>
+            </a:extLst>
+          </p:cNvPr>
+          <p:cNvSpPr txBox="1"/>
+          <p:nvPr/>
+        </p:nvSpPr>
+        <p:spPr>
+          <a:xfrm>
+            <a:off x="4523578" y="2649447"/>
+            <a:ext cx="7188996" cy="2991588"/>
+          </a:xfrm>
+          <a:prstGeom prst="rect">
+            <a:avLst/>
+          </a:prstGeom>
+          <a:noFill/>
+        </p:spPr>
+        <p:txBody>
+          <a:bodyPr wrap="square" lIns="0" tIns="0" rIns="0" bIns="0" rtlCol="0">
+            <a:spAutoFit/>
+          </a:bodyPr>
+          <a:lstStyle/>
+          <a:p>
+            <a:r>
+              <a:rPr lang="en-US" sz="1200" dirty="0" err="1">
+                <a:latin typeface="Courier New" panose="02070309020205020404" pitchFamily="49" charset="0"/>
+                <a:cs typeface="Courier New" panose="02070309020205020404" pitchFamily="49" charset="0"/>
+              </a:rPr>
+              <a:t>dir</a:t>
+            </a:r>
+            <a:r>
+              <a:rPr lang="en-US" sz="1200" dirty="0">
+                <a:latin typeface="Courier New" panose="02070309020205020404" pitchFamily="49" charset="0"/>
+                <a:cs typeface="Courier New" panose="02070309020205020404" pitchFamily="49" charset="0"/>
+              </a:rPr>
+              <a:t>: &lt;name&gt;             # directory that stores SDS files</a:t>
+            </a:r>
+          </a:p>
+          <a:p>
+            <a:r>
+              <a:rPr lang="en-US" sz="1200" dirty="0" err="1">
+                <a:latin typeface="Courier New" panose="02070309020205020404" pitchFamily="49" charset="0"/>
+                <a:cs typeface="Courier New" panose="02070309020205020404" pitchFamily="49" charset="0"/>
+              </a:rPr>
+              <a:t>idx</a:t>
+            </a:r>
+            <a:r>
+              <a:rPr lang="en-US" sz="1200" dirty="0">
+                <a:latin typeface="Courier New" panose="02070309020205020404" pitchFamily="49" charset="0"/>
+                <a:cs typeface="Courier New" panose="02070309020205020404" pitchFamily="49" charset="0"/>
+              </a:rPr>
+              <a:t>-list:</a:t>
+            </a:r>
+          </a:p>
+          <a:p>
+            <a:r>
+              <a:rPr lang="en-US" sz="1200" dirty="0">
+                <a:latin typeface="Courier New" panose="02070309020205020404" pitchFamily="49" charset="0"/>
+                <a:cs typeface="Courier New" panose="02070309020205020404" pitchFamily="49" charset="0"/>
+              </a:rPr>
+              <a:t>  - Scinput.0+LabelA.sds</a:t>
+            </a:r>
+          </a:p>
+          <a:p>
+            <a:r>
+              <a:rPr lang="en-US" sz="1200" dirty="0">
+                <a:latin typeface="Courier New" panose="02070309020205020404" pitchFamily="49" charset="0"/>
+                <a:cs typeface="Courier New" panose="02070309020205020404" pitchFamily="49" charset="0"/>
+              </a:rPr>
+              <a:t>  - Scinput.0+LabelB.sds</a:t>
+            </a:r>
+          </a:p>
+          <a:p>
+            <a:endParaRPr lang="en-US" sz="1200" dirty="0">
+              <a:latin typeface="Courier New" panose="02070309020205020404" pitchFamily="49" charset="0"/>
+              <a:cs typeface="Courier New" panose="02070309020205020404" pitchFamily="49" charset="0"/>
+            </a:endParaRPr>
+          </a:p>
+          <a:p>
+            <a:r>
+              <a:rPr lang="en-US" sz="1200" dirty="0">
+                <a:latin typeface="Courier New" panose="02070309020205020404" pitchFamily="49" charset="0"/>
+                <a:cs typeface="Courier New" panose="02070309020205020404" pitchFamily="49" charset="0"/>
+              </a:rPr>
+              <a:t>streams:</a:t>
+            </a:r>
+          </a:p>
+          <a:p>
+            <a:r>
+              <a:rPr lang="en-US" sz="1200" dirty="0">
+                <a:latin typeface="Courier New" panose="02070309020205020404" pitchFamily="49" charset="0"/>
+                <a:cs typeface="Courier New" panose="02070309020205020404" pitchFamily="49" charset="0"/>
+              </a:rPr>
+              <a:t>  - stream: &lt;name0&gt;        # stream name used in </a:t>
+            </a:r>
+            <a:r>
+              <a:rPr lang="en-US" sz="1200" dirty="0" err="1">
+                <a:latin typeface="Courier New" panose="02070309020205020404" pitchFamily="49" charset="0"/>
+                <a:cs typeface="Courier New" panose="02070309020205020404" pitchFamily="49" charset="0"/>
+              </a:rPr>
+              <a:t>sdsPlayOpen</a:t>
+            </a:r>
+            <a:r>
+              <a:rPr lang="en-US" sz="1200" dirty="0">
+                <a:latin typeface="Courier New" panose="02070309020205020404" pitchFamily="49" charset="0"/>
+                <a:cs typeface="Courier New" panose="02070309020205020404" pitchFamily="49" charset="0"/>
+              </a:rPr>
+              <a:t>, </a:t>
+            </a:r>
+            <a:r>
+              <a:rPr lang="en-US" sz="1200" dirty="0" err="1">
+                <a:latin typeface="Courier New" panose="02070309020205020404" pitchFamily="49" charset="0"/>
+                <a:cs typeface="Courier New" panose="02070309020205020404" pitchFamily="49" charset="0"/>
+              </a:rPr>
+              <a:t>sdsRecOpen</a:t>
+            </a:r>
+            <a:endParaRPr lang="en-US" sz="1200" dirty="0">
+              <a:latin typeface="Courier New" panose="02070309020205020404" pitchFamily="49" charset="0"/>
+              <a:cs typeface="Courier New" panose="02070309020205020404" pitchFamily="49" charset="0"/>
+            </a:endParaRPr>
+          </a:p>
+          <a:p>
+            <a:r>
+              <a:rPr lang="en-US" sz="1200" dirty="0">
+                <a:latin typeface="Courier New" panose="02070309020205020404" pitchFamily="49" charset="0"/>
+                <a:cs typeface="Courier New" panose="02070309020205020404" pitchFamily="49" charset="0"/>
+              </a:rPr>
+              <a:t>    </a:t>
+            </a:r>
+            <a:r>
+              <a:rPr lang="en-US" sz="1200" dirty="0" err="1">
+                <a:latin typeface="Courier New" panose="02070309020205020404" pitchFamily="49" charset="0"/>
+                <a:cs typeface="Courier New" panose="02070309020205020404" pitchFamily="49" charset="0"/>
+              </a:rPr>
+              <a:t>basefile</a:t>
+            </a:r>
+            <a:r>
+              <a:rPr lang="en-US" sz="1200" dirty="0">
+                <a:latin typeface="Courier New" panose="02070309020205020404" pitchFamily="49" charset="0"/>
+                <a:cs typeface="Courier New" panose="02070309020205020404" pitchFamily="49" charset="0"/>
+              </a:rPr>
+              <a:t>: &lt;name0&gt;      # alternative base file name for this stream (default is stream name)</a:t>
+            </a:r>
+          </a:p>
+          <a:p>
+            <a:r>
+              <a:rPr lang="en-US" sz="1200" dirty="0">
+                <a:latin typeface="Courier New" panose="02070309020205020404" pitchFamily="49" charset="0"/>
+                <a:cs typeface="Courier New" panose="02070309020205020404" pitchFamily="49" charset="0"/>
+              </a:rPr>
+              <a:t>    </a:t>
+            </a:r>
+            <a:r>
+              <a:rPr lang="en-US" sz="1200" dirty="0" err="1">
+                <a:latin typeface="Courier New" panose="02070309020205020404" pitchFamily="49" charset="0"/>
+                <a:cs typeface="Courier New" panose="02070309020205020404" pitchFamily="49" charset="0"/>
+              </a:rPr>
+              <a:t>dir</a:t>
+            </a:r>
+            <a:r>
+              <a:rPr lang="en-US" sz="1200" dirty="0">
+                <a:latin typeface="Courier New" panose="02070309020205020404" pitchFamily="49" charset="0"/>
+                <a:cs typeface="Courier New" panose="02070309020205020404" pitchFamily="49" charset="0"/>
+              </a:rPr>
+              <a:t>: &lt;name0&gt;              # alternative working directory for this stream (default is </a:t>
+            </a:r>
+            <a:r>
+              <a:rPr lang="en-US" sz="1200" dirty="0" err="1">
+                <a:latin typeface="Courier New" panose="02070309020205020404" pitchFamily="49" charset="0"/>
+                <a:cs typeface="Courier New" panose="02070309020205020404" pitchFamily="49" charset="0"/>
+              </a:rPr>
+              <a:t>workdir</a:t>
+            </a:r>
+            <a:r>
+              <a:rPr lang="en-US" sz="1200" dirty="0">
+                <a:latin typeface="Courier New" panose="02070309020205020404" pitchFamily="49" charset="0"/>
+                <a:cs typeface="Courier New" panose="02070309020205020404" pitchFamily="49" charset="0"/>
+              </a:rPr>
+              <a:t>)</a:t>
+            </a:r>
+          </a:p>
+          <a:p>
+            <a:endParaRPr lang="en-US" sz="1200" dirty="0">
+              <a:latin typeface="Courier New" panose="02070309020205020404" pitchFamily="49" charset="0"/>
+              <a:cs typeface="Courier New" panose="02070309020205020404" pitchFamily="49" charset="0"/>
+            </a:endParaRPr>
+          </a:p>
+          <a:p>
+            <a:r>
+              <a:rPr lang="en-US" sz="1200" dirty="0">
+                <a:latin typeface="Courier New" panose="02070309020205020404" pitchFamily="49" charset="0"/>
+                <a:cs typeface="Courier New" panose="02070309020205020404" pitchFamily="49" charset="0"/>
+              </a:rPr>
+              <a:t>  - stream: &lt;name1&gt;</a:t>
+            </a:r>
+          </a:p>
+          <a:p>
+            <a:r>
+              <a:rPr lang="en-US" sz="1200" dirty="0">
+                <a:latin typeface="Courier New" panose="02070309020205020404" pitchFamily="49" charset="0"/>
+                <a:cs typeface="Courier New" panose="02070309020205020404" pitchFamily="49" charset="0"/>
+              </a:rPr>
+              <a:t>    </a:t>
+            </a:r>
+            <a:r>
+              <a:rPr lang="en-US" sz="1200" dirty="0" err="1">
+                <a:latin typeface="Courier New" panose="02070309020205020404" pitchFamily="49" charset="0"/>
+                <a:cs typeface="Courier New" panose="02070309020205020404" pitchFamily="49" charset="0"/>
+              </a:rPr>
+              <a:t>basefile</a:t>
+            </a:r>
+            <a:r>
+              <a:rPr lang="en-US" sz="1200" dirty="0">
+                <a:latin typeface="Courier New" panose="02070309020205020404" pitchFamily="49" charset="0"/>
+                <a:cs typeface="Courier New" panose="02070309020205020404" pitchFamily="49" charset="0"/>
+              </a:rPr>
+              <a:t>: &lt;name1&gt;</a:t>
+            </a:r>
+          </a:p>
+          <a:p>
+            <a:r>
+              <a:rPr lang="en-US" sz="1200" dirty="0">
+                <a:latin typeface="Courier New" panose="02070309020205020404" pitchFamily="49" charset="0"/>
+                <a:cs typeface="Courier New" panose="02070309020205020404" pitchFamily="49" charset="0"/>
+              </a:rPr>
+              <a:t>    </a:t>
+            </a:r>
+            <a:r>
+              <a:rPr lang="en-US" sz="1200" dirty="0" err="1">
+                <a:latin typeface="Courier New" panose="02070309020205020404" pitchFamily="49" charset="0"/>
+                <a:cs typeface="Courier New" panose="02070309020205020404" pitchFamily="49" charset="0"/>
+              </a:rPr>
+              <a:t>dir</a:t>
+            </a:r>
+            <a:r>
+              <a:rPr lang="en-US" sz="1200" dirty="0">
+                <a:latin typeface="Courier New" panose="02070309020205020404" pitchFamily="49" charset="0"/>
+                <a:cs typeface="Courier New" panose="02070309020205020404" pitchFamily="49" charset="0"/>
+              </a:rPr>
+              <a:t>: &lt;name1&gt;</a:t>
+            </a:r>
+          </a:p>
+          <a:p>
+            <a:pPr marL="0" indent="0" algn="l" defTabSz="914400" rtl="0" eaLnBrk="1" latinLnBrk="0" hangingPunct="1">
+              <a:lnSpc>
+                <a:spcPct val="90000"/>
+              </a:lnSpc>
+              <a:spcBef>
+                <a:spcPts val="0"/>
+              </a:spcBef>
+              <a:spcAft>
+                <a:spcPts val="600"/>
+              </a:spcAft>
+              <a:buFont typeface="Arial" panose="020B0604020202020204" pitchFamily="34" charset="0"/>
+              <a:buNone/>
+            </a:pPr>
+            <a:endParaRPr lang="en-US" sz="1600" kern="1200" dirty="0" err="1">
+              <a:solidFill>
+                <a:schemeClr val="tx2"/>
+              </a:solidFill>
+              <a:latin typeface="+mn-lt"/>
+              <a:ea typeface="+mn-ea"/>
+              <a:cs typeface="+mn-cs"/>
+            </a:endParaRPr>
+          </a:p>
+        </p:txBody>
+      </p:sp>
+    </p:spTree>
+    <p:extLst>
+      <p:ext uri="{BB962C8B-B14F-4D97-AF65-F5344CB8AC3E}">
+        <p14:creationId xmlns:p14="http://schemas.microsoft.com/office/powerpoint/2010/main" val="603356367"/>
+      </p:ext>
+    </p:extLst>
+  </p:cSld>
+  <p:clrMapOvr>
+    <a:masterClrMapping/>
+  </p:clrMapOvr>
+</p:sld>
+</file>
+
+<file path=ppt/slides/slide8.xml><?xml version="1.0" encoding="utf-8"?>
+<p:sld xmlns:a="http://schemas.openxmlformats.org/drawingml/2006/main" xmlns:r="http://schemas.openxmlformats.org/officeDocument/2006/relationships" xmlns:p="http://schemas.openxmlformats.org/presentationml/2006/main">
+  <p:cSld>
+    <p:spTree>
+      <p:nvGrpSpPr>
+        <p:cNvPr id="1" name=""/>
+        <p:cNvGrpSpPr/>
+        <p:nvPr/>
+      </p:nvGrpSpPr>
+      <p:grpSpPr>
+        <a:xfrm>
+          <a:off x="0" y="0"/>
+          <a:ext cx="0" cy="0"/>
+          <a:chOff x="0" y="0"/>
+          <a:chExt cx="0" cy="0"/>
+        </a:xfrm>
+      </p:grpSpPr>
+      <p:sp>
+        <p:nvSpPr>
           <p:cNvPr id="34" name="Rectangle 33">
             <a:extLst>
               <a:ext uri="{FF2B5EF4-FFF2-40B4-BE49-F238E27FC236}">
@@ -52645,7 +55463,7 @@
 </p:sld>
 </file>
 
-<file path=ppt/slides/slide8.xml><?xml version="1.0" encoding="utf-8"?>
+<file path=ppt/slides/slide9.xml><?xml version="1.0" encoding="utf-8"?>
 <p:sld xmlns:a="http://schemas.openxmlformats.org/drawingml/2006/main" xmlns:r="http://schemas.openxmlformats.org/officeDocument/2006/relationships" xmlns:p="http://schemas.openxmlformats.org/presentationml/2006/main">
   <p:cSld>
     <p:spTree>
@@ -53747,893 +56565,6 @@
     <p:extLst>
       <p:ext uri="{BB962C8B-B14F-4D97-AF65-F5344CB8AC3E}">
         <p14:creationId xmlns:p14="http://schemas.microsoft.com/office/powerpoint/2010/main" val="1850966349"/>
-      </p:ext>
-    </p:extLst>
-  </p:cSld>
-  <p:clrMapOvr>
-    <a:masterClrMapping/>
-  </p:clrMapOvr>
-</p:sld>
-</file>
-
-<file path=ppt/slides/slide9.xml><?xml version="1.0" encoding="utf-8"?>
-<p:sld xmlns:a="http://schemas.openxmlformats.org/drawingml/2006/main" xmlns:r="http://schemas.openxmlformats.org/officeDocument/2006/relationships" xmlns:p="http://schemas.openxmlformats.org/presentationml/2006/main">
-  <p:cSld>
-    <p:spTree>
-      <p:nvGrpSpPr>
-        <p:cNvPr id="1" name=""/>
-        <p:cNvGrpSpPr/>
-        <p:nvPr/>
-      </p:nvGrpSpPr>
-      <p:grpSpPr>
-        <a:xfrm>
-          <a:off x="0" y="0"/>
-          <a:ext cx="0" cy="0"/>
-          <a:chOff x="0" y="0"/>
-          <a:chExt cx="0" cy="0"/>
-        </a:xfrm>
-      </p:grpSpPr>
-      <p:sp>
-        <p:nvSpPr>
-          <p:cNvPr id="2" name="Title 1">
-            <a:extLst>
-              <a:ext uri="{FF2B5EF4-FFF2-40B4-BE49-F238E27FC236}">
-                <a16:creationId xmlns:a16="http://schemas.microsoft.com/office/drawing/2014/main" id="{BFBCA5D4-C7CF-56B7-4D26-1D3745C85A28}"/>
-              </a:ext>
-            </a:extLst>
-          </p:cNvPr>
-          <p:cNvSpPr>
-            <a:spLocks noGrp="1"/>
-          </p:cNvSpPr>
-          <p:nvPr>
-            <p:ph type="title"/>
-          </p:nvPr>
-        </p:nvSpPr>
-        <p:spPr/>
-        <p:txBody>
-          <a:bodyPr/>
-          <a:lstStyle/>
-          <a:p>
-            <a:r>
-              <a:rPr lang="en-US"/>
-              <a:t>SDS Recorder </a:t>
-            </a:r>
-            <a:r>
-              <a:rPr lang="en-US">
-                <a:hlinkClick r:id="rId2"/>
-              </a:rPr>
-              <a:t>https://github.com/Arm-Examples/sds-examples</a:t>
-            </a:r>
-            <a:br>
-              <a:rPr lang="en-US"/>
-            </a:br>
-            <a:endParaRPr lang="en-US"/>
-          </a:p>
-        </p:txBody>
-      </p:sp>
-      <p:sp>
-        <p:nvSpPr>
-          <p:cNvPr id="4" name="Rectangle 3">
-            <a:extLst>
-              <a:ext uri="{FF2B5EF4-FFF2-40B4-BE49-F238E27FC236}">
-                <a16:creationId xmlns:a16="http://schemas.microsoft.com/office/drawing/2014/main" id="{268F30E4-EF9A-1A51-E8F1-2E8F1385FA61}"/>
-              </a:ext>
-            </a:extLst>
-          </p:cNvPr>
-          <p:cNvSpPr/>
-          <p:nvPr/>
-        </p:nvSpPr>
-        <p:spPr>
-          <a:xfrm>
-            <a:off x="627993" y="1411454"/>
-            <a:ext cx="4452085" cy="653684"/>
-          </a:xfrm>
-          <a:prstGeom prst="rect">
-            <a:avLst/>
-          </a:prstGeom>
-          <a:solidFill>
-            <a:schemeClr val="accent6">
-              <a:lumMod val="75000"/>
-            </a:schemeClr>
-          </a:solidFill>
-          <a:ln>
-            <a:noFill/>
-          </a:ln>
-        </p:spPr>
-        <p:style>
-          <a:lnRef idx="2">
-            <a:schemeClr val="accent1">
-              <a:shade val="50000"/>
-            </a:schemeClr>
-          </a:lnRef>
-          <a:fillRef idx="1">
-            <a:schemeClr val="accent1"/>
-          </a:fillRef>
-          <a:effectRef idx="0">
-            <a:schemeClr val="accent1"/>
-          </a:effectRef>
-          <a:fontRef idx="minor">
-            <a:schemeClr val="lt1"/>
-          </a:fontRef>
-        </p:style>
-        <p:txBody>
-          <a:bodyPr rtlCol="0" anchor="ctr"/>
-          <a:lstStyle/>
-          <a:p>
-            <a:pPr algn="ctr"/>
-            <a:r>
-              <a:rPr lang="en-US" sz="1600" b="1" dirty="0" err="1"/>
-              <a:t>SDS.csolution.yml</a:t>
-            </a:r>
-            <a:br>
-              <a:rPr lang="en-US" sz="1400" dirty="0"/>
-            </a:br>
-            <a:r>
-              <a:rPr lang="en-US" sz="1400" dirty="0"/>
-              <a:t>Data streaming test framework for DSP and </a:t>
-            </a:r>
-            <a:r>
-              <a:rPr lang="en-US" sz="1400"/>
-              <a:t>ML algorithms</a:t>
-            </a:r>
-            <a:endParaRPr lang="en-US" sz="1100" dirty="0"/>
-          </a:p>
-        </p:txBody>
-      </p:sp>
-      <p:sp>
-        <p:nvSpPr>
-          <p:cNvPr id="8" name="Rectangle 7">
-            <a:extLst>
-              <a:ext uri="{FF2B5EF4-FFF2-40B4-BE49-F238E27FC236}">
-                <a16:creationId xmlns:a16="http://schemas.microsoft.com/office/drawing/2014/main" id="{CE3974E6-B40A-AB0A-DFDB-B964F9612AEA}"/>
-              </a:ext>
-            </a:extLst>
-          </p:cNvPr>
-          <p:cNvSpPr/>
-          <p:nvPr/>
-        </p:nvSpPr>
-        <p:spPr>
-          <a:xfrm>
-            <a:off x="2942715" y="3519273"/>
-            <a:ext cx="2128632" cy="653684"/>
-          </a:xfrm>
-          <a:prstGeom prst="rect">
-            <a:avLst/>
-          </a:prstGeom>
-          <a:solidFill>
-            <a:schemeClr val="accent1"/>
-          </a:solidFill>
-          <a:ln>
-            <a:noFill/>
-          </a:ln>
-        </p:spPr>
-        <p:style>
-          <a:lnRef idx="2">
-            <a:schemeClr val="accent1">
-              <a:shade val="50000"/>
-            </a:schemeClr>
-          </a:lnRef>
-          <a:fillRef idx="1">
-            <a:schemeClr val="accent1"/>
-          </a:fillRef>
-          <a:effectRef idx="0">
-            <a:schemeClr val="accent1"/>
-          </a:effectRef>
-          <a:fontRef idx="minor">
-            <a:schemeClr val="lt1"/>
-          </a:fontRef>
-        </p:style>
-        <p:txBody>
-          <a:bodyPr rtlCol="0" anchor="ctr"/>
-          <a:lstStyle/>
-          <a:p>
-            <a:pPr algn="ctr"/>
-            <a:r>
-              <a:rPr lang="en-US" sz="1100" dirty="0"/>
-              <a:t>Record/Playback </a:t>
-            </a:r>
-            <a:br>
-              <a:rPr lang="en-US" sz="1100" dirty="0"/>
-            </a:br>
-            <a:r>
-              <a:rPr lang="en-US" sz="1100" dirty="0"/>
-              <a:t>SDS Data Files via</a:t>
-            </a:r>
-            <a:br>
-              <a:rPr lang="en-US" sz="1100" dirty="0"/>
-            </a:br>
-            <a:r>
-              <a:rPr lang="en-US" sz="1100" dirty="0"/>
-              <a:t>Network, USB, File System</a:t>
-            </a:r>
-            <a:endParaRPr lang="en-US" sz="1050" dirty="0"/>
-          </a:p>
-        </p:txBody>
-      </p:sp>
-      <p:sp>
-        <p:nvSpPr>
-          <p:cNvPr id="10" name="Rectangle 9">
-            <a:extLst>
-              <a:ext uri="{FF2B5EF4-FFF2-40B4-BE49-F238E27FC236}">
-                <a16:creationId xmlns:a16="http://schemas.microsoft.com/office/drawing/2014/main" id="{CEE742C1-9B27-441A-6C29-20D13149B32F}"/>
-              </a:ext>
-            </a:extLst>
-          </p:cNvPr>
-          <p:cNvSpPr/>
-          <p:nvPr/>
-        </p:nvSpPr>
-        <p:spPr>
-          <a:xfrm>
-            <a:off x="2942715" y="3255090"/>
-            <a:ext cx="2128632" cy="264183"/>
-          </a:xfrm>
-          <a:prstGeom prst="rect">
-            <a:avLst/>
-          </a:prstGeom>
-          <a:solidFill>
-            <a:schemeClr val="accent1">
-              <a:lumMod val="75000"/>
-            </a:schemeClr>
-          </a:solidFill>
-          <a:ln>
-            <a:noFill/>
-          </a:ln>
-        </p:spPr>
-        <p:style>
-          <a:lnRef idx="2">
-            <a:schemeClr val="accent1">
-              <a:shade val="50000"/>
-            </a:schemeClr>
-          </a:lnRef>
-          <a:fillRef idx="1">
-            <a:schemeClr val="accent1"/>
-          </a:fillRef>
-          <a:effectRef idx="0">
-            <a:schemeClr val="accent1"/>
-          </a:effectRef>
-          <a:fontRef idx="minor">
-            <a:schemeClr val="lt1"/>
-          </a:fontRef>
-        </p:style>
-        <p:txBody>
-          <a:bodyPr rtlCol="0" anchor="ctr"/>
-          <a:lstStyle/>
-          <a:p>
-            <a:pPr algn="ctr"/>
-            <a:r>
-              <a:rPr lang="en-US" sz="1400" dirty="0"/>
-              <a:t> Layer Type: SDSIO</a:t>
-            </a:r>
-          </a:p>
-        </p:txBody>
-      </p:sp>
-      <p:sp>
-        <p:nvSpPr>
-          <p:cNvPr id="16" name="Rectangle 15">
-            <a:extLst>
-              <a:ext uri="{FF2B5EF4-FFF2-40B4-BE49-F238E27FC236}">
-                <a16:creationId xmlns:a16="http://schemas.microsoft.com/office/drawing/2014/main" id="{8C61B6A3-A1BE-4248-57B1-609E5F0E8AAB}"/>
-              </a:ext>
-            </a:extLst>
-          </p:cNvPr>
-          <p:cNvSpPr/>
-          <p:nvPr/>
-        </p:nvSpPr>
-        <p:spPr>
-          <a:xfrm>
-            <a:off x="627994" y="3519273"/>
-            <a:ext cx="2128632" cy="653684"/>
-          </a:xfrm>
-          <a:prstGeom prst="rect">
-            <a:avLst/>
-          </a:prstGeom>
-          <a:solidFill>
-            <a:schemeClr val="accent1"/>
-          </a:solidFill>
-          <a:ln>
-            <a:noFill/>
-          </a:ln>
-        </p:spPr>
-        <p:style>
-          <a:lnRef idx="2">
-            <a:schemeClr val="accent1">
-              <a:shade val="50000"/>
-            </a:schemeClr>
-          </a:lnRef>
-          <a:fillRef idx="1">
-            <a:schemeClr val="accent1"/>
-          </a:fillRef>
-          <a:effectRef idx="0">
-            <a:schemeClr val="accent1"/>
-          </a:effectRef>
-          <a:fontRef idx="minor">
-            <a:schemeClr val="lt1"/>
-          </a:fontRef>
-        </p:style>
-        <p:txBody>
-          <a:bodyPr rtlCol="0" anchor="ctr"/>
-          <a:lstStyle/>
-          <a:p>
-            <a:pPr algn="ctr"/>
-            <a:r>
-              <a:rPr lang="en-US" sz="1100" dirty="0"/>
-              <a:t>Board Hardware Interface</a:t>
-            </a:r>
-            <a:br>
-              <a:rPr lang="en-US" sz="1100" dirty="0"/>
-            </a:br>
-            <a:r>
-              <a:rPr lang="en-US" sz="1100" dirty="0"/>
-              <a:t>Provided in BSP</a:t>
-            </a:r>
-            <a:endParaRPr lang="en-US" sz="1050" dirty="0"/>
-          </a:p>
-        </p:txBody>
-      </p:sp>
-      <p:sp>
-        <p:nvSpPr>
-          <p:cNvPr id="17" name="Rectangle 16">
-            <a:extLst>
-              <a:ext uri="{FF2B5EF4-FFF2-40B4-BE49-F238E27FC236}">
-                <a16:creationId xmlns:a16="http://schemas.microsoft.com/office/drawing/2014/main" id="{4DB6B1BC-4815-896E-9392-B226B5A4C231}"/>
-              </a:ext>
-            </a:extLst>
-          </p:cNvPr>
-          <p:cNvSpPr/>
-          <p:nvPr/>
-        </p:nvSpPr>
-        <p:spPr>
-          <a:xfrm>
-            <a:off x="627994" y="3255090"/>
-            <a:ext cx="2128632" cy="264183"/>
-          </a:xfrm>
-          <a:prstGeom prst="rect">
-            <a:avLst/>
-          </a:prstGeom>
-          <a:solidFill>
-            <a:schemeClr val="accent1">
-              <a:lumMod val="75000"/>
-            </a:schemeClr>
-          </a:solidFill>
-          <a:ln>
-            <a:noFill/>
-          </a:ln>
-        </p:spPr>
-        <p:style>
-          <a:lnRef idx="2">
-            <a:schemeClr val="accent1">
-              <a:shade val="50000"/>
-            </a:schemeClr>
-          </a:lnRef>
-          <a:fillRef idx="1">
-            <a:schemeClr val="accent1"/>
-          </a:fillRef>
-          <a:effectRef idx="0">
-            <a:schemeClr val="accent1"/>
-          </a:effectRef>
-          <a:fontRef idx="minor">
-            <a:schemeClr val="lt1"/>
-          </a:fontRef>
-        </p:style>
-        <p:txBody>
-          <a:bodyPr rtlCol="0" anchor="ctr"/>
-          <a:lstStyle/>
-          <a:p>
-            <a:pPr algn="ctr"/>
-            <a:r>
-              <a:rPr lang="en-US" sz="1400" dirty="0"/>
-              <a:t> Layer Type: Board</a:t>
-            </a:r>
-          </a:p>
-        </p:txBody>
-      </p:sp>
-      <p:sp>
-        <p:nvSpPr>
-          <p:cNvPr id="3" name="Rectangle 2">
-            <a:extLst>
-              <a:ext uri="{FF2B5EF4-FFF2-40B4-BE49-F238E27FC236}">
-                <a16:creationId xmlns:a16="http://schemas.microsoft.com/office/drawing/2014/main" id="{981466B6-29ED-CB94-AF4F-BC970DB65D25}"/>
-              </a:ext>
-            </a:extLst>
-          </p:cNvPr>
-          <p:cNvSpPr/>
-          <p:nvPr/>
-        </p:nvSpPr>
-        <p:spPr>
-          <a:xfrm>
-            <a:off x="627994" y="2460256"/>
-            <a:ext cx="2128632" cy="653684"/>
-          </a:xfrm>
-          <a:prstGeom prst="rect">
-            <a:avLst/>
-          </a:prstGeom>
-          <a:solidFill>
-            <a:schemeClr val="accent4">
-              <a:lumMod val="75000"/>
-            </a:schemeClr>
-          </a:solidFill>
-          <a:ln>
-            <a:noFill/>
-          </a:ln>
-        </p:spPr>
-        <p:style>
-          <a:lnRef idx="2">
-            <a:schemeClr val="accent1">
-              <a:shade val="50000"/>
-            </a:schemeClr>
-          </a:lnRef>
-          <a:fillRef idx="1">
-            <a:schemeClr val="accent1"/>
-          </a:fillRef>
-          <a:effectRef idx="0">
-            <a:schemeClr val="accent1"/>
-          </a:effectRef>
-          <a:fontRef idx="minor">
-            <a:schemeClr val="lt1"/>
-          </a:fontRef>
-        </p:style>
-        <p:txBody>
-          <a:bodyPr rtlCol="0" anchor="ctr"/>
-          <a:lstStyle/>
-          <a:p>
-            <a:pPr algn="ctr"/>
-            <a:r>
-              <a:rPr lang="en-US" sz="1100" dirty="0"/>
-              <a:t>Check SDSIO interface with</a:t>
-            </a:r>
-            <a:br>
-              <a:rPr lang="en-US" sz="1100" dirty="0"/>
-            </a:br>
-            <a:r>
-              <a:rPr lang="en-US" sz="1100" dirty="0"/>
-              <a:t>user configurable bandwidth parameters</a:t>
-            </a:r>
-            <a:endParaRPr lang="en-US" sz="1050" dirty="0"/>
-          </a:p>
-        </p:txBody>
-      </p:sp>
-      <p:sp>
-        <p:nvSpPr>
-          <p:cNvPr id="5" name="Rectangle 4">
-            <a:extLst>
-              <a:ext uri="{FF2B5EF4-FFF2-40B4-BE49-F238E27FC236}">
-                <a16:creationId xmlns:a16="http://schemas.microsoft.com/office/drawing/2014/main" id="{006CFF1E-7F8E-879E-76E9-6194FE53B86C}"/>
-              </a:ext>
-            </a:extLst>
-          </p:cNvPr>
-          <p:cNvSpPr/>
-          <p:nvPr/>
-        </p:nvSpPr>
-        <p:spPr>
-          <a:xfrm>
-            <a:off x="627994" y="2196073"/>
-            <a:ext cx="2128632" cy="264183"/>
-          </a:xfrm>
-          <a:prstGeom prst="rect">
-            <a:avLst/>
-          </a:prstGeom>
-          <a:solidFill>
-            <a:schemeClr val="accent4">
-              <a:lumMod val="50000"/>
-            </a:schemeClr>
-          </a:solidFill>
-          <a:ln>
-            <a:noFill/>
-          </a:ln>
-        </p:spPr>
-        <p:style>
-          <a:lnRef idx="2">
-            <a:schemeClr val="accent1">
-              <a:shade val="50000"/>
-            </a:schemeClr>
-          </a:lnRef>
-          <a:fillRef idx="1">
-            <a:schemeClr val="accent1"/>
-          </a:fillRef>
-          <a:effectRef idx="0">
-            <a:schemeClr val="accent1"/>
-          </a:effectRef>
-          <a:fontRef idx="minor">
-            <a:schemeClr val="lt1"/>
-          </a:fontRef>
-        </p:style>
-        <p:txBody>
-          <a:bodyPr rtlCol="0" anchor="ctr"/>
-          <a:lstStyle/>
-          <a:p>
-            <a:pPr algn="ctr"/>
-            <a:r>
-              <a:rPr lang="en-US" sz="1400" dirty="0" err="1"/>
-              <a:t>DataTest.cproject.yml</a:t>
-            </a:r>
-            <a:endParaRPr lang="en-US" sz="1400" dirty="0"/>
-          </a:p>
-        </p:txBody>
-      </p:sp>
-      <p:sp>
-        <p:nvSpPr>
-          <p:cNvPr id="6" name="Rectangle 5">
-            <a:extLst>
-              <a:ext uri="{FF2B5EF4-FFF2-40B4-BE49-F238E27FC236}">
-                <a16:creationId xmlns:a16="http://schemas.microsoft.com/office/drawing/2014/main" id="{E094A49A-EC2D-EEEF-132A-B6D2A8111BED}"/>
-              </a:ext>
-            </a:extLst>
-          </p:cNvPr>
-          <p:cNvSpPr/>
-          <p:nvPr/>
-        </p:nvSpPr>
-        <p:spPr>
-          <a:xfrm>
-            <a:off x="2942715" y="2460256"/>
-            <a:ext cx="2128632" cy="653684"/>
-          </a:xfrm>
-          <a:prstGeom prst="rect">
-            <a:avLst/>
-          </a:prstGeom>
-          <a:solidFill>
-            <a:schemeClr val="accent4">
-              <a:lumMod val="75000"/>
-            </a:schemeClr>
-          </a:solidFill>
-          <a:ln>
-            <a:noFill/>
-          </a:ln>
-        </p:spPr>
-        <p:style>
-          <a:lnRef idx="2">
-            <a:schemeClr val="accent1">
-              <a:shade val="50000"/>
-            </a:schemeClr>
-          </a:lnRef>
-          <a:fillRef idx="1">
-            <a:schemeClr val="accent1"/>
-          </a:fillRef>
-          <a:effectRef idx="0">
-            <a:schemeClr val="accent1"/>
-          </a:effectRef>
-          <a:fontRef idx="minor">
-            <a:schemeClr val="lt1"/>
-          </a:fontRef>
-        </p:style>
-        <p:txBody>
-          <a:bodyPr rtlCol="0" anchor="ctr"/>
-          <a:lstStyle/>
-          <a:p>
-            <a:pPr algn="ctr"/>
-            <a:r>
-              <a:rPr lang="en-US" sz="1100" dirty="0"/>
-              <a:t>Verify and optimized</a:t>
-            </a:r>
-            <a:br>
-              <a:rPr lang="en-US" sz="1100" dirty="0"/>
-            </a:br>
-            <a:r>
-              <a:rPr lang="en-US" sz="1100" dirty="0"/>
-              <a:t>user algorithms</a:t>
-            </a:r>
-            <a:br>
-              <a:rPr lang="en-US" sz="1100" dirty="0"/>
-            </a:br>
-            <a:r>
-              <a:rPr lang="en-US" sz="1100" dirty="0"/>
-              <a:t>with repeatable data</a:t>
-            </a:r>
-            <a:endParaRPr lang="en-US" sz="1050" dirty="0"/>
-          </a:p>
-        </p:txBody>
-      </p:sp>
-      <p:sp>
-        <p:nvSpPr>
-          <p:cNvPr id="7" name="Rectangle 6">
-            <a:extLst>
-              <a:ext uri="{FF2B5EF4-FFF2-40B4-BE49-F238E27FC236}">
-                <a16:creationId xmlns:a16="http://schemas.microsoft.com/office/drawing/2014/main" id="{02192468-F815-85E7-1987-BD05F8475585}"/>
-              </a:ext>
-            </a:extLst>
-          </p:cNvPr>
-          <p:cNvSpPr/>
-          <p:nvPr/>
-        </p:nvSpPr>
-        <p:spPr>
-          <a:xfrm>
-            <a:off x="2942715" y="2196073"/>
-            <a:ext cx="2128632" cy="264183"/>
-          </a:xfrm>
-          <a:prstGeom prst="rect">
-            <a:avLst/>
-          </a:prstGeom>
-          <a:solidFill>
-            <a:schemeClr val="accent4">
-              <a:lumMod val="50000"/>
-            </a:schemeClr>
-          </a:solidFill>
-          <a:ln>
-            <a:noFill/>
-          </a:ln>
-        </p:spPr>
-        <p:style>
-          <a:lnRef idx="2">
-            <a:schemeClr val="accent1">
-              <a:shade val="50000"/>
-            </a:schemeClr>
-          </a:lnRef>
-          <a:fillRef idx="1">
-            <a:schemeClr val="accent1"/>
-          </a:fillRef>
-          <a:effectRef idx="0">
-            <a:schemeClr val="accent1"/>
-          </a:effectRef>
-          <a:fontRef idx="minor">
-            <a:schemeClr val="lt1"/>
-          </a:fontRef>
-        </p:style>
-        <p:txBody>
-          <a:bodyPr rtlCol="0" anchor="ctr"/>
-          <a:lstStyle/>
-          <a:p>
-            <a:pPr algn="ctr"/>
-            <a:r>
-              <a:rPr lang="en-US" sz="1400" dirty="0" err="1"/>
-              <a:t>AlgorithmTest.cproject.yml</a:t>
-            </a:r>
-            <a:endParaRPr lang="en-US" sz="1400" dirty="0"/>
-          </a:p>
-        </p:txBody>
-      </p:sp>
-      <p:sp>
-        <p:nvSpPr>
-          <p:cNvPr id="20" name="Callout: Bent Line with Accent Bar 19">
-            <a:extLst>
-              <a:ext uri="{FF2B5EF4-FFF2-40B4-BE49-F238E27FC236}">
-                <a16:creationId xmlns:a16="http://schemas.microsoft.com/office/drawing/2014/main" id="{D1617B0D-C16A-73DF-D7EA-A87528EA450C}"/>
-              </a:ext>
-            </a:extLst>
-          </p:cNvPr>
-          <p:cNvSpPr/>
-          <p:nvPr/>
-        </p:nvSpPr>
-        <p:spPr>
-          <a:xfrm>
-            <a:off x="5492884" y="1431972"/>
-            <a:ext cx="1498060" cy="612648"/>
-          </a:xfrm>
-          <a:prstGeom prst="accentCallout2">
-            <a:avLst>
-              <a:gd name="adj1" fmla="val 18750"/>
-              <a:gd name="adj2" fmla="val -8333"/>
-              <a:gd name="adj3" fmla="val 18750"/>
-              <a:gd name="adj4" fmla="val -16667"/>
-              <a:gd name="adj5" fmla="val 60632"/>
-              <a:gd name="adj6" fmla="val -32482"/>
-            </a:avLst>
-          </a:prstGeom>
-          <a:noFill/>
-          <a:ln>
-            <a:solidFill>
-              <a:srgbClr val="C00000"/>
-            </a:solidFill>
-          </a:ln>
-        </p:spPr>
-        <p:style>
-          <a:lnRef idx="2">
-            <a:schemeClr val="accent1">
-              <a:shade val="50000"/>
-            </a:schemeClr>
-          </a:lnRef>
-          <a:fillRef idx="1">
-            <a:schemeClr val="accent1"/>
-          </a:fillRef>
-          <a:effectRef idx="0">
-            <a:schemeClr val="accent1"/>
-          </a:effectRef>
-          <a:fontRef idx="minor">
-            <a:schemeClr val="lt1"/>
-          </a:fontRef>
-        </p:style>
-        <p:txBody>
-          <a:bodyPr lIns="0" tIns="0" rIns="0" bIns="0" rtlCol="0" anchor="t"/>
-          <a:lstStyle/>
-          <a:p>
-            <a:r>
-              <a:rPr lang="en-US" sz="1200" dirty="0">
-                <a:solidFill>
-                  <a:schemeClr val="tx1"/>
-                </a:solidFill>
-              </a:rPr>
-              <a:t>target-types select between hardware</a:t>
-            </a:r>
-          </a:p>
-          <a:p>
-            <a:r>
-              <a:rPr lang="en-US" sz="1200" dirty="0">
-                <a:solidFill>
-                  <a:schemeClr val="tx1"/>
-                </a:solidFill>
-              </a:rPr>
-              <a:t>and simulation </a:t>
-            </a:r>
-          </a:p>
-        </p:txBody>
-      </p:sp>
-      <p:sp>
-        <p:nvSpPr>
-          <p:cNvPr id="21" name="Callout: Bent Line with Accent Bar 20">
-            <a:extLst>
-              <a:ext uri="{FF2B5EF4-FFF2-40B4-BE49-F238E27FC236}">
-                <a16:creationId xmlns:a16="http://schemas.microsoft.com/office/drawing/2014/main" id="{DCAC335D-914C-08BE-625E-F7D62ED092E1}"/>
-              </a:ext>
-            </a:extLst>
-          </p:cNvPr>
-          <p:cNvSpPr/>
-          <p:nvPr/>
-        </p:nvSpPr>
-        <p:spPr>
-          <a:xfrm>
-            <a:off x="5492884" y="2343531"/>
-            <a:ext cx="1498060" cy="612648"/>
-          </a:xfrm>
-          <a:prstGeom prst="accentCallout2">
-            <a:avLst>
-              <a:gd name="adj1" fmla="val 18750"/>
-              <a:gd name="adj2" fmla="val -8333"/>
-              <a:gd name="adj3" fmla="val 18750"/>
-              <a:gd name="adj4" fmla="val -16667"/>
-              <a:gd name="adj5" fmla="val 60632"/>
-              <a:gd name="adj6" fmla="val -32482"/>
-            </a:avLst>
-          </a:prstGeom>
-          <a:noFill/>
-          <a:ln>
-            <a:solidFill>
-              <a:srgbClr val="C00000"/>
-            </a:solidFill>
-          </a:ln>
-        </p:spPr>
-        <p:style>
-          <a:lnRef idx="2">
-            <a:schemeClr val="accent1">
-              <a:shade val="50000"/>
-            </a:schemeClr>
-          </a:lnRef>
-          <a:fillRef idx="1">
-            <a:schemeClr val="accent1"/>
-          </a:fillRef>
-          <a:effectRef idx="0">
-            <a:schemeClr val="accent1"/>
-          </a:effectRef>
-          <a:fontRef idx="minor">
-            <a:schemeClr val="lt1"/>
-          </a:fontRef>
-        </p:style>
-        <p:txBody>
-          <a:bodyPr lIns="0" tIns="0" rIns="0" bIns="0" rtlCol="0" anchor="t"/>
-          <a:lstStyle/>
-          <a:p>
-            <a:r>
-              <a:rPr lang="en-US" sz="1200" dirty="0">
-                <a:solidFill>
-                  <a:schemeClr val="tx1"/>
-                </a:solidFill>
-              </a:rPr>
-              <a:t>Add user algorithm</a:t>
-            </a:r>
-            <a:br>
-              <a:rPr lang="en-US" sz="1200" dirty="0">
-                <a:solidFill>
-                  <a:schemeClr val="tx1"/>
-                </a:solidFill>
-              </a:rPr>
-            </a:br>
-            <a:r>
-              <a:rPr lang="en-US" sz="1200" dirty="0">
-                <a:solidFill>
-                  <a:schemeClr val="tx1"/>
-                </a:solidFill>
-              </a:rPr>
-              <a:t>and data stream</a:t>
-            </a:r>
-            <a:br>
-              <a:rPr lang="en-US" sz="1200" dirty="0">
-                <a:solidFill>
-                  <a:schemeClr val="tx1"/>
-                </a:solidFill>
-              </a:rPr>
-            </a:br>
-            <a:r>
-              <a:rPr lang="en-US" sz="1200" dirty="0">
-                <a:solidFill>
-                  <a:schemeClr val="tx1"/>
-                </a:solidFill>
-              </a:rPr>
-              <a:t>input interface</a:t>
-            </a:r>
-          </a:p>
-        </p:txBody>
-      </p:sp>
-      <p:sp>
-        <p:nvSpPr>
-          <p:cNvPr id="22" name="Callout: Bent Line with Accent Bar 21">
-            <a:extLst>
-              <a:ext uri="{FF2B5EF4-FFF2-40B4-BE49-F238E27FC236}">
-                <a16:creationId xmlns:a16="http://schemas.microsoft.com/office/drawing/2014/main" id="{688DADD3-DBC8-96B6-7CE2-9CCEB7866880}"/>
-              </a:ext>
-            </a:extLst>
-          </p:cNvPr>
-          <p:cNvSpPr/>
-          <p:nvPr/>
-        </p:nvSpPr>
-        <p:spPr>
-          <a:xfrm>
-            <a:off x="5492884" y="3419606"/>
-            <a:ext cx="1498060" cy="612648"/>
-          </a:xfrm>
-          <a:prstGeom prst="accentCallout2">
-            <a:avLst>
-              <a:gd name="adj1" fmla="val 18750"/>
-              <a:gd name="adj2" fmla="val -8333"/>
-              <a:gd name="adj3" fmla="val 18750"/>
-              <a:gd name="adj4" fmla="val -16667"/>
-              <a:gd name="adj5" fmla="val 60632"/>
-              <a:gd name="adj6" fmla="val -32482"/>
-            </a:avLst>
-          </a:prstGeom>
-          <a:noFill/>
-          <a:ln>
-            <a:solidFill>
-              <a:srgbClr val="C00000"/>
-            </a:solidFill>
-          </a:ln>
-        </p:spPr>
-        <p:style>
-          <a:lnRef idx="2">
-            <a:schemeClr val="accent1">
-              <a:shade val="50000"/>
-            </a:schemeClr>
-          </a:lnRef>
-          <a:fillRef idx="1">
-            <a:schemeClr val="accent1"/>
-          </a:fillRef>
-          <a:effectRef idx="0">
-            <a:schemeClr val="accent1"/>
-          </a:effectRef>
-          <a:fontRef idx="minor">
-            <a:schemeClr val="lt1"/>
-          </a:fontRef>
-        </p:style>
-        <p:txBody>
-          <a:bodyPr lIns="0" tIns="0" rIns="0" bIns="0" rtlCol="0" anchor="t"/>
-          <a:lstStyle/>
-          <a:p>
-            <a:r>
-              <a:rPr lang="en-US" sz="1200" dirty="0">
-                <a:solidFill>
-                  <a:schemeClr val="tx1"/>
-                </a:solidFill>
-              </a:rPr>
-              <a:t>build-types select between recording</a:t>
-            </a:r>
-            <a:br>
-              <a:rPr lang="en-US" sz="1200" dirty="0">
-                <a:solidFill>
-                  <a:schemeClr val="tx1"/>
-                </a:solidFill>
-              </a:rPr>
-            </a:br>
-            <a:r>
-              <a:rPr lang="en-US" sz="1200" dirty="0">
-                <a:solidFill>
-                  <a:schemeClr val="tx1"/>
-                </a:solidFill>
-              </a:rPr>
-              <a:t>and playback</a:t>
-            </a:r>
-          </a:p>
-        </p:txBody>
-      </p:sp>
-    </p:spTree>
-    <p:extLst>
-      <p:ext uri="{BB962C8B-B14F-4D97-AF65-F5344CB8AC3E}">
-        <p14:creationId xmlns:p14="http://schemas.microsoft.com/office/powerpoint/2010/main" val="2612990511"/>
       </p:ext>
     </p:extLst>
   </p:cSld>

</xml_diff>

<commit_message>
Update docu, project structure, image templates (#193)
</commit_message>
<xml_diff>
--- a/documentation/images/overview.pptx
+++ b/documentation/images/overview.pptx
@@ -5,10 +5,10 @@
     <p:sldMasterId id="2147483661" r:id="rId1"/>
   </p:sldMasterIdLst>
   <p:notesMasterIdLst>
-    <p:notesMasterId r:id="rId17"/>
+    <p:notesMasterId r:id="rId18"/>
   </p:notesMasterIdLst>
   <p:handoutMasterIdLst>
-    <p:handoutMasterId r:id="rId18"/>
+    <p:handoutMasterId r:id="rId19"/>
   </p:handoutMasterIdLst>
   <p:sldIdLst>
     <p:sldId id="2147476961" r:id="rId2"/>
@@ -17,15 +17,16 @@
     <p:sldId id="2147476965" r:id="rId5"/>
     <p:sldId id="2147479520" r:id="rId6"/>
     <p:sldId id="2147476966" r:id="rId7"/>
-    <p:sldId id="2145705724" r:id="rId8"/>
-    <p:sldId id="2147476963" r:id="rId9"/>
-    <p:sldId id="2147476964" r:id="rId10"/>
-    <p:sldId id="2147479521" r:id="rId11"/>
-    <p:sldId id="2145705746" r:id="rId12"/>
-    <p:sldId id="2145705721" r:id="rId13"/>
-    <p:sldId id="2145705723" r:id="rId14"/>
-    <p:sldId id="2123260229" r:id="rId15"/>
-    <p:sldId id="2147476967" r:id="rId16"/>
+    <p:sldId id="2147479522" r:id="rId8"/>
+    <p:sldId id="2145705724" r:id="rId9"/>
+    <p:sldId id="2147476963" r:id="rId10"/>
+    <p:sldId id="2147476964" r:id="rId11"/>
+    <p:sldId id="2147479521" r:id="rId12"/>
+    <p:sldId id="2145705746" r:id="rId13"/>
+    <p:sldId id="2145705721" r:id="rId14"/>
+    <p:sldId id="2145705723" r:id="rId15"/>
+    <p:sldId id="2123260229" r:id="rId16"/>
+    <p:sldId id="2147476967" r:id="rId17"/>
   </p:sldIdLst>
   <p:sldSz cx="12192000" cy="6858000"/>
   <p:notesSz cx="6858000" cy="9144000"/>
@@ -273,7 +274,7 @@
           <a:p>
             <a:fld id="{008FFADC-39A7-449E-8C68-8776E6FB3C1A}" type="datetimeFigureOut">
               <a:rPr lang="en-GB" smtClean="0"/>
-              <a:t>27/08/2025</a:t>
+              <a:t>23/02/2026</a:t>
             </a:fld>
             <a:endParaRPr lang="en-GB"/>
           </a:p>
@@ -450,7 +451,7 @@
           <a:p>
             <a:fld id="{30B9BAAB-B703-4BB5-9D08-B460FC03C23A}" type="datetimeFigureOut">
               <a:rPr lang="en-GB" smtClean="0"/>
-              <a:t>27/08/2025</a:t>
+              <a:t>23/02/2026</a:t>
             </a:fld>
             <a:endParaRPr lang="en-GB"/>
           </a:p>
@@ -2234,7 +2235,7 @@
                 <a:tabLst/>
                 <a:defRPr/>
               </a:pPr>
-              <a:t>10</a:t>
+              <a:t>11</a:t>
             </a:fld>
             <a:endParaRPr kumimoji="0" lang="en-US" altLang="en-US" sz="1200" b="0" i="0" u="none" strike="noStrike" kern="1200" cap="none" spc="0" normalizeH="0" baseline="0" noProof="0">
               <a:ln>
@@ -2337,7 +2338,7 @@
               <a:pPr>
                 <a:defRPr/>
               </a:pPr>
-              <a:t>11</a:t>
+              <a:t>12</a:t>
             </a:fld>
             <a:endParaRPr lang="en-US" altLang="en-US"/>
           </a:p>
@@ -2427,7 +2428,7 @@
               <a:pPr>
                 <a:defRPr/>
               </a:pPr>
-              <a:t>12</a:t>
+              <a:t>13</a:t>
             </a:fld>
             <a:endParaRPr lang="en-US" altLang="en-US"/>
           </a:p>
@@ -11188,6 +11189,893 @@
   <p:cSld>
     <p:spTree>
       <p:nvGrpSpPr>
+        <p:cNvPr id="1" name=""/>
+        <p:cNvGrpSpPr/>
+        <p:nvPr/>
+      </p:nvGrpSpPr>
+      <p:grpSpPr>
+        <a:xfrm>
+          <a:off x="0" y="0"/>
+          <a:ext cx="0" cy="0"/>
+          <a:chOff x="0" y="0"/>
+          <a:chExt cx="0" cy="0"/>
+        </a:xfrm>
+      </p:grpSpPr>
+      <p:sp>
+        <p:nvSpPr>
+          <p:cNvPr id="2" name="Title 1">
+            <a:extLst>
+              <a:ext uri="{FF2B5EF4-FFF2-40B4-BE49-F238E27FC236}">
+                <a16:creationId xmlns:a16="http://schemas.microsoft.com/office/drawing/2014/main" id="{BFBCA5D4-C7CF-56B7-4D26-1D3745C85A28}"/>
+              </a:ext>
+            </a:extLst>
+          </p:cNvPr>
+          <p:cNvSpPr>
+            <a:spLocks noGrp="1"/>
+          </p:cNvSpPr>
+          <p:nvPr>
+            <p:ph type="title"/>
+          </p:nvPr>
+        </p:nvSpPr>
+        <p:spPr/>
+        <p:txBody>
+          <a:bodyPr/>
+          <a:lstStyle/>
+          <a:p>
+            <a:r>
+              <a:rPr lang="en-US"/>
+              <a:t>SDS Recorder </a:t>
+            </a:r>
+            <a:r>
+              <a:rPr lang="en-US">
+                <a:hlinkClick r:id="rId2"/>
+              </a:rPr>
+              <a:t>https://github.com/Arm-Examples/sds-examples</a:t>
+            </a:r>
+            <a:br>
+              <a:rPr lang="en-US"/>
+            </a:br>
+            <a:endParaRPr lang="en-US"/>
+          </a:p>
+        </p:txBody>
+      </p:sp>
+      <p:sp>
+        <p:nvSpPr>
+          <p:cNvPr id="4" name="Rectangle 3">
+            <a:extLst>
+              <a:ext uri="{FF2B5EF4-FFF2-40B4-BE49-F238E27FC236}">
+                <a16:creationId xmlns:a16="http://schemas.microsoft.com/office/drawing/2014/main" id="{268F30E4-EF9A-1A51-E8F1-2E8F1385FA61}"/>
+              </a:ext>
+            </a:extLst>
+          </p:cNvPr>
+          <p:cNvSpPr/>
+          <p:nvPr/>
+        </p:nvSpPr>
+        <p:spPr>
+          <a:xfrm>
+            <a:off x="627993" y="1411454"/>
+            <a:ext cx="4452085" cy="653684"/>
+          </a:xfrm>
+          <a:prstGeom prst="rect">
+            <a:avLst/>
+          </a:prstGeom>
+          <a:solidFill>
+            <a:schemeClr val="accent6">
+              <a:lumMod val="75000"/>
+            </a:schemeClr>
+          </a:solidFill>
+          <a:ln>
+            <a:noFill/>
+          </a:ln>
+        </p:spPr>
+        <p:style>
+          <a:lnRef idx="2">
+            <a:schemeClr val="accent1">
+              <a:shade val="50000"/>
+            </a:schemeClr>
+          </a:lnRef>
+          <a:fillRef idx="1">
+            <a:schemeClr val="accent1"/>
+          </a:fillRef>
+          <a:effectRef idx="0">
+            <a:schemeClr val="accent1"/>
+          </a:effectRef>
+          <a:fontRef idx="minor">
+            <a:schemeClr val="lt1"/>
+          </a:fontRef>
+        </p:style>
+        <p:txBody>
+          <a:bodyPr rtlCol="0" anchor="ctr"/>
+          <a:lstStyle/>
+          <a:p>
+            <a:pPr algn="ctr"/>
+            <a:r>
+              <a:rPr lang="en-US" sz="1600" b="1" dirty="0" err="1"/>
+              <a:t>SDS.csolution.yml</a:t>
+            </a:r>
+            <a:br>
+              <a:rPr lang="en-US" sz="1400" dirty="0"/>
+            </a:br>
+            <a:r>
+              <a:rPr lang="en-US" sz="1400" dirty="0"/>
+              <a:t>Data streaming test framework for DSP and </a:t>
+            </a:r>
+            <a:r>
+              <a:rPr lang="en-US" sz="1400"/>
+              <a:t>ML algorithms</a:t>
+            </a:r>
+            <a:endParaRPr lang="en-US" sz="1100" dirty="0"/>
+          </a:p>
+        </p:txBody>
+      </p:sp>
+      <p:sp>
+        <p:nvSpPr>
+          <p:cNvPr id="8" name="Rectangle 7">
+            <a:extLst>
+              <a:ext uri="{FF2B5EF4-FFF2-40B4-BE49-F238E27FC236}">
+                <a16:creationId xmlns:a16="http://schemas.microsoft.com/office/drawing/2014/main" id="{CE3974E6-B40A-AB0A-DFDB-B964F9612AEA}"/>
+              </a:ext>
+            </a:extLst>
+          </p:cNvPr>
+          <p:cNvSpPr/>
+          <p:nvPr/>
+        </p:nvSpPr>
+        <p:spPr>
+          <a:xfrm>
+            <a:off x="2942715" y="3519273"/>
+            <a:ext cx="2128632" cy="653684"/>
+          </a:xfrm>
+          <a:prstGeom prst="rect">
+            <a:avLst/>
+          </a:prstGeom>
+          <a:solidFill>
+            <a:schemeClr val="accent1"/>
+          </a:solidFill>
+          <a:ln>
+            <a:noFill/>
+          </a:ln>
+        </p:spPr>
+        <p:style>
+          <a:lnRef idx="2">
+            <a:schemeClr val="accent1">
+              <a:shade val="50000"/>
+            </a:schemeClr>
+          </a:lnRef>
+          <a:fillRef idx="1">
+            <a:schemeClr val="accent1"/>
+          </a:fillRef>
+          <a:effectRef idx="0">
+            <a:schemeClr val="accent1"/>
+          </a:effectRef>
+          <a:fontRef idx="minor">
+            <a:schemeClr val="lt1"/>
+          </a:fontRef>
+        </p:style>
+        <p:txBody>
+          <a:bodyPr rtlCol="0" anchor="ctr"/>
+          <a:lstStyle/>
+          <a:p>
+            <a:pPr algn="ctr"/>
+            <a:r>
+              <a:rPr lang="en-US" sz="1100" dirty="0"/>
+              <a:t>Record/Playback </a:t>
+            </a:r>
+            <a:br>
+              <a:rPr lang="en-US" sz="1100" dirty="0"/>
+            </a:br>
+            <a:r>
+              <a:rPr lang="en-US" sz="1100" dirty="0"/>
+              <a:t>SDS Data Files via</a:t>
+            </a:r>
+            <a:br>
+              <a:rPr lang="en-US" sz="1100" dirty="0"/>
+            </a:br>
+            <a:r>
+              <a:rPr lang="en-US" sz="1100" dirty="0"/>
+              <a:t>Network, USB, File System</a:t>
+            </a:r>
+            <a:endParaRPr lang="en-US" sz="1050" dirty="0"/>
+          </a:p>
+        </p:txBody>
+      </p:sp>
+      <p:sp>
+        <p:nvSpPr>
+          <p:cNvPr id="10" name="Rectangle 9">
+            <a:extLst>
+              <a:ext uri="{FF2B5EF4-FFF2-40B4-BE49-F238E27FC236}">
+                <a16:creationId xmlns:a16="http://schemas.microsoft.com/office/drawing/2014/main" id="{CEE742C1-9B27-441A-6C29-20D13149B32F}"/>
+              </a:ext>
+            </a:extLst>
+          </p:cNvPr>
+          <p:cNvSpPr/>
+          <p:nvPr/>
+        </p:nvSpPr>
+        <p:spPr>
+          <a:xfrm>
+            <a:off x="2942715" y="3255090"/>
+            <a:ext cx="2128632" cy="264183"/>
+          </a:xfrm>
+          <a:prstGeom prst="rect">
+            <a:avLst/>
+          </a:prstGeom>
+          <a:solidFill>
+            <a:schemeClr val="accent1">
+              <a:lumMod val="75000"/>
+            </a:schemeClr>
+          </a:solidFill>
+          <a:ln>
+            <a:noFill/>
+          </a:ln>
+        </p:spPr>
+        <p:style>
+          <a:lnRef idx="2">
+            <a:schemeClr val="accent1">
+              <a:shade val="50000"/>
+            </a:schemeClr>
+          </a:lnRef>
+          <a:fillRef idx="1">
+            <a:schemeClr val="accent1"/>
+          </a:fillRef>
+          <a:effectRef idx="0">
+            <a:schemeClr val="accent1"/>
+          </a:effectRef>
+          <a:fontRef idx="minor">
+            <a:schemeClr val="lt1"/>
+          </a:fontRef>
+        </p:style>
+        <p:txBody>
+          <a:bodyPr rtlCol="0" anchor="ctr"/>
+          <a:lstStyle/>
+          <a:p>
+            <a:pPr algn="ctr"/>
+            <a:r>
+              <a:rPr lang="en-US" sz="1400" dirty="0"/>
+              <a:t> Layer Type: SDSIO</a:t>
+            </a:r>
+          </a:p>
+        </p:txBody>
+      </p:sp>
+      <p:sp>
+        <p:nvSpPr>
+          <p:cNvPr id="16" name="Rectangle 15">
+            <a:extLst>
+              <a:ext uri="{FF2B5EF4-FFF2-40B4-BE49-F238E27FC236}">
+                <a16:creationId xmlns:a16="http://schemas.microsoft.com/office/drawing/2014/main" id="{8C61B6A3-A1BE-4248-57B1-609E5F0E8AAB}"/>
+              </a:ext>
+            </a:extLst>
+          </p:cNvPr>
+          <p:cNvSpPr/>
+          <p:nvPr/>
+        </p:nvSpPr>
+        <p:spPr>
+          <a:xfrm>
+            <a:off x="627994" y="3519273"/>
+            <a:ext cx="2128632" cy="653684"/>
+          </a:xfrm>
+          <a:prstGeom prst="rect">
+            <a:avLst/>
+          </a:prstGeom>
+          <a:solidFill>
+            <a:schemeClr val="accent1"/>
+          </a:solidFill>
+          <a:ln>
+            <a:noFill/>
+          </a:ln>
+        </p:spPr>
+        <p:style>
+          <a:lnRef idx="2">
+            <a:schemeClr val="accent1">
+              <a:shade val="50000"/>
+            </a:schemeClr>
+          </a:lnRef>
+          <a:fillRef idx="1">
+            <a:schemeClr val="accent1"/>
+          </a:fillRef>
+          <a:effectRef idx="0">
+            <a:schemeClr val="accent1"/>
+          </a:effectRef>
+          <a:fontRef idx="minor">
+            <a:schemeClr val="lt1"/>
+          </a:fontRef>
+        </p:style>
+        <p:txBody>
+          <a:bodyPr rtlCol="0" anchor="ctr"/>
+          <a:lstStyle/>
+          <a:p>
+            <a:pPr algn="ctr"/>
+            <a:r>
+              <a:rPr lang="en-US" sz="1100" dirty="0"/>
+              <a:t>Board Hardware Interface</a:t>
+            </a:r>
+            <a:br>
+              <a:rPr lang="en-US" sz="1100" dirty="0"/>
+            </a:br>
+            <a:r>
+              <a:rPr lang="en-US" sz="1100" dirty="0"/>
+              <a:t>Provided in BSP</a:t>
+            </a:r>
+            <a:endParaRPr lang="en-US" sz="1050" dirty="0"/>
+          </a:p>
+        </p:txBody>
+      </p:sp>
+      <p:sp>
+        <p:nvSpPr>
+          <p:cNvPr id="17" name="Rectangle 16">
+            <a:extLst>
+              <a:ext uri="{FF2B5EF4-FFF2-40B4-BE49-F238E27FC236}">
+                <a16:creationId xmlns:a16="http://schemas.microsoft.com/office/drawing/2014/main" id="{4DB6B1BC-4815-896E-9392-B226B5A4C231}"/>
+              </a:ext>
+            </a:extLst>
+          </p:cNvPr>
+          <p:cNvSpPr/>
+          <p:nvPr/>
+        </p:nvSpPr>
+        <p:spPr>
+          <a:xfrm>
+            <a:off x="627994" y="3255090"/>
+            <a:ext cx="2128632" cy="264183"/>
+          </a:xfrm>
+          <a:prstGeom prst="rect">
+            <a:avLst/>
+          </a:prstGeom>
+          <a:solidFill>
+            <a:schemeClr val="accent1">
+              <a:lumMod val="75000"/>
+            </a:schemeClr>
+          </a:solidFill>
+          <a:ln>
+            <a:noFill/>
+          </a:ln>
+        </p:spPr>
+        <p:style>
+          <a:lnRef idx="2">
+            <a:schemeClr val="accent1">
+              <a:shade val="50000"/>
+            </a:schemeClr>
+          </a:lnRef>
+          <a:fillRef idx="1">
+            <a:schemeClr val="accent1"/>
+          </a:fillRef>
+          <a:effectRef idx="0">
+            <a:schemeClr val="accent1"/>
+          </a:effectRef>
+          <a:fontRef idx="minor">
+            <a:schemeClr val="lt1"/>
+          </a:fontRef>
+        </p:style>
+        <p:txBody>
+          <a:bodyPr rtlCol="0" anchor="ctr"/>
+          <a:lstStyle/>
+          <a:p>
+            <a:pPr algn="ctr"/>
+            <a:r>
+              <a:rPr lang="en-US" sz="1400" dirty="0"/>
+              <a:t> Layer Type: Board</a:t>
+            </a:r>
+          </a:p>
+        </p:txBody>
+      </p:sp>
+      <p:sp>
+        <p:nvSpPr>
+          <p:cNvPr id="3" name="Rectangle 2">
+            <a:extLst>
+              <a:ext uri="{FF2B5EF4-FFF2-40B4-BE49-F238E27FC236}">
+                <a16:creationId xmlns:a16="http://schemas.microsoft.com/office/drawing/2014/main" id="{981466B6-29ED-CB94-AF4F-BC970DB65D25}"/>
+              </a:ext>
+            </a:extLst>
+          </p:cNvPr>
+          <p:cNvSpPr/>
+          <p:nvPr/>
+        </p:nvSpPr>
+        <p:spPr>
+          <a:xfrm>
+            <a:off x="627994" y="2460256"/>
+            <a:ext cx="2128632" cy="653684"/>
+          </a:xfrm>
+          <a:prstGeom prst="rect">
+            <a:avLst/>
+          </a:prstGeom>
+          <a:solidFill>
+            <a:schemeClr val="accent4">
+              <a:lumMod val="75000"/>
+            </a:schemeClr>
+          </a:solidFill>
+          <a:ln>
+            <a:noFill/>
+          </a:ln>
+        </p:spPr>
+        <p:style>
+          <a:lnRef idx="2">
+            <a:schemeClr val="accent1">
+              <a:shade val="50000"/>
+            </a:schemeClr>
+          </a:lnRef>
+          <a:fillRef idx="1">
+            <a:schemeClr val="accent1"/>
+          </a:fillRef>
+          <a:effectRef idx="0">
+            <a:schemeClr val="accent1"/>
+          </a:effectRef>
+          <a:fontRef idx="minor">
+            <a:schemeClr val="lt1"/>
+          </a:fontRef>
+        </p:style>
+        <p:txBody>
+          <a:bodyPr rtlCol="0" anchor="ctr"/>
+          <a:lstStyle/>
+          <a:p>
+            <a:pPr algn="ctr"/>
+            <a:r>
+              <a:rPr lang="en-US" sz="1100" dirty="0"/>
+              <a:t>Check SDSIO interface with</a:t>
+            </a:r>
+            <a:br>
+              <a:rPr lang="en-US" sz="1100" dirty="0"/>
+            </a:br>
+            <a:r>
+              <a:rPr lang="en-US" sz="1100" dirty="0"/>
+              <a:t>user configurable bandwidth parameters</a:t>
+            </a:r>
+            <a:endParaRPr lang="en-US" sz="1050" dirty="0"/>
+          </a:p>
+        </p:txBody>
+      </p:sp>
+      <p:sp>
+        <p:nvSpPr>
+          <p:cNvPr id="5" name="Rectangle 4">
+            <a:extLst>
+              <a:ext uri="{FF2B5EF4-FFF2-40B4-BE49-F238E27FC236}">
+                <a16:creationId xmlns:a16="http://schemas.microsoft.com/office/drawing/2014/main" id="{006CFF1E-7F8E-879E-76E9-6194FE53B86C}"/>
+              </a:ext>
+            </a:extLst>
+          </p:cNvPr>
+          <p:cNvSpPr/>
+          <p:nvPr/>
+        </p:nvSpPr>
+        <p:spPr>
+          <a:xfrm>
+            <a:off x="627994" y="2196073"/>
+            <a:ext cx="2128632" cy="264183"/>
+          </a:xfrm>
+          <a:prstGeom prst="rect">
+            <a:avLst/>
+          </a:prstGeom>
+          <a:solidFill>
+            <a:schemeClr val="accent4">
+              <a:lumMod val="50000"/>
+            </a:schemeClr>
+          </a:solidFill>
+          <a:ln>
+            <a:noFill/>
+          </a:ln>
+        </p:spPr>
+        <p:style>
+          <a:lnRef idx="2">
+            <a:schemeClr val="accent1">
+              <a:shade val="50000"/>
+            </a:schemeClr>
+          </a:lnRef>
+          <a:fillRef idx="1">
+            <a:schemeClr val="accent1"/>
+          </a:fillRef>
+          <a:effectRef idx="0">
+            <a:schemeClr val="accent1"/>
+          </a:effectRef>
+          <a:fontRef idx="minor">
+            <a:schemeClr val="lt1"/>
+          </a:fontRef>
+        </p:style>
+        <p:txBody>
+          <a:bodyPr rtlCol="0" anchor="ctr"/>
+          <a:lstStyle/>
+          <a:p>
+            <a:pPr algn="ctr"/>
+            <a:r>
+              <a:rPr lang="en-US" sz="1400" dirty="0" err="1"/>
+              <a:t>DataTest.cproject.yml</a:t>
+            </a:r>
+            <a:endParaRPr lang="en-US" sz="1400" dirty="0"/>
+          </a:p>
+        </p:txBody>
+      </p:sp>
+      <p:sp>
+        <p:nvSpPr>
+          <p:cNvPr id="6" name="Rectangle 5">
+            <a:extLst>
+              <a:ext uri="{FF2B5EF4-FFF2-40B4-BE49-F238E27FC236}">
+                <a16:creationId xmlns:a16="http://schemas.microsoft.com/office/drawing/2014/main" id="{E094A49A-EC2D-EEEF-132A-B6D2A8111BED}"/>
+              </a:ext>
+            </a:extLst>
+          </p:cNvPr>
+          <p:cNvSpPr/>
+          <p:nvPr/>
+        </p:nvSpPr>
+        <p:spPr>
+          <a:xfrm>
+            <a:off x="2942715" y="2460256"/>
+            <a:ext cx="2128632" cy="653684"/>
+          </a:xfrm>
+          <a:prstGeom prst="rect">
+            <a:avLst/>
+          </a:prstGeom>
+          <a:solidFill>
+            <a:schemeClr val="accent4">
+              <a:lumMod val="75000"/>
+            </a:schemeClr>
+          </a:solidFill>
+          <a:ln>
+            <a:noFill/>
+          </a:ln>
+        </p:spPr>
+        <p:style>
+          <a:lnRef idx="2">
+            <a:schemeClr val="accent1">
+              <a:shade val="50000"/>
+            </a:schemeClr>
+          </a:lnRef>
+          <a:fillRef idx="1">
+            <a:schemeClr val="accent1"/>
+          </a:fillRef>
+          <a:effectRef idx="0">
+            <a:schemeClr val="accent1"/>
+          </a:effectRef>
+          <a:fontRef idx="minor">
+            <a:schemeClr val="lt1"/>
+          </a:fontRef>
+        </p:style>
+        <p:txBody>
+          <a:bodyPr rtlCol="0" anchor="ctr"/>
+          <a:lstStyle/>
+          <a:p>
+            <a:pPr algn="ctr"/>
+            <a:r>
+              <a:rPr lang="en-US" sz="1100" dirty="0"/>
+              <a:t>Verify and optimized</a:t>
+            </a:r>
+            <a:br>
+              <a:rPr lang="en-US" sz="1100" dirty="0"/>
+            </a:br>
+            <a:r>
+              <a:rPr lang="en-US" sz="1100" dirty="0"/>
+              <a:t>user algorithms</a:t>
+            </a:r>
+            <a:br>
+              <a:rPr lang="en-US" sz="1100" dirty="0"/>
+            </a:br>
+            <a:r>
+              <a:rPr lang="en-US" sz="1100" dirty="0"/>
+              <a:t>with repeatable data</a:t>
+            </a:r>
+            <a:endParaRPr lang="en-US" sz="1050" dirty="0"/>
+          </a:p>
+        </p:txBody>
+      </p:sp>
+      <p:sp>
+        <p:nvSpPr>
+          <p:cNvPr id="7" name="Rectangle 6">
+            <a:extLst>
+              <a:ext uri="{FF2B5EF4-FFF2-40B4-BE49-F238E27FC236}">
+                <a16:creationId xmlns:a16="http://schemas.microsoft.com/office/drawing/2014/main" id="{02192468-F815-85E7-1987-BD05F8475585}"/>
+              </a:ext>
+            </a:extLst>
+          </p:cNvPr>
+          <p:cNvSpPr/>
+          <p:nvPr/>
+        </p:nvSpPr>
+        <p:spPr>
+          <a:xfrm>
+            <a:off x="2942715" y="2196073"/>
+            <a:ext cx="2128632" cy="264183"/>
+          </a:xfrm>
+          <a:prstGeom prst="rect">
+            <a:avLst/>
+          </a:prstGeom>
+          <a:solidFill>
+            <a:schemeClr val="accent4">
+              <a:lumMod val="50000"/>
+            </a:schemeClr>
+          </a:solidFill>
+          <a:ln>
+            <a:noFill/>
+          </a:ln>
+        </p:spPr>
+        <p:style>
+          <a:lnRef idx="2">
+            <a:schemeClr val="accent1">
+              <a:shade val="50000"/>
+            </a:schemeClr>
+          </a:lnRef>
+          <a:fillRef idx="1">
+            <a:schemeClr val="accent1"/>
+          </a:fillRef>
+          <a:effectRef idx="0">
+            <a:schemeClr val="accent1"/>
+          </a:effectRef>
+          <a:fontRef idx="minor">
+            <a:schemeClr val="lt1"/>
+          </a:fontRef>
+        </p:style>
+        <p:txBody>
+          <a:bodyPr rtlCol="0" anchor="ctr"/>
+          <a:lstStyle/>
+          <a:p>
+            <a:pPr algn="ctr"/>
+            <a:r>
+              <a:rPr lang="en-US" sz="1400" dirty="0" err="1"/>
+              <a:t>AlgorithmTest.cproject.yml</a:t>
+            </a:r>
+            <a:endParaRPr lang="en-US" sz="1400" dirty="0"/>
+          </a:p>
+        </p:txBody>
+      </p:sp>
+      <p:sp>
+        <p:nvSpPr>
+          <p:cNvPr id="20" name="Callout: Bent Line with Accent Bar 19">
+            <a:extLst>
+              <a:ext uri="{FF2B5EF4-FFF2-40B4-BE49-F238E27FC236}">
+                <a16:creationId xmlns:a16="http://schemas.microsoft.com/office/drawing/2014/main" id="{D1617B0D-C16A-73DF-D7EA-A87528EA450C}"/>
+              </a:ext>
+            </a:extLst>
+          </p:cNvPr>
+          <p:cNvSpPr/>
+          <p:nvPr/>
+        </p:nvSpPr>
+        <p:spPr>
+          <a:xfrm>
+            <a:off x="5492884" y="1431972"/>
+            <a:ext cx="1498060" cy="612648"/>
+          </a:xfrm>
+          <a:prstGeom prst="accentCallout2">
+            <a:avLst>
+              <a:gd name="adj1" fmla="val 18750"/>
+              <a:gd name="adj2" fmla="val -8333"/>
+              <a:gd name="adj3" fmla="val 18750"/>
+              <a:gd name="adj4" fmla="val -16667"/>
+              <a:gd name="adj5" fmla="val 60632"/>
+              <a:gd name="adj6" fmla="val -32482"/>
+            </a:avLst>
+          </a:prstGeom>
+          <a:noFill/>
+          <a:ln>
+            <a:solidFill>
+              <a:srgbClr val="C00000"/>
+            </a:solidFill>
+          </a:ln>
+        </p:spPr>
+        <p:style>
+          <a:lnRef idx="2">
+            <a:schemeClr val="accent1">
+              <a:shade val="50000"/>
+            </a:schemeClr>
+          </a:lnRef>
+          <a:fillRef idx="1">
+            <a:schemeClr val="accent1"/>
+          </a:fillRef>
+          <a:effectRef idx="0">
+            <a:schemeClr val="accent1"/>
+          </a:effectRef>
+          <a:fontRef idx="minor">
+            <a:schemeClr val="lt1"/>
+          </a:fontRef>
+        </p:style>
+        <p:txBody>
+          <a:bodyPr lIns="0" tIns="0" rIns="0" bIns="0" rtlCol="0" anchor="t"/>
+          <a:lstStyle/>
+          <a:p>
+            <a:r>
+              <a:rPr lang="en-US" sz="1200" dirty="0">
+                <a:solidFill>
+                  <a:schemeClr val="tx1"/>
+                </a:solidFill>
+              </a:rPr>
+              <a:t>target-types select between hardware</a:t>
+            </a:r>
+          </a:p>
+          <a:p>
+            <a:r>
+              <a:rPr lang="en-US" sz="1200" dirty="0">
+                <a:solidFill>
+                  <a:schemeClr val="tx1"/>
+                </a:solidFill>
+              </a:rPr>
+              <a:t>and simulation </a:t>
+            </a:r>
+          </a:p>
+        </p:txBody>
+      </p:sp>
+      <p:sp>
+        <p:nvSpPr>
+          <p:cNvPr id="21" name="Callout: Bent Line with Accent Bar 20">
+            <a:extLst>
+              <a:ext uri="{FF2B5EF4-FFF2-40B4-BE49-F238E27FC236}">
+                <a16:creationId xmlns:a16="http://schemas.microsoft.com/office/drawing/2014/main" id="{DCAC335D-914C-08BE-625E-F7D62ED092E1}"/>
+              </a:ext>
+            </a:extLst>
+          </p:cNvPr>
+          <p:cNvSpPr/>
+          <p:nvPr/>
+        </p:nvSpPr>
+        <p:spPr>
+          <a:xfrm>
+            <a:off x="5492884" y="2343531"/>
+            <a:ext cx="1498060" cy="612648"/>
+          </a:xfrm>
+          <a:prstGeom prst="accentCallout2">
+            <a:avLst>
+              <a:gd name="adj1" fmla="val 18750"/>
+              <a:gd name="adj2" fmla="val -8333"/>
+              <a:gd name="adj3" fmla="val 18750"/>
+              <a:gd name="adj4" fmla="val -16667"/>
+              <a:gd name="adj5" fmla="val 60632"/>
+              <a:gd name="adj6" fmla="val -32482"/>
+            </a:avLst>
+          </a:prstGeom>
+          <a:noFill/>
+          <a:ln>
+            <a:solidFill>
+              <a:srgbClr val="C00000"/>
+            </a:solidFill>
+          </a:ln>
+        </p:spPr>
+        <p:style>
+          <a:lnRef idx="2">
+            <a:schemeClr val="accent1">
+              <a:shade val="50000"/>
+            </a:schemeClr>
+          </a:lnRef>
+          <a:fillRef idx="1">
+            <a:schemeClr val="accent1"/>
+          </a:fillRef>
+          <a:effectRef idx="0">
+            <a:schemeClr val="accent1"/>
+          </a:effectRef>
+          <a:fontRef idx="minor">
+            <a:schemeClr val="lt1"/>
+          </a:fontRef>
+        </p:style>
+        <p:txBody>
+          <a:bodyPr lIns="0" tIns="0" rIns="0" bIns="0" rtlCol="0" anchor="t"/>
+          <a:lstStyle/>
+          <a:p>
+            <a:r>
+              <a:rPr lang="en-US" sz="1200" dirty="0">
+                <a:solidFill>
+                  <a:schemeClr val="tx1"/>
+                </a:solidFill>
+              </a:rPr>
+              <a:t>Add user algorithm</a:t>
+            </a:r>
+            <a:br>
+              <a:rPr lang="en-US" sz="1200" dirty="0">
+                <a:solidFill>
+                  <a:schemeClr val="tx1"/>
+                </a:solidFill>
+              </a:rPr>
+            </a:br>
+            <a:r>
+              <a:rPr lang="en-US" sz="1200" dirty="0">
+                <a:solidFill>
+                  <a:schemeClr val="tx1"/>
+                </a:solidFill>
+              </a:rPr>
+              <a:t>and data stream</a:t>
+            </a:r>
+            <a:br>
+              <a:rPr lang="en-US" sz="1200" dirty="0">
+                <a:solidFill>
+                  <a:schemeClr val="tx1"/>
+                </a:solidFill>
+              </a:rPr>
+            </a:br>
+            <a:r>
+              <a:rPr lang="en-US" sz="1200" dirty="0">
+                <a:solidFill>
+                  <a:schemeClr val="tx1"/>
+                </a:solidFill>
+              </a:rPr>
+              <a:t>input interface</a:t>
+            </a:r>
+          </a:p>
+        </p:txBody>
+      </p:sp>
+      <p:sp>
+        <p:nvSpPr>
+          <p:cNvPr id="22" name="Callout: Bent Line with Accent Bar 21">
+            <a:extLst>
+              <a:ext uri="{FF2B5EF4-FFF2-40B4-BE49-F238E27FC236}">
+                <a16:creationId xmlns:a16="http://schemas.microsoft.com/office/drawing/2014/main" id="{688DADD3-DBC8-96B6-7CE2-9CCEB7866880}"/>
+              </a:ext>
+            </a:extLst>
+          </p:cNvPr>
+          <p:cNvSpPr/>
+          <p:nvPr/>
+        </p:nvSpPr>
+        <p:spPr>
+          <a:xfrm>
+            <a:off x="5492884" y="3419606"/>
+            <a:ext cx="1498060" cy="612648"/>
+          </a:xfrm>
+          <a:prstGeom prst="accentCallout2">
+            <a:avLst>
+              <a:gd name="adj1" fmla="val 18750"/>
+              <a:gd name="adj2" fmla="val -8333"/>
+              <a:gd name="adj3" fmla="val 18750"/>
+              <a:gd name="adj4" fmla="val -16667"/>
+              <a:gd name="adj5" fmla="val 60632"/>
+              <a:gd name="adj6" fmla="val -32482"/>
+            </a:avLst>
+          </a:prstGeom>
+          <a:noFill/>
+          <a:ln>
+            <a:solidFill>
+              <a:srgbClr val="C00000"/>
+            </a:solidFill>
+          </a:ln>
+        </p:spPr>
+        <p:style>
+          <a:lnRef idx="2">
+            <a:schemeClr val="accent1">
+              <a:shade val="50000"/>
+            </a:schemeClr>
+          </a:lnRef>
+          <a:fillRef idx="1">
+            <a:schemeClr val="accent1"/>
+          </a:fillRef>
+          <a:effectRef idx="0">
+            <a:schemeClr val="accent1"/>
+          </a:effectRef>
+          <a:fontRef idx="minor">
+            <a:schemeClr val="lt1"/>
+          </a:fontRef>
+        </p:style>
+        <p:txBody>
+          <a:bodyPr lIns="0" tIns="0" rIns="0" bIns="0" rtlCol="0" anchor="t"/>
+          <a:lstStyle/>
+          <a:p>
+            <a:r>
+              <a:rPr lang="en-US" sz="1200" dirty="0">
+                <a:solidFill>
+                  <a:schemeClr val="tx1"/>
+                </a:solidFill>
+              </a:rPr>
+              <a:t>build-types select between recording</a:t>
+            </a:r>
+            <a:br>
+              <a:rPr lang="en-US" sz="1200" dirty="0">
+                <a:solidFill>
+                  <a:schemeClr val="tx1"/>
+                </a:solidFill>
+              </a:rPr>
+            </a:br>
+            <a:r>
+              <a:rPr lang="en-US" sz="1200" dirty="0">
+                <a:solidFill>
+                  <a:schemeClr val="tx1"/>
+                </a:solidFill>
+              </a:rPr>
+              <a:t>and playback</a:t>
+            </a:r>
+          </a:p>
+        </p:txBody>
+      </p:sp>
+    </p:spTree>
+    <p:extLst>
+      <p:ext uri="{BB962C8B-B14F-4D97-AF65-F5344CB8AC3E}">
+        <p14:creationId xmlns:p14="http://schemas.microsoft.com/office/powerpoint/2010/main" val="2612990511"/>
+      </p:ext>
+    </p:extLst>
+  </p:cSld>
+  <p:clrMapOvr>
+    <a:masterClrMapping/>
+  </p:clrMapOvr>
+</p:sld>
+</file>
+
+<file path=ppt/slides/slide11.xml><?xml version="1.0" encoding="utf-8"?>
+<p:sld xmlns:a="http://schemas.openxmlformats.org/drawingml/2006/main" xmlns:r="http://schemas.openxmlformats.org/officeDocument/2006/relationships" xmlns:p="http://schemas.openxmlformats.org/presentationml/2006/main">
+  <p:cSld>
+    <p:spTree>
+      <p:nvGrpSpPr>
         <p:cNvPr id="1" name="">
           <a:extLst>
             <a:ext uri="{FF2B5EF4-FFF2-40B4-BE49-F238E27FC236}">
@@ -15540,7 +16428,7 @@
 </p:sld>
 </file>
 
-<file path=ppt/slides/slide11.xml><?xml version="1.0" encoding="utf-8"?>
+<file path=ppt/slides/slide12.xml><?xml version="1.0" encoding="utf-8"?>
 <p:sld xmlns:a="http://schemas.openxmlformats.org/drawingml/2006/main" xmlns:r="http://schemas.openxmlformats.org/officeDocument/2006/relationships" xmlns:p="http://schemas.openxmlformats.org/presentationml/2006/main">
   <p:cSld>
     <p:spTree>
@@ -18338,7 +19226,7 @@
 </p:sld>
 </file>
 
-<file path=ppt/slides/slide12.xml><?xml version="1.0" encoding="utf-8"?>
+<file path=ppt/slides/slide13.xml><?xml version="1.0" encoding="utf-8"?>
 <p:sld xmlns:a="http://schemas.openxmlformats.org/drawingml/2006/main" xmlns:r="http://schemas.openxmlformats.org/officeDocument/2006/relationships" xmlns:p="http://schemas.openxmlformats.org/presentationml/2006/main">
   <p:cSld>
     <p:spTree>
@@ -21405,7 +22293,7 @@
 </p:sld>
 </file>
 
-<file path=ppt/slides/slide13.xml><?xml version="1.0" encoding="utf-8"?>
+<file path=ppt/slides/slide14.xml><?xml version="1.0" encoding="utf-8"?>
 <p:sld xmlns:a="http://schemas.openxmlformats.org/drawingml/2006/main" xmlns:r="http://schemas.openxmlformats.org/officeDocument/2006/relationships" xmlns:p="http://schemas.openxmlformats.org/presentationml/2006/main">
   <p:cSld>
     <p:spTree>
@@ -24902,7 +25790,7 @@
 </p:sld>
 </file>
 
-<file path=ppt/slides/slide14.xml><?xml version="1.0" encoding="utf-8"?>
+<file path=ppt/slides/slide15.xml><?xml version="1.0" encoding="utf-8"?>
 <p:sld xmlns:a="http://schemas.openxmlformats.org/drawingml/2006/main" xmlns:r="http://schemas.openxmlformats.org/officeDocument/2006/relationships" xmlns:p="http://schemas.openxmlformats.org/presentationml/2006/main">
   <p:cSld>
     <p:spTree>
@@ -26200,7 +27088,7 @@
 </p:sld>
 </file>
 
-<file path=ppt/slides/slide15.xml><?xml version="1.0" encoding="utf-8"?>
+<file path=ppt/slides/slide16.xml><?xml version="1.0" encoding="utf-8"?>
 <p:sld xmlns:a="http://schemas.openxmlformats.org/drawingml/2006/main" xmlns:r="http://schemas.openxmlformats.org/officeDocument/2006/relationships" xmlns:p="http://schemas.openxmlformats.org/presentationml/2006/main">
   <p:cSld>
     <p:spTree>
@@ -50883,6 +51771,1936 @@
       </p:grpSpPr>
       <p:sp>
         <p:nvSpPr>
+          <p:cNvPr id="2" name="Title 1">
+            <a:extLst>
+              <a:ext uri="{FF2B5EF4-FFF2-40B4-BE49-F238E27FC236}">
+                <a16:creationId xmlns:a16="http://schemas.microsoft.com/office/drawing/2014/main" id="{45E97B78-7363-3D4F-BA41-015E399EC325}"/>
+              </a:ext>
+            </a:extLst>
+          </p:cNvPr>
+          <p:cNvSpPr>
+            <a:spLocks noGrp="1"/>
+          </p:cNvSpPr>
+          <p:nvPr>
+            <p:ph type="title"/>
+          </p:nvPr>
+        </p:nvSpPr>
+        <p:spPr/>
+        <p:txBody>
+          <a:bodyPr/>
+          <a:lstStyle/>
+          <a:p>
+            <a:r>
+              <a:rPr lang="en-US" dirty="0"/>
+              <a:t>Data Labelling and Regression Test Configuration </a:t>
+            </a:r>
+          </a:p>
+        </p:txBody>
+      </p:sp>
+      <p:sp>
+        <p:nvSpPr>
+          <p:cNvPr id="3" name="Rectangle 2">
+            <a:extLst>
+              <a:ext uri="{FF2B5EF4-FFF2-40B4-BE49-F238E27FC236}">
+                <a16:creationId xmlns:a16="http://schemas.microsoft.com/office/drawing/2014/main" id="{F2EC980E-74CC-7028-7128-4A0D86FEA4A3}"/>
+              </a:ext>
+            </a:extLst>
+          </p:cNvPr>
+          <p:cNvSpPr/>
+          <p:nvPr/>
+        </p:nvSpPr>
+        <p:spPr>
+          <a:xfrm>
+            <a:off x="554859" y="2649774"/>
+            <a:ext cx="956032" cy="201038"/>
+          </a:xfrm>
+          <a:prstGeom prst="rect">
+            <a:avLst/>
+          </a:prstGeom>
+          <a:solidFill>
+            <a:schemeClr val="bg1">
+              <a:lumMod val="75000"/>
+            </a:schemeClr>
+          </a:solidFill>
+          <a:ln w="15875">
+            <a:solidFill>
+              <a:srgbClr val="00C1DE"/>
+            </a:solidFill>
+          </a:ln>
+        </p:spPr>
+        <p:style>
+          <a:lnRef idx="2">
+            <a:schemeClr val="accent1">
+              <a:shade val="50000"/>
+            </a:schemeClr>
+          </a:lnRef>
+          <a:fillRef idx="1">
+            <a:schemeClr val="accent1"/>
+          </a:fillRef>
+          <a:effectRef idx="0">
+            <a:schemeClr val="accent1"/>
+          </a:effectRef>
+          <a:fontRef idx="minor">
+            <a:schemeClr val="lt1"/>
+          </a:fontRef>
+        </p:style>
+        <p:txBody>
+          <a:bodyPr rtlCol="0" anchor="ctr"/>
+          <a:lstStyle/>
+          <a:p>
+            <a:pPr algn="ctr" defTabSz="1219170" eaLnBrk="0" fontAlgn="base" hangingPunct="0">
+              <a:spcBef>
+                <a:spcPct val="0"/>
+              </a:spcBef>
+              <a:spcAft>
+                <a:spcPct val="0"/>
+              </a:spcAft>
+            </a:pPr>
+            <a:r>
+              <a:rPr lang="en-US" sz="1200" dirty="0">
+                <a:solidFill>
+                  <a:schemeClr val="tx1"/>
+                </a:solidFill>
+                <a:latin typeface="Aeonik" panose="020B0503030300000000" pitchFamily="34" charset="0"/>
+                <a:cs typeface="Calibri" panose="020F0502020204030204" pitchFamily="34" charset="0"/>
+              </a:rPr>
+              <a:t>timestamp</a:t>
+            </a:r>
+          </a:p>
+        </p:txBody>
+      </p:sp>
+      <p:sp>
+        <p:nvSpPr>
+          <p:cNvPr id="4" name="Rectangle 3">
+            <a:extLst>
+              <a:ext uri="{FF2B5EF4-FFF2-40B4-BE49-F238E27FC236}">
+                <a16:creationId xmlns:a16="http://schemas.microsoft.com/office/drawing/2014/main" id="{D5560B2F-6BF4-C7C7-01EA-527C1B8E0E0D}"/>
+              </a:ext>
+            </a:extLst>
+          </p:cNvPr>
+          <p:cNvSpPr/>
+          <p:nvPr/>
+        </p:nvSpPr>
+        <p:spPr>
+          <a:xfrm>
+            <a:off x="554859" y="2850812"/>
+            <a:ext cx="956032" cy="201038"/>
+          </a:xfrm>
+          <a:prstGeom prst="rect">
+            <a:avLst/>
+          </a:prstGeom>
+          <a:solidFill>
+            <a:schemeClr val="bg1">
+              <a:lumMod val="75000"/>
+            </a:schemeClr>
+          </a:solidFill>
+          <a:ln w="15875">
+            <a:solidFill>
+              <a:srgbClr val="00C1DE"/>
+            </a:solidFill>
+          </a:ln>
+        </p:spPr>
+        <p:style>
+          <a:lnRef idx="2">
+            <a:schemeClr val="accent1">
+              <a:shade val="50000"/>
+            </a:schemeClr>
+          </a:lnRef>
+          <a:fillRef idx="1">
+            <a:schemeClr val="accent1"/>
+          </a:fillRef>
+          <a:effectRef idx="0">
+            <a:schemeClr val="accent1"/>
+          </a:effectRef>
+          <a:fontRef idx="minor">
+            <a:schemeClr val="lt1"/>
+          </a:fontRef>
+        </p:style>
+        <p:txBody>
+          <a:bodyPr rtlCol="0" anchor="ctr"/>
+          <a:lstStyle/>
+          <a:p>
+            <a:pPr algn="ctr" defTabSz="1219170" eaLnBrk="0" fontAlgn="base" hangingPunct="0">
+              <a:spcBef>
+                <a:spcPct val="0"/>
+              </a:spcBef>
+              <a:spcAft>
+                <a:spcPct val="0"/>
+              </a:spcAft>
+            </a:pPr>
+            <a:r>
+              <a:rPr lang="en-US" sz="1200" dirty="0">
+                <a:solidFill>
+                  <a:schemeClr val="tx1"/>
+                </a:solidFill>
+                <a:latin typeface="Aeonik" panose="020B0503030300000000" pitchFamily="34" charset="0"/>
+                <a:cs typeface="Calibri" panose="020F0502020204030204" pitchFamily="34" charset="0"/>
+              </a:rPr>
+              <a:t>block size</a:t>
+            </a:r>
+          </a:p>
+        </p:txBody>
+      </p:sp>
+      <p:sp>
+        <p:nvSpPr>
+          <p:cNvPr id="5" name="Rectangle 4">
+            <a:extLst>
+              <a:ext uri="{FF2B5EF4-FFF2-40B4-BE49-F238E27FC236}">
+                <a16:creationId xmlns:a16="http://schemas.microsoft.com/office/drawing/2014/main" id="{F58F0331-50E6-4DC0-3AA2-57FD495D86AD}"/>
+              </a:ext>
+            </a:extLst>
+          </p:cNvPr>
+          <p:cNvSpPr/>
+          <p:nvPr/>
+        </p:nvSpPr>
+        <p:spPr>
+          <a:xfrm>
+            <a:off x="554859" y="3051849"/>
+            <a:ext cx="956032" cy="606357"/>
+          </a:xfrm>
+          <a:prstGeom prst="rect">
+            <a:avLst/>
+          </a:prstGeom>
+          <a:solidFill>
+            <a:schemeClr val="bg1">
+              <a:lumMod val="75000"/>
+            </a:schemeClr>
+          </a:solidFill>
+          <a:ln w="15875">
+            <a:solidFill>
+              <a:srgbClr val="00C1DE"/>
+            </a:solidFill>
+          </a:ln>
+        </p:spPr>
+        <p:style>
+          <a:lnRef idx="2">
+            <a:schemeClr val="accent1">
+              <a:shade val="50000"/>
+            </a:schemeClr>
+          </a:lnRef>
+          <a:fillRef idx="1">
+            <a:schemeClr val="accent1"/>
+          </a:fillRef>
+          <a:effectRef idx="0">
+            <a:schemeClr val="accent1"/>
+          </a:effectRef>
+          <a:fontRef idx="minor">
+            <a:schemeClr val="lt1"/>
+          </a:fontRef>
+        </p:style>
+        <p:txBody>
+          <a:bodyPr rtlCol="0" anchor="ctr"/>
+          <a:lstStyle/>
+          <a:p>
+            <a:pPr algn="ctr" defTabSz="1219170" eaLnBrk="0" fontAlgn="base" hangingPunct="0">
+              <a:spcBef>
+                <a:spcPct val="0"/>
+              </a:spcBef>
+              <a:spcAft>
+                <a:spcPct val="0"/>
+              </a:spcAft>
+            </a:pPr>
+            <a:r>
+              <a:rPr lang="en-US" sz="1200" dirty="0">
+                <a:solidFill>
+                  <a:schemeClr val="tx1"/>
+                </a:solidFill>
+                <a:latin typeface="Aeonik" panose="020B0503030300000000" pitchFamily="34" charset="0"/>
+                <a:cs typeface="Calibri" panose="020F0502020204030204" pitchFamily="34" charset="0"/>
+              </a:rPr>
+              <a:t>data block</a:t>
+            </a:r>
+          </a:p>
+        </p:txBody>
+      </p:sp>
+      <p:sp>
+        <p:nvSpPr>
+          <p:cNvPr id="6" name="Rectangle 5">
+            <a:extLst>
+              <a:ext uri="{FF2B5EF4-FFF2-40B4-BE49-F238E27FC236}">
+                <a16:creationId xmlns:a16="http://schemas.microsoft.com/office/drawing/2014/main" id="{A1D9FC23-04EE-1E74-8DDB-F67529641187}"/>
+              </a:ext>
+            </a:extLst>
+          </p:cNvPr>
+          <p:cNvSpPr/>
+          <p:nvPr/>
+        </p:nvSpPr>
+        <p:spPr>
+          <a:xfrm>
+            <a:off x="554860" y="3651724"/>
+            <a:ext cx="956032" cy="201038"/>
+          </a:xfrm>
+          <a:prstGeom prst="rect">
+            <a:avLst/>
+          </a:prstGeom>
+          <a:solidFill>
+            <a:schemeClr val="bg1">
+              <a:lumMod val="95000"/>
+            </a:schemeClr>
+          </a:solidFill>
+          <a:ln w="15875">
+            <a:solidFill>
+              <a:srgbClr val="00C1DE"/>
+            </a:solidFill>
+          </a:ln>
+        </p:spPr>
+        <p:style>
+          <a:lnRef idx="2">
+            <a:schemeClr val="accent1">
+              <a:shade val="50000"/>
+            </a:schemeClr>
+          </a:lnRef>
+          <a:fillRef idx="1">
+            <a:schemeClr val="accent1"/>
+          </a:fillRef>
+          <a:effectRef idx="0">
+            <a:schemeClr val="accent1"/>
+          </a:effectRef>
+          <a:fontRef idx="minor">
+            <a:schemeClr val="lt1"/>
+          </a:fontRef>
+        </p:style>
+        <p:txBody>
+          <a:bodyPr rtlCol="0" anchor="ctr"/>
+          <a:lstStyle/>
+          <a:p>
+            <a:pPr algn="ctr" defTabSz="1219170" eaLnBrk="0" fontAlgn="base" hangingPunct="0">
+              <a:spcBef>
+                <a:spcPct val="0"/>
+              </a:spcBef>
+              <a:spcAft>
+                <a:spcPct val="0"/>
+              </a:spcAft>
+            </a:pPr>
+            <a:r>
+              <a:rPr lang="en-US" sz="1200" dirty="0">
+                <a:solidFill>
+                  <a:schemeClr val="tx1"/>
+                </a:solidFill>
+                <a:latin typeface="Aeonik" panose="020B0503030300000000" pitchFamily="34" charset="0"/>
+                <a:cs typeface="Calibri" panose="020F0502020204030204" pitchFamily="34" charset="0"/>
+              </a:rPr>
+              <a:t>timestamp</a:t>
+            </a:r>
+          </a:p>
+        </p:txBody>
+      </p:sp>
+      <p:sp>
+        <p:nvSpPr>
+          <p:cNvPr id="7" name="Rectangle 6">
+            <a:extLst>
+              <a:ext uri="{FF2B5EF4-FFF2-40B4-BE49-F238E27FC236}">
+                <a16:creationId xmlns:a16="http://schemas.microsoft.com/office/drawing/2014/main" id="{24481E57-FD43-4127-EB60-73CF406D5331}"/>
+              </a:ext>
+            </a:extLst>
+          </p:cNvPr>
+          <p:cNvSpPr/>
+          <p:nvPr/>
+        </p:nvSpPr>
+        <p:spPr>
+          <a:xfrm>
+            <a:off x="554860" y="3852762"/>
+            <a:ext cx="956032" cy="201038"/>
+          </a:xfrm>
+          <a:prstGeom prst="rect">
+            <a:avLst/>
+          </a:prstGeom>
+          <a:solidFill>
+            <a:schemeClr val="bg1">
+              <a:lumMod val="95000"/>
+            </a:schemeClr>
+          </a:solidFill>
+          <a:ln w="15875">
+            <a:solidFill>
+              <a:srgbClr val="00C1DE"/>
+            </a:solidFill>
+          </a:ln>
+        </p:spPr>
+        <p:style>
+          <a:lnRef idx="2">
+            <a:schemeClr val="accent1">
+              <a:shade val="50000"/>
+            </a:schemeClr>
+          </a:lnRef>
+          <a:fillRef idx="1">
+            <a:schemeClr val="accent1"/>
+          </a:fillRef>
+          <a:effectRef idx="0">
+            <a:schemeClr val="accent1"/>
+          </a:effectRef>
+          <a:fontRef idx="minor">
+            <a:schemeClr val="lt1"/>
+          </a:fontRef>
+        </p:style>
+        <p:txBody>
+          <a:bodyPr rtlCol="0" anchor="ctr"/>
+          <a:lstStyle/>
+          <a:p>
+            <a:pPr algn="ctr" defTabSz="1219170" eaLnBrk="0" fontAlgn="base" hangingPunct="0">
+              <a:spcBef>
+                <a:spcPct val="0"/>
+              </a:spcBef>
+              <a:spcAft>
+                <a:spcPct val="0"/>
+              </a:spcAft>
+            </a:pPr>
+            <a:r>
+              <a:rPr lang="en-US" sz="1200" dirty="0">
+                <a:solidFill>
+                  <a:schemeClr val="tx1"/>
+                </a:solidFill>
+                <a:latin typeface="Aeonik" panose="020B0503030300000000" pitchFamily="34" charset="0"/>
+                <a:cs typeface="Calibri" panose="020F0502020204030204" pitchFamily="34" charset="0"/>
+              </a:rPr>
+              <a:t>block size</a:t>
+            </a:r>
+          </a:p>
+        </p:txBody>
+      </p:sp>
+      <p:sp>
+        <p:nvSpPr>
+          <p:cNvPr id="8" name="Rectangle 7">
+            <a:extLst>
+              <a:ext uri="{FF2B5EF4-FFF2-40B4-BE49-F238E27FC236}">
+                <a16:creationId xmlns:a16="http://schemas.microsoft.com/office/drawing/2014/main" id="{D08FC379-5804-5B02-9332-0AF02165909B}"/>
+              </a:ext>
+            </a:extLst>
+          </p:cNvPr>
+          <p:cNvSpPr/>
+          <p:nvPr/>
+        </p:nvSpPr>
+        <p:spPr>
+          <a:xfrm>
+            <a:off x="554860" y="4053799"/>
+            <a:ext cx="956032" cy="606357"/>
+          </a:xfrm>
+          <a:prstGeom prst="rect">
+            <a:avLst/>
+          </a:prstGeom>
+          <a:solidFill>
+            <a:schemeClr val="bg1">
+              <a:lumMod val="95000"/>
+            </a:schemeClr>
+          </a:solidFill>
+          <a:ln w="15875">
+            <a:solidFill>
+              <a:srgbClr val="00C1DE"/>
+            </a:solidFill>
+          </a:ln>
+        </p:spPr>
+        <p:style>
+          <a:lnRef idx="2">
+            <a:schemeClr val="accent1">
+              <a:shade val="50000"/>
+            </a:schemeClr>
+          </a:lnRef>
+          <a:fillRef idx="1">
+            <a:schemeClr val="accent1"/>
+          </a:fillRef>
+          <a:effectRef idx="0">
+            <a:schemeClr val="accent1"/>
+          </a:effectRef>
+          <a:fontRef idx="minor">
+            <a:schemeClr val="lt1"/>
+          </a:fontRef>
+        </p:style>
+        <p:txBody>
+          <a:bodyPr rtlCol="0" anchor="ctr"/>
+          <a:lstStyle/>
+          <a:p>
+            <a:pPr algn="ctr" defTabSz="1219170" eaLnBrk="0" fontAlgn="base" hangingPunct="0">
+              <a:spcBef>
+                <a:spcPct val="0"/>
+              </a:spcBef>
+              <a:spcAft>
+                <a:spcPct val="0"/>
+              </a:spcAft>
+            </a:pPr>
+            <a:r>
+              <a:rPr lang="en-US" sz="1200" dirty="0">
+                <a:solidFill>
+                  <a:schemeClr val="tx1"/>
+                </a:solidFill>
+                <a:latin typeface="Aeonik" panose="020B0503030300000000" pitchFamily="34" charset="0"/>
+                <a:cs typeface="Calibri" panose="020F0502020204030204" pitchFamily="34" charset="0"/>
+              </a:rPr>
+              <a:t>data block</a:t>
+            </a:r>
+          </a:p>
+        </p:txBody>
+      </p:sp>
+      <p:sp>
+        <p:nvSpPr>
+          <p:cNvPr id="9" name="Rectangle 8">
+            <a:extLst>
+              <a:ext uri="{FF2B5EF4-FFF2-40B4-BE49-F238E27FC236}">
+                <a16:creationId xmlns:a16="http://schemas.microsoft.com/office/drawing/2014/main" id="{2762B8A7-327D-3F67-AFF2-F92810C171C7}"/>
+              </a:ext>
+            </a:extLst>
+          </p:cNvPr>
+          <p:cNvSpPr/>
+          <p:nvPr/>
+        </p:nvSpPr>
+        <p:spPr>
+          <a:xfrm>
+            <a:off x="554859" y="4666641"/>
+            <a:ext cx="956032" cy="201038"/>
+          </a:xfrm>
+          <a:prstGeom prst="rect">
+            <a:avLst/>
+          </a:prstGeom>
+          <a:solidFill>
+            <a:schemeClr val="bg1">
+              <a:lumMod val="75000"/>
+            </a:schemeClr>
+          </a:solidFill>
+          <a:ln w="15875">
+            <a:solidFill>
+              <a:srgbClr val="00C1DE"/>
+            </a:solidFill>
+          </a:ln>
+        </p:spPr>
+        <p:style>
+          <a:lnRef idx="2">
+            <a:schemeClr val="accent1">
+              <a:shade val="50000"/>
+            </a:schemeClr>
+          </a:lnRef>
+          <a:fillRef idx="1">
+            <a:schemeClr val="accent1"/>
+          </a:fillRef>
+          <a:effectRef idx="0">
+            <a:schemeClr val="accent1"/>
+          </a:effectRef>
+          <a:fontRef idx="minor">
+            <a:schemeClr val="lt1"/>
+          </a:fontRef>
+        </p:style>
+        <p:txBody>
+          <a:bodyPr rtlCol="0" anchor="ctr"/>
+          <a:lstStyle/>
+          <a:p>
+            <a:pPr algn="ctr" defTabSz="1219170" eaLnBrk="0" fontAlgn="base" hangingPunct="0">
+              <a:spcBef>
+                <a:spcPct val="0"/>
+              </a:spcBef>
+              <a:spcAft>
+                <a:spcPct val="0"/>
+              </a:spcAft>
+            </a:pPr>
+            <a:r>
+              <a:rPr lang="en-US" sz="1200" dirty="0">
+                <a:solidFill>
+                  <a:schemeClr val="tx1"/>
+                </a:solidFill>
+                <a:latin typeface="Aeonik" panose="020B0503030300000000" pitchFamily="34" charset="0"/>
+                <a:cs typeface="Calibri" panose="020F0502020204030204" pitchFamily="34" charset="0"/>
+              </a:rPr>
+              <a:t>timestamp</a:t>
+            </a:r>
+          </a:p>
+        </p:txBody>
+      </p:sp>
+      <p:sp>
+        <p:nvSpPr>
+          <p:cNvPr id="10" name="Rectangle 9">
+            <a:extLst>
+              <a:ext uri="{FF2B5EF4-FFF2-40B4-BE49-F238E27FC236}">
+                <a16:creationId xmlns:a16="http://schemas.microsoft.com/office/drawing/2014/main" id="{1A238A8D-5E1B-4B63-6B87-4B462F46D1A8}"/>
+              </a:ext>
+            </a:extLst>
+          </p:cNvPr>
+          <p:cNvSpPr/>
+          <p:nvPr/>
+        </p:nvSpPr>
+        <p:spPr>
+          <a:xfrm>
+            <a:off x="554859" y="4867679"/>
+            <a:ext cx="956032" cy="201038"/>
+          </a:xfrm>
+          <a:prstGeom prst="rect">
+            <a:avLst/>
+          </a:prstGeom>
+          <a:solidFill>
+            <a:schemeClr val="bg1">
+              <a:lumMod val="75000"/>
+            </a:schemeClr>
+          </a:solidFill>
+          <a:ln w="15875">
+            <a:solidFill>
+              <a:srgbClr val="00C1DE"/>
+            </a:solidFill>
+          </a:ln>
+        </p:spPr>
+        <p:style>
+          <a:lnRef idx="2">
+            <a:schemeClr val="accent1">
+              <a:shade val="50000"/>
+            </a:schemeClr>
+          </a:lnRef>
+          <a:fillRef idx="1">
+            <a:schemeClr val="accent1"/>
+          </a:fillRef>
+          <a:effectRef idx="0">
+            <a:schemeClr val="accent1"/>
+          </a:effectRef>
+          <a:fontRef idx="minor">
+            <a:schemeClr val="lt1"/>
+          </a:fontRef>
+        </p:style>
+        <p:txBody>
+          <a:bodyPr rtlCol="0" anchor="ctr"/>
+          <a:lstStyle/>
+          <a:p>
+            <a:pPr algn="ctr" defTabSz="1219170" eaLnBrk="0" fontAlgn="base" hangingPunct="0">
+              <a:spcBef>
+                <a:spcPct val="0"/>
+              </a:spcBef>
+              <a:spcAft>
+                <a:spcPct val="0"/>
+              </a:spcAft>
+            </a:pPr>
+            <a:r>
+              <a:rPr lang="en-US" sz="1200" dirty="0">
+                <a:solidFill>
+                  <a:schemeClr val="tx1"/>
+                </a:solidFill>
+                <a:latin typeface="Aeonik" panose="020B0503030300000000" pitchFamily="34" charset="0"/>
+                <a:cs typeface="Calibri" panose="020F0502020204030204" pitchFamily="34" charset="0"/>
+              </a:rPr>
+              <a:t>block size</a:t>
+            </a:r>
+          </a:p>
+        </p:txBody>
+      </p:sp>
+      <p:cxnSp>
+        <p:nvCxnSpPr>
+          <p:cNvPr id="11" name="Straight Connector 10">
+            <a:extLst>
+              <a:ext uri="{FF2B5EF4-FFF2-40B4-BE49-F238E27FC236}">
+                <a16:creationId xmlns:a16="http://schemas.microsoft.com/office/drawing/2014/main" id="{0277E518-22E2-4732-5259-8637BDB8C2CC}"/>
+              </a:ext>
+            </a:extLst>
+          </p:cNvPr>
+          <p:cNvCxnSpPr>
+            <a:cxnSpLocks/>
+          </p:cNvCxnSpPr>
+          <p:nvPr/>
+        </p:nvCxnSpPr>
+        <p:spPr>
+          <a:xfrm>
+            <a:off x="554859" y="5068717"/>
+            <a:ext cx="0" cy="295072"/>
+          </a:xfrm>
+          <a:prstGeom prst="line">
+            <a:avLst/>
+          </a:prstGeom>
+          <a:solidFill>
+            <a:schemeClr val="bg1">
+              <a:lumMod val="95000"/>
+            </a:schemeClr>
+          </a:solidFill>
+          <a:ln w="15875">
+            <a:solidFill>
+              <a:srgbClr val="00C1DE"/>
+            </a:solidFill>
+            <a:prstDash val="dash"/>
+          </a:ln>
+        </p:spPr>
+        <p:style>
+          <a:lnRef idx="2">
+            <a:schemeClr val="accent1">
+              <a:shade val="50000"/>
+            </a:schemeClr>
+          </a:lnRef>
+          <a:fillRef idx="1">
+            <a:schemeClr val="accent1"/>
+          </a:fillRef>
+          <a:effectRef idx="0">
+            <a:schemeClr val="accent1"/>
+          </a:effectRef>
+          <a:fontRef idx="minor">
+            <a:schemeClr val="lt1"/>
+          </a:fontRef>
+        </p:style>
+      </p:cxnSp>
+      <p:cxnSp>
+        <p:nvCxnSpPr>
+          <p:cNvPr id="12" name="Straight Connector 11">
+            <a:extLst>
+              <a:ext uri="{FF2B5EF4-FFF2-40B4-BE49-F238E27FC236}">
+                <a16:creationId xmlns:a16="http://schemas.microsoft.com/office/drawing/2014/main" id="{B76052C5-4EB0-AA1E-201F-295800017F99}"/>
+              </a:ext>
+            </a:extLst>
+          </p:cNvPr>
+          <p:cNvCxnSpPr>
+            <a:cxnSpLocks/>
+          </p:cNvCxnSpPr>
+          <p:nvPr/>
+        </p:nvCxnSpPr>
+        <p:spPr>
+          <a:xfrm>
+            <a:off x="1510891" y="5068717"/>
+            <a:ext cx="0" cy="295072"/>
+          </a:xfrm>
+          <a:prstGeom prst="line">
+            <a:avLst/>
+          </a:prstGeom>
+          <a:solidFill>
+            <a:schemeClr val="bg1">
+              <a:lumMod val="95000"/>
+            </a:schemeClr>
+          </a:solidFill>
+          <a:ln w="15875">
+            <a:solidFill>
+              <a:srgbClr val="00C1DE"/>
+            </a:solidFill>
+            <a:prstDash val="dash"/>
+          </a:ln>
+        </p:spPr>
+        <p:style>
+          <a:lnRef idx="2">
+            <a:schemeClr val="accent1">
+              <a:shade val="50000"/>
+            </a:schemeClr>
+          </a:lnRef>
+          <a:fillRef idx="1">
+            <a:schemeClr val="accent1"/>
+          </a:fillRef>
+          <a:effectRef idx="0">
+            <a:schemeClr val="accent1"/>
+          </a:effectRef>
+          <a:fontRef idx="minor">
+            <a:schemeClr val="lt1"/>
+          </a:fontRef>
+        </p:style>
+      </p:cxnSp>
+      <p:sp>
+        <p:nvSpPr>
+          <p:cNvPr id="13" name="TextBox 12">
+            <a:extLst>
+              <a:ext uri="{FF2B5EF4-FFF2-40B4-BE49-F238E27FC236}">
+                <a16:creationId xmlns:a16="http://schemas.microsoft.com/office/drawing/2014/main" id="{769D12FA-B1F8-E274-908D-FC76038A889F}"/>
+              </a:ext>
+            </a:extLst>
+          </p:cNvPr>
+          <p:cNvSpPr txBox="1"/>
+          <p:nvPr/>
+        </p:nvSpPr>
+        <p:spPr>
+          <a:xfrm>
+            <a:off x="539986" y="2358218"/>
+            <a:ext cx="1021408" cy="142347"/>
+          </a:xfrm>
+          <a:prstGeom prst="rect">
+            <a:avLst/>
+          </a:prstGeom>
+          <a:noFill/>
+        </p:spPr>
+        <p:txBody>
+          <a:bodyPr wrap="square" lIns="0" tIns="0" rIns="0" bIns="0" rtlCol="0">
+            <a:spAutoFit/>
+          </a:bodyPr>
+          <a:lstStyle/>
+          <a:p>
+            <a:pPr marL="0" indent="0" algn="l" defTabSz="914400" rtl="0" eaLnBrk="1" latinLnBrk="0" hangingPunct="1">
+              <a:lnSpc>
+                <a:spcPct val="90000"/>
+              </a:lnSpc>
+              <a:spcBef>
+                <a:spcPts val="0"/>
+              </a:spcBef>
+              <a:spcAft>
+                <a:spcPts val="600"/>
+              </a:spcAft>
+              <a:buFont typeface="Arial" panose="020B0604020202020204" pitchFamily="34" charset="0"/>
+              <a:buNone/>
+            </a:pPr>
+            <a:r>
+              <a:rPr lang="en-US" sz="1000" b="1" dirty="0">
+                <a:solidFill>
+                  <a:schemeClr val="tx2"/>
+                </a:solidFill>
+                <a:latin typeface="Courier New" panose="02070309020205020404" pitchFamily="49" charset="0"/>
+                <a:cs typeface="Courier New" panose="02070309020205020404" pitchFamily="49" charset="0"/>
+              </a:rPr>
+              <a:t>SCinput.0.sds</a:t>
+            </a:r>
+            <a:endParaRPr lang="en-US" sz="1000" b="1" kern="1200" dirty="0">
+              <a:solidFill>
+                <a:schemeClr val="tx2"/>
+              </a:solidFill>
+              <a:latin typeface="Courier New" panose="02070309020205020404" pitchFamily="49" charset="0"/>
+              <a:cs typeface="Courier New" panose="02070309020205020404" pitchFamily="49" charset="0"/>
+            </a:endParaRPr>
+          </a:p>
+        </p:txBody>
+      </p:sp>
+      <p:sp>
+        <p:nvSpPr>
+          <p:cNvPr id="14" name="Rectangle 13">
+            <a:extLst>
+              <a:ext uri="{FF2B5EF4-FFF2-40B4-BE49-F238E27FC236}">
+                <a16:creationId xmlns:a16="http://schemas.microsoft.com/office/drawing/2014/main" id="{B1D5F663-8FDF-D142-D206-934EA2CDC203}"/>
+              </a:ext>
+            </a:extLst>
+          </p:cNvPr>
+          <p:cNvSpPr/>
+          <p:nvPr/>
+        </p:nvSpPr>
+        <p:spPr>
+          <a:xfrm>
+            <a:off x="2339506" y="2665440"/>
+            <a:ext cx="956032" cy="201038"/>
+          </a:xfrm>
+          <a:prstGeom prst="rect">
+            <a:avLst/>
+          </a:prstGeom>
+          <a:solidFill>
+            <a:schemeClr val="bg1">
+              <a:lumMod val="75000"/>
+            </a:schemeClr>
+          </a:solidFill>
+          <a:ln w="15875">
+            <a:solidFill>
+              <a:srgbClr val="00C1DE"/>
+            </a:solidFill>
+          </a:ln>
+        </p:spPr>
+        <p:style>
+          <a:lnRef idx="2">
+            <a:schemeClr val="accent1">
+              <a:shade val="50000"/>
+            </a:schemeClr>
+          </a:lnRef>
+          <a:fillRef idx="1">
+            <a:schemeClr val="accent1"/>
+          </a:fillRef>
+          <a:effectRef idx="0">
+            <a:schemeClr val="accent1"/>
+          </a:effectRef>
+          <a:fontRef idx="minor">
+            <a:schemeClr val="lt1"/>
+          </a:fontRef>
+        </p:style>
+        <p:txBody>
+          <a:bodyPr rtlCol="0" anchor="ctr"/>
+          <a:lstStyle/>
+          <a:p>
+            <a:pPr algn="ctr" defTabSz="1219170" eaLnBrk="0" fontAlgn="base" hangingPunct="0">
+              <a:spcBef>
+                <a:spcPct val="0"/>
+              </a:spcBef>
+              <a:spcAft>
+                <a:spcPct val="0"/>
+              </a:spcAft>
+            </a:pPr>
+            <a:r>
+              <a:rPr lang="en-US" sz="1200" dirty="0">
+                <a:solidFill>
+                  <a:schemeClr val="tx1"/>
+                </a:solidFill>
+                <a:latin typeface="Aeonik" panose="020B0503030300000000" pitchFamily="34" charset="0"/>
+                <a:cs typeface="Calibri" panose="020F0502020204030204" pitchFamily="34" charset="0"/>
+              </a:rPr>
+              <a:t>timestamp</a:t>
+            </a:r>
+          </a:p>
+        </p:txBody>
+      </p:sp>
+      <p:sp>
+        <p:nvSpPr>
+          <p:cNvPr id="15" name="Rectangle 14">
+            <a:extLst>
+              <a:ext uri="{FF2B5EF4-FFF2-40B4-BE49-F238E27FC236}">
+                <a16:creationId xmlns:a16="http://schemas.microsoft.com/office/drawing/2014/main" id="{C17155FF-F44A-80BF-47D9-CE669DD8C0BD}"/>
+              </a:ext>
+            </a:extLst>
+          </p:cNvPr>
+          <p:cNvSpPr/>
+          <p:nvPr/>
+        </p:nvSpPr>
+        <p:spPr>
+          <a:xfrm>
+            <a:off x="2339506" y="2866478"/>
+            <a:ext cx="956032" cy="201038"/>
+          </a:xfrm>
+          <a:prstGeom prst="rect">
+            <a:avLst/>
+          </a:prstGeom>
+          <a:solidFill>
+            <a:schemeClr val="bg1">
+              <a:lumMod val="75000"/>
+            </a:schemeClr>
+          </a:solidFill>
+          <a:ln w="15875">
+            <a:solidFill>
+              <a:srgbClr val="00C1DE"/>
+            </a:solidFill>
+          </a:ln>
+        </p:spPr>
+        <p:style>
+          <a:lnRef idx="2">
+            <a:schemeClr val="accent1">
+              <a:shade val="50000"/>
+            </a:schemeClr>
+          </a:lnRef>
+          <a:fillRef idx="1">
+            <a:schemeClr val="accent1"/>
+          </a:fillRef>
+          <a:effectRef idx="0">
+            <a:schemeClr val="accent1"/>
+          </a:effectRef>
+          <a:fontRef idx="minor">
+            <a:schemeClr val="lt1"/>
+          </a:fontRef>
+        </p:style>
+        <p:txBody>
+          <a:bodyPr rtlCol="0" anchor="ctr"/>
+          <a:lstStyle/>
+          <a:p>
+            <a:pPr algn="ctr" defTabSz="1219170" eaLnBrk="0" fontAlgn="base" hangingPunct="0">
+              <a:spcBef>
+                <a:spcPct val="0"/>
+              </a:spcBef>
+              <a:spcAft>
+                <a:spcPct val="0"/>
+              </a:spcAft>
+            </a:pPr>
+            <a:r>
+              <a:rPr lang="en-US" sz="1200" dirty="0">
+                <a:solidFill>
+                  <a:schemeClr val="tx1"/>
+                </a:solidFill>
+                <a:latin typeface="Aeonik" panose="020B0503030300000000" pitchFamily="34" charset="0"/>
+                <a:cs typeface="Calibri" panose="020F0502020204030204" pitchFamily="34" charset="0"/>
+              </a:rPr>
+              <a:t>block size</a:t>
+            </a:r>
+          </a:p>
+        </p:txBody>
+      </p:sp>
+      <p:sp>
+        <p:nvSpPr>
+          <p:cNvPr id="16" name="Rectangle 15">
+            <a:extLst>
+              <a:ext uri="{FF2B5EF4-FFF2-40B4-BE49-F238E27FC236}">
+                <a16:creationId xmlns:a16="http://schemas.microsoft.com/office/drawing/2014/main" id="{D99ED505-C388-0CFC-29D7-94E5B9B5ABBD}"/>
+              </a:ext>
+            </a:extLst>
+          </p:cNvPr>
+          <p:cNvSpPr/>
+          <p:nvPr/>
+        </p:nvSpPr>
+        <p:spPr>
+          <a:xfrm>
+            <a:off x="2339506" y="3067515"/>
+            <a:ext cx="956032" cy="606357"/>
+          </a:xfrm>
+          <a:prstGeom prst="rect">
+            <a:avLst/>
+          </a:prstGeom>
+          <a:solidFill>
+            <a:schemeClr val="bg1">
+              <a:lumMod val="75000"/>
+            </a:schemeClr>
+          </a:solidFill>
+          <a:ln w="15875">
+            <a:solidFill>
+              <a:srgbClr val="00C1DE"/>
+            </a:solidFill>
+          </a:ln>
+        </p:spPr>
+        <p:style>
+          <a:lnRef idx="2">
+            <a:schemeClr val="accent1">
+              <a:shade val="50000"/>
+            </a:schemeClr>
+          </a:lnRef>
+          <a:fillRef idx="1">
+            <a:schemeClr val="accent1"/>
+          </a:fillRef>
+          <a:effectRef idx="0">
+            <a:schemeClr val="accent1"/>
+          </a:effectRef>
+          <a:fontRef idx="minor">
+            <a:schemeClr val="lt1"/>
+          </a:fontRef>
+        </p:style>
+        <p:txBody>
+          <a:bodyPr rtlCol="0" anchor="ctr"/>
+          <a:lstStyle/>
+          <a:p>
+            <a:pPr algn="ctr" defTabSz="1219170" eaLnBrk="0" fontAlgn="base" hangingPunct="0">
+              <a:spcBef>
+                <a:spcPct val="0"/>
+              </a:spcBef>
+              <a:spcAft>
+                <a:spcPct val="0"/>
+              </a:spcAft>
+            </a:pPr>
+            <a:r>
+              <a:rPr lang="en-US" sz="1200" dirty="0">
+                <a:solidFill>
+                  <a:schemeClr val="tx1"/>
+                </a:solidFill>
+                <a:latin typeface="Aeonik" panose="020B0503030300000000" pitchFamily="34" charset="0"/>
+                <a:cs typeface="Calibri" panose="020F0502020204030204" pitchFamily="34" charset="0"/>
+              </a:rPr>
+              <a:t>data block</a:t>
+            </a:r>
+          </a:p>
+        </p:txBody>
+      </p:sp>
+      <p:sp>
+        <p:nvSpPr>
+          <p:cNvPr id="17" name="Rectangle 16">
+            <a:extLst>
+              <a:ext uri="{FF2B5EF4-FFF2-40B4-BE49-F238E27FC236}">
+                <a16:creationId xmlns:a16="http://schemas.microsoft.com/office/drawing/2014/main" id="{AA974E03-B1B0-6E63-A51F-88E7E505A721}"/>
+              </a:ext>
+            </a:extLst>
+          </p:cNvPr>
+          <p:cNvSpPr/>
+          <p:nvPr/>
+        </p:nvSpPr>
+        <p:spPr>
+          <a:xfrm>
+            <a:off x="2339507" y="3667390"/>
+            <a:ext cx="956032" cy="201038"/>
+          </a:xfrm>
+          <a:prstGeom prst="rect">
+            <a:avLst/>
+          </a:prstGeom>
+          <a:solidFill>
+            <a:schemeClr val="bg1">
+              <a:lumMod val="95000"/>
+            </a:schemeClr>
+          </a:solidFill>
+          <a:ln w="15875">
+            <a:solidFill>
+              <a:srgbClr val="00C1DE"/>
+            </a:solidFill>
+          </a:ln>
+        </p:spPr>
+        <p:style>
+          <a:lnRef idx="2">
+            <a:schemeClr val="accent1">
+              <a:shade val="50000"/>
+            </a:schemeClr>
+          </a:lnRef>
+          <a:fillRef idx="1">
+            <a:schemeClr val="accent1"/>
+          </a:fillRef>
+          <a:effectRef idx="0">
+            <a:schemeClr val="accent1"/>
+          </a:effectRef>
+          <a:fontRef idx="minor">
+            <a:schemeClr val="lt1"/>
+          </a:fontRef>
+        </p:style>
+        <p:txBody>
+          <a:bodyPr rtlCol="0" anchor="ctr"/>
+          <a:lstStyle/>
+          <a:p>
+            <a:pPr algn="ctr" defTabSz="1219170" eaLnBrk="0" fontAlgn="base" hangingPunct="0">
+              <a:spcBef>
+                <a:spcPct val="0"/>
+              </a:spcBef>
+              <a:spcAft>
+                <a:spcPct val="0"/>
+              </a:spcAft>
+            </a:pPr>
+            <a:r>
+              <a:rPr lang="en-US" sz="1200" dirty="0">
+                <a:solidFill>
+                  <a:schemeClr val="tx1"/>
+                </a:solidFill>
+                <a:latin typeface="Aeonik" panose="020B0503030300000000" pitchFamily="34" charset="0"/>
+                <a:cs typeface="Calibri" panose="020F0502020204030204" pitchFamily="34" charset="0"/>
+              </a:rPr>
+              <a:t>timestamp</a:t>
+            </a:r>
+          </a:p>
+        </p:txBody>
+      </p:sp>
+      <p:sp>
+        <p:nvSpPr>
+          <p:cNvPr id="18" name="Rectangle 17">
+            <a:extLst>
+              <a:ext uri="{FF2B5EF4-FFF2-40B4-BE49-F238E27FC236}">
+                <a16:creationId xmlns:a16="http://schemas.microsoft.com/office/drawing/2014/main" id="{7211C269-FD62-DB9D-78E6-F4D731D27F39}"/>
+              </a:ext>
+            </a:extLst>
+          </p:cNvPr>
+          <p:cNvSpPr/>
+          <p:nvPr/>
+        </p:nvSpPr>
+        <p:spPr>
+          <a:xfrm>
+            <a:off x="2339507" y="3868428"/>
+            <a:ext cx="956032" cy="201038"/>
+          </a:xfrm>
+          <a:prstGeom prst="rect">
+            <a:avLst/>
+          </a:prstGeom>
+          <a:solidFill>
+            <a:schemeClr val="bg1">
+              <a:lumMod val="95000"/>
+            </a:schemeClr>
+          </a:solidFill>
+          <a:ln w="15875">
+            <a:solidFill>
+              <a:srgbClr val="00C1DE"/>
+            </a:solidFill>
+          </a:ln>
+        </p:spPr>
+        <p:style>
+          <a:lnRef idx="2">
+            <a:schemeClr val="accent1">
+              <a:shade val="50000"/>
+            </a:schemeClr>
+          </a:lnRef>
+          <a:fillRef idx="1">
+            <a:schemeClr val="accent1"/>
+          </a:fillRef>
+          <a:effectRef idx="0">
+            <a:schemeClr val="accent1"/>
+          </a:effectRef>
+          <a:fontRef idx="minor">
+            <a:schemeClr val="lt1"/>
+          </a:fontRef>
+        </p:style>
+        <p:txBody>
+          <a:bodyPr rtlCol="0" anchor="ctr"/>
+          <a:lstStyle/>
+          <a:p>
+            <a:pPr algn="ctr" defTabSz="1219170" eaLnBrk="0" fontAlgn="base" hangingPunct="0">
+              <a:spcBef>
+                <a:spcPct val="0"/>
+              </a:spcBef>
+              <a:spcAft>
+                <a:spcPct val="0"/>
+              </a:spcAft>
+            </a:pPr>
+            <a:r>
+              <a:rPr lang="en-US" sz="1200" dirty="0">
+                <a:solidFill>
+                  <a:schemeClr val="tx1"/>
+                </a:solidFill>
+                <a:latin typeface="Aeonik" panose="020B0503030300000000" pitchFamily="34" charset="0"/>
+                <a:cs typeface="Calibri" panose="020F0502020204030204" pitchFamily="34" charset="0"/>
+              </a:rPr>
+              <a:t>block size</a:t>
+            </a:r>
+          </a:p>
+        </p:txBody>
+      </p:sp>
+      <p:sp>
+        <p:nvSpPr>
+          <p:cNvPr id="19" name="Rectangle 18">
+            <a:extLst>
+              <a:ext uri="{FF2B5EF4-FFF2-40B4-BE49-F238E27FC236}">
+                <a16:creationId xmlns:a16="http://schemas.microsoft.com/office/drawing/2014/main" id="{ACC94616-5F9B-AFCA-CC1D-A6DD3995BC07}"/>
+              </a:ext>
+            </a:extLst>
+          </p:cNvPr>
+          <p:cNvSpPr/>
+          <p:nvPr/>
+        </p:nvSpPr>
+        <p:spPr>
+          <a:xfrm>
+            <a:off x="2339507" y="4069465"/>
+            <a:ext cx="956032" cy="606357"/>
+          </a:xfrm>
+          <a:prstGeom prst="rect">
+            <a:avLst/>
+          </a:prstGeom>
+          <a:solidFill>
+            <a:schemeClr val="bg1">
+              <a:lumMod val="95000"/>
+            </a:schemeClr>
+          </a:solidFill>
+          <a:ln w="15875">
+            <a:solidFill>
+              <a:srgbClr val="00C1DE"/>
+            </a:solidFill>
+          </a:ln>
+        </p:spPr>
+        <p:style>
+          <a:lnRef idx="2">
+            <a:schemeClr val="accent1">
+              <a:shade val="50000"/>
+            </a:schemeClr>
+          </a:lnRef>
+          <a:fillRef idx="1">
+            <a:schemeClr val="accent1"/>
+          </a:fillRef>
+          <a:effectRef idx="0">
+            <a:schemeClr val="accent1"/>
+          </a:effectRef>
+          <a:fontRef idx="minor">
+            <a:schemeClr val="lt1"/>
+          </a:fontRef>
+        </p:style>
+        <p:txBody>
+          <a:bodyPr rtlCol="0" anchor="ctr"/>
+          <a:lstStyle/>
+          <a:p>
+            <a:pPr algn="ctr" defTabSz="1219170" eaLnBrk="0" fontAlgn="base" hangingPunct="0">
+              <a:spcBef>
+                <a:spcPct val="0"/>
+              </a:spcBef>
+              <a:spcAft>
+                <a:spcPct val="0"/>
+              </a:spcAft>
+            </a:pPr>
+            <a:r>
+              <a:rPr lang="en-US" sz="1200" dirty="0">
+                <a:solidFill>
+                  <a:schemeClr val="tx1"/>
+                </a:solidFill>
+                <a:latin typeface="Aeonik" panose="020B0503030300000000" pitchFamily="34" charset="0"/>
+                <a:cs typeface="Calibri" panose="020F0502020204030204" pitchFamily="34" charset="0"/>
+              </a:rPr>
+              <a:t>data block</a:t>
+            </a:r>
+          </a:p>
+        </p:txBody>
+      </p:sp>
+      <p:sp>
+        <p:nvSpPr>
+          <p:cNvPr id="20" name="Rectangle 19">
+            <a:extLst>
+              <a:ext uri="{FF2B5EF4-FFF2-40B4-BE49-F238E27FC236}">
+                <a16:creationId xmlns:a16="http://schemas.microsoft.com/office/drawing/2014/main" id="{8E616A00-C10B-457A-2ADD-A33349A77D8B}"/>
+              </a:ext>
+            </a:extLst>
+          </p:cNvPr>
+          <p:cNvSpPr/>
+          <p:nvPr/>
+        </p:nvSpPr>
+        <p:spPr>
+          <a:xfrm>
+            <a:off x="2339506" y="5126689"/>
+            <a:ext cx="956032" cy="201038"/>
+          </a:xfrm>
+          <a:prstGeom prst="rect">
+            <a:avLst/>
+          </a:prstGeom>
+          <a:solidFill>
+            <a:schemeClr val="bg1">
+              <a:lumMod val="75000"/>
+            </a:schemeClr>
+          </a:solidFill>
+          <a:ln w="15875">
+            <a:solidFill>
+              <a:srgbClr val="00C1DE"/>
+            </a:solidFill>
+          </a:ln>
+        </p:spPr>
+        <p:style>
+          <a:lnRef idx="2">
+            <a:schemeClr val="accent1">
+              <a:shade val="50000"/>
+            </a:schemeClr>
+          </a:lnRef>
+          <a:fillRef idx="1">
+            <a:schemeClr val="accent1"/>
+          </a:fillRef>
+          <a:effectRef idx="0">
+            <a:schemeClr val="accent1"/>
+          </a:effectRef>
+          <a:fontRef idx="minor">
+            <a:schemeClr val="lt1"/>
+          </a:fontRef>
+        </p:style>
+        <p:txBody>
+          <a:bodyPr rtlCol="0" anchor="ctr"/>
+          <a:lstStyle/>
+          <a:p>
+            <a:pPr algn="ctr" defTabSz="1219170" eaLnBrk="0" fontAlgn="base" hangingPunct="0">
+              <a:spcBef>
+                <a:spcPct val="0"/>
+              </a:spcBef>
+              <a:spcAft>
+                <a:spcPct val="0"/>
+              </a:spcAft>
+            </a:pPr>
+            <a:r>
+              <a:rPr lang="en-US" sz="1200" dirty="0">
+                <a:solidFill>
+                  <a:schemeClr val="tx1"/>
+                </a:solidFill>
+                <a:latin typeface="Aeonik" panose="020B0503030300000000" pitchFamily="34" charset="0"/>
+                <a:cs typeface="Calibri" panose="020F0502020204030204" pitchFamily="34" charset="0"/>
+              </a:rPr>
+              <a:t>timestamp</a:t>
+            </a:r>
+          </a:p>
+        </p:txBody>
+      </p:sp>
+      <p:sp>
+        <p:nvSpPr>
+          <p:cNvPr id="21" name="Rectangle 20">
+            <a:extLst>
+              <a:ext uri="{FF2B5EF4-FFF2-40B4-BE49-F238E27FC236}">
+                <a16:creationId xmlns:a16="http://schemas.microsoft.com/office/drawing/2014/main" id="{E8374B28-549A-2E7A-88EC-023C1831C96F}"/>
+              </a:ext>
+            </a:extLst>
+          </p:cNvPr>
+          <p:cNvSpPr/>
+          <p:nvPr/>
+        </p:nvSpPr>
+        <p:spPr>
+          <a:xfrm>
+            <a:off x="2339506" y="5327727"/>
+            <a:ext cx="956032" cy="201038"/>
+          </a:xfrm>
+          <a:prstGeom prst="rect">
+            <a:avLst/>
+          </a:prstGeom>
+          <a:solidFill>
+            <a:schemeClr val="bg1">
+              <a:lumMod val="75000"/>
+            </a:schemeClr>
+          </a:solidFill>
+          <a:ln w="15875">
+            <a:solidFill>
+              <a:srgbClr val="00C1DE"/>
+            </a:solidFill>
+          </a:ln>
+        </p:spPr>
+        <p:style>
+          <a:lnRef idx="2">
+            <a:schemeClr val="accent1">
+              <a:shade val="50000"/>
+            </a:schemeClr>
+          </a:lnRef>
+          <a:fillRef idx="1">
+            <a:schemeClr val="accent1"/>
+          </a:fillRef>
+          <a:effectRef idx="0">
+            <a:schemeClr val="accent1"/>
+          </a:effectRef>
+          <a:fontRef idx="minor">
+            <a:schemeClr val="lt1"/>
+          </a:fontRef>
+        </p:style>
+        <p:txBody>
+          <a:bodyPr rtlCol="0" anchor="ctr"/>
+          <a:lstStyle/>
+          <a:p>
+            <a:pPr algn="ctr" defTabSz="1219170" eaLnBrk="0" fontAlgn="base" hangingPunct="0">
+              <a:spcBef>
+                <a:spcPct val="0"/>
+              </a:spcBef>
+              <a:spcAft>
+                <a:spcPct val="0"/>
+              </a:spcAft>
+            </a:pPr>
+            <a:r>
+              <a:rPr lang="en-US" sz="1200" dirty="0">
+                <a:solidFill>
+                  <a:schemeClr val="tx1"/>
+                </a:solidFill>
+                <a:latin typeface="Aeonik" panose="020B0503030300000000" pitchFamily="34" charset="0"/>
+                <a:cs typeface="Calibri" panose="020F0502020204030204" pitchFamily="34" charset="0"/>
+              </a:rPr>
+              <a:t>block size</a:t>
+            </a:r>
+          </a:p>
+        </p:txBody>
+      </p:sp>
+      <p:cxnSp>
+        <p:nvCxnSpPr>
+          <p:cNvPr id="22" name="Straight Connector 21">
+            <a:extLst>
+              <a:ext uri="{FF2B5EF4-FFF2-40B4-BE49-F238E27FC236}">
+                <a16:creationId xmlns:a16="http://schemas.microsoft.com/office/drawing/2014/main" id="{72103992-B9A6-5F27-98F9-914D63613318}"/>
+              </a:ext>
+            </a:extLst>
+          </p:cNvPr>
+          <p:cNvCxnSpPr>
+            <a:cxnSpLocks/>
+          </p:cNvCxnSpPr>
+          <p:nvPr/>
+        </p:nvCxnSpPr>
+        <p:spPr>
+          <a:xfrm>
+            <a:off x="2339506" y="5528765"/>
+            <a:ext cx="0" cy="295072"/>
+          </a:xfrm>
+          <a:prstGeom prst="line">
+            <a:avLst/>
+          </a:prstGeom>
+          <a:solidFill>
+            <a:schemeClr val="bg1">
+              <a:lumMod val="95000"/>
+            </a:schemeClr>
+          </a:solidFill>
+          <a:ln w="15875">
+            <a:solidFill>
+              <a:srgbClr val="00C1DE"/>
+            </a:solidFill>
+            <a:prstDash val="dash"/>
+          </a:ln>
+        </p:spPr>
+        <p:style>
+          <a:lnRef idx="2">
+            <a:schemeClr val="accent1">
+              <a:shade val="50000"/>
+            </a:schemeClr>
+          </a:lnRef>
+          <a:fillRef idx="1">
+            <a:schemeClr val="accent1"/>
+          </a:fillRef>
+          <a:effectRef idx="0">
+            <a:schemeClr val="accent1"/>
+          </a:effectRef>
+          <a:fontRef idx="minor">
+            <a:schemeClr val="lt1"/>
+          </a:fontRef>
+        </p:style>
+      </p:cxnSp>
+      <p:cxnSp>
+        <p:nvCxnSpPr>
+          <p:cNvPr id="23" name="Straight Connector 22">
+            <a:extLst>
+              <a:ext uri="{FF2B5EF4-FFF2-40B4-BE49-F238E27FC236}">
+                <a16:creationId xmlns:a16="http://schemas.microsoft.com/office/drawing/2014/main" id="{BD5BF75B-75B0-A9D9-57E6-1ABC29B7115F}"/>
+              </a:ext>
+            </a:extLst>
+          </p:cNvPr>
+          <p:cNvCxnSpPr>
+            <a:cxnSpLocks/>
+          </p:cNvCxnSpPr>
+          <p:nvPr/>
+        </p:nvCxnSpPr>
+        <p:spPr>
+          <a:xfrm>
+            <a:off x="3295538" y="5528765"/>
+            <a:ext cx="0" cy="295072"/>
+          </a:xfrm>
+          <a:prstGeom prst="line">
+            <a:avLst/>
+          </a:prstGeom>
+          <a:solidFill>
+            <a:schemeClr val="bg1">
+              <a:lumMod val="95000"/>
+            </a:schemeClr>
+          </a:solidFill>
+          <a:ln w="15875">
+            <a:solidFill>
+              <a:srgbClr val="00C1DE"/>
+            </a:solidFill>
+            <a:prstDash val="dash"/>
+          </a:ln>
+        </p:spPr>
+        <p:style>
+          <a:lnRef idx="2">
+            <a:schemeClr val="accent1">
+              <a:shade val="50000"/>
+            </a:schemeClr>
+          </a:lnRef>
+          <a:fillRef idx="1">
+            <a:schemeClr val="accent1"/>
+          </a:fillRef>
+          <a:effectRef idx="0">
+            <a:schemeClr val="accent1"/>
+          </a:effectRef>
+          <a:fontRef idx="minor">
+            <a:schemeClr val="lt1"/>
+          </a:fontRef>
+        </p:style>
+      </p:cxnSp>
+      <p:sp>
+        <p:nvSpPr>
+          <p:cNvPr id="24" name="TextBox 23">
+            <a:extLst>
+              <a:ext uri="{FF2B5EF4-FFF2-40B4-BE49-F238E27FC236}">
+                <a16:creationId xmlns:a16="http://schemas.microsoft.com/office/drawing/2014/main" id="{3ED302BD-2E2C-7BE9-C366-022C280BCA31}"/>
+              </a:ext>
+            </a:extLst>
+          </p:cNvPr>
+          <p:cNvSpPr txBox="1"/>
+          <p:nvPr/>
+        </p:nvSpPr>
+        <p:spPr>
+          <a:xfrm>
+            <a:off x="2076630" y="2373884"/>
+            <a:ext cx="1572422" cy="142347"/>
+          </a:xfrm>
+          <a:prstGeom prst="rect">
+            <a:avLst/>
+          </a:prstGeom>
+          <a:noFill/>
+        </p:spPr>
+        <p:txBody>
+          <a:bodyPr wrap="square" lIns="0" tIns="0" rIns="0" bIns="0" rtlCol="0">
+            <a:spAutoFit/>
+          </a:bodyPr>
+          <a:lstStyle/>
+          <a:p>
+            <a:pPr marL="0" indent="0" algn="l" defTabSz="914400" rtl="0" eaLnBrk="1" latinLnBrk="0" hangingPunct="1">
+              <a:lnSpc>
+                <a:spcPct val="90000"/>
+              </a:lnSpc>
+              <a:spcBef>
+                <a:spcPts val="0"/>
+              </a:spcBef>
+              <a:spcAft>
+                <a:spcPts val="600"/>
+              </a:spcAft>
+              <a:buFont typeface="Arial" panose="020B0604020202020204" pitchFamily="34" charset="0"/>
+              <a:buNone/>
+            </a:pPr>
+            <a:r>
+              <a:rPr lang="en-US" sz="1000" b="1" dirty="0">
+                <a:solidFill>
+                  <a:schemeClr val="tx2"/>
+                </a:solidFill>
+                <a:latin typeface="Courier New" panose="02070309020205020404" pitchFamily="49" charset="0"/>
+                <a:cs typeface="Courier New" panose="02070309020205020404" pitchFamily="49" charset="0"/>
+              </a:rPr>
+              <a:t>SCinput.0+LabelA.sds</a:t>
+            </a:r>
+            <a:endParaRPr lang="en-US" sz="1000" b="1" kern="1200" dirty="0">
+              <a:solidFill>
+                <a:schemeClr val="tx2"/>
+              </a:solidFill>
+              <a:latin typeface="Courier New" panose="02070309020205020404" pitchFamily="49" charset="0"/>
+              <a:cs typeface="Courier New" panose="02070309020205020404" pitchFamily="49" charset="0"/>
+            </a:endParaRPr>
+          </a:p>
+        </p:txBody>
+      </p:sp>
+      <p:sp>
+        <p:nvSpPr>
+          <p:cNvPr id="25" name="TextBox 24">
+            <a:extLst>
+              <a:ext uri="{FF2B5EF4-FFF2-40B4-BE49-F238E27FC236}">
+                <a16:creationId xmlns:a16="http://schemas.microsoft.com/office/drawing/2014/main" id="{AEE0BC72-5746-E17C-0D41-9B7DEFEBDD96}"/>
+              </a:ext>
+            </a:extLst>
+          </p:cNvPr>
+          <p:cNvSpPr txBox="1"/>
+          <p:nvPr/>
+        </p:nvSpPr>
+        <p:spPr>
+          <a:xfrm>
+            <a:off x="2031311" y="4930601"/>
+            <a:ext cx="1572422" cy="142347"/>
+          </a:xfrm>
+          <a:prstGeom prst="rect">
+            <a:avLst/>
+          </a:prstGeom>
+          <a:noFill/>
+        </p:spPr>
+        <p:txBody>
+          <a:bodyPr wrap="square" lIns="0" tIns="0" rIns="0" bIns="0" rtlCol="0">
+            <a:spAutoFit/>
+          </a:bodyPr>
+          <a:lstStyle/>
+          <a:p>
+            <a:pPr marL="0" indent="0" algn="l" defTabSz="914400" rtl="0" eaLnBrk="1" latinLnBrk="0" hangingPunct="1">
+              <a:lnSpc>
+                <a:spcPct val="90000"/>
+              </a:lnSpc>
+              <a:spcBef>
+                <a:spcPts val="0"/>
+              </a:spcBef>
+              <a:spcAft>
+                <a:spcPts val="600"/>
+              </a:spcAft>
+              <a:buFont typeface="Arial" panose="020B0604020202020204" pitchFamily="34" charset="0"/>
+              <a:buNone/>
+            </a:pPr>
+            <a:r>
+              <a:rPr lang="en-US" sz="1000" b="1" dirty="0">
+                <a:solidFill>
+                  <a:schemeClr val="tx2"/>
+                </a:solidFill>
+                <a:latin typeface="Courier New" panose="02070309020205020404" pitchFamily="49" charset="0"/>
+                <a:cs typeface="Courier New" panose="02070309020205020404" pitchFamily="49" charset="0"/>
+              </a:rPr>
+              <a:t>SCinput.0+LabelB.sds</a:t>
+            </a:r>
+            <a:endParaRPr lang="en-US" sz="1000" b="1" kern="1200" dirty="0">
+              <a:solidFill>
+                <a:schemeClr val="tx2"/>
+              </a:solidFill>
+              <a:latin typeface="Courier New" panose="02070309020205020404" pitchFamily="49" charset="0"/>
+              <a:cs typeface="Courier New" panose="02070309020205020404" pitchFamily="49" charset="0"/>
+            </a:endParaRPr>
+          </a:p>
+        </p:txBody>
+      </p:sp>
+      <p:sp>
+        <p:nvSpPr>
+          <p:cNvPr id="27" name="TextBox 26">
+            <a:extLst>
+              <a:ext uri="{FF2B5EF4-FFF2-40B4-BE49-F238E27FC236}">
+                <a16:creationId xmlns:a16="http://schemas.microsoft.com/office/drawing/2014/main" id="{328A0765-0423-838E-2BB8-764205998CD4}"/>
+              </a:ext>
+            </a:extLst>
+          </p:cNvPr>
+          <p:cNvSpPr txBox="1"/>
+          <p:nvPr/>
+        </p:nvSpPr>
+        <p:spPr>
+          <a:xfrm>
+            <a:off x="4523578" y="2373884"/>
+            <a:ext cx="1572422" cy="142347"/>
+          </a:xfrm>
+          <a:prstGeom prst="rect">
+            <a:avLst/>
+          </a:prstGeom>
+          <a:noFill/>
+        </p:spPr>
+        <p:txBody>
+          <a:bodyPr wrap="square" lIns="0" tIns="0" rIns="0" bIns="0" rtlCol="0">
+            <a:spAutoFit/>
+          </a:bodyPr>
+          <a:lstStyle/>
+          <a:p>
+            <a:pPr marL="0" indent="0" algn="l" defTabSz="914400" rtl="0" eaLnBrk="1" latinLnBrk="0" hangingPunct="1">
+              <a:lnSpc>
+                <a:spcPct val="90000"/>
+              </a:lnSpc>
+              <a:spcBef>
+                <a:spcPts val="0"/>
+              </a:spcBef>
+              <a:spcAft>
+                <a:spcPts val="600"/>
+              </a:spcAft>
+              <a:buFont typeface="Arial" panose="020B0604020202020204" pitchFamily="34" charset="0"/>
+              <a:buNone/>
+            </a:pPr>
+            <a:r>
+              <a:rPr lang="en-US" sz="1000" b="1" dirty="0" err="1">
+                <a:solidFill>
+                  <a:schemeClr val="tx2"/>
+                </a:solidFill>
+                <a:latin typeface="Courier New" panose="02070309020205020404" pitchFamily="49" charset="0"/>
+                <a:cs typeface="Courier New" panose="02070309020205020404" pitchFamily="49" charset="0"/>
+              </a:rPr>
+              <a:t>sdsio.yml</a:t>
+            </a:r>
+            <a:endParaRPr lang="en-US" sz="1000" b="1" kern="1200" dirty="0">
+              <a:solidFill>
+                <a:schemeClr val="tx2"/>
+              </a:solidFill>
+              <a:latin typeface="Courier New" panose="02070309020205020404" pitchFamily="49" charset="0"/>
+              <a:cs typeface="Courier New" panose="02070309020205020404" pitchFamily="49" charset="0"/>
+            </a:endParaRPr>
+          </a:p>
+        </p:txBody>
+      </p:sp>
+      <p:sp>
+        <p:nvSpPr>
+          <p:cNvPr id="28" name="TextBox 27">
+            <a:extLst>
+              <a:ext uri="{FF2B5EF4-FFF2-40B4-BE49-F238E27FC236}">
+                <a16:creationId xmlns:a16="http://schemas.microsoft.com/office/drawing/2014/main" id="{CEC9E031-ABF2-D557-56FE-BCBD9F7B362A}"/>
+              </a:ext>
+            </a:extLst>
+          </p:cNvPr>
+          <p:cNvSpPr txBox="1"/>
+          <p:nvPr/>
+        </p:nvSpPr>
+        <p:spPr>
+          <a:xfrm>
+            <a:off x="4523578" y="2649447"/>
+            <a:ext cx="7188996" cy="2991588"/>
+          </a:xfrm>
+          <a:prstGeom prst="rect">
+            <a:avLst/>
+          </a:prstGeom>
+          <a:noFill/>
+        </p:spPr>
+        <p:txBody>
+          <a:bodyPr wrap="square" lIns="0" tIns="0" rIns="0" bIns="0" rtlCol="0">
+            <a:spAutoFit/>
+          </a:bodyPr>
+          <a:lstStyle/>
+          <a:p>
+            <a:r>
+              <a:rPr lang="en-US" sz="1200" dirty="0" err="1">
+                <a:latin typeface="Courier New" panose="02070309020205020404" pitchFamily="49" charset="0"/>
+                <a:cs typeface="Courier New" panose="02070309020205020404" pitchFamily="49" charset="0"/>
+              </a:rPr>
+              <a:t>dir</a:t>
+            </a:r>
+            <a:r>
+              <a:rPr lang="en-US" sz="1200" dirty="0">
+                <a:latin typeface="Courier New" panose="02070309020205020404" pitchFamily="49" charset="0"/>
+                <a:cs typeface="Courier New" panose="02070309020205020404" pitchFamily="49" charset="0"/>
+              </a:rPr>
+              <a:t>: &lt;name&gt;             # directory that stores SDS files</a:t>
+            </a:r>
+          </a:p>
+          <a:p>
+            <a:r>
+              <a:rPr lang="en-US" sz="1200" dirty="0" err="1">
+                <a:latin typeface="Courier New" panose="02070309020205020404" pitchFamily="49" charset="0"/>
+                <a:cs typeface="Courier New" panose="02070309020205020404" pitchFamily="49" charset="0"/>
+              </a:rPr>
+              <a:t>idx</a:t>
+            </a:r>
+            <a:r>
+              <a:rPr lang="en-US" sz="1200" dirty="0">
+                <a:latin typeface="Courier New" panose="02070309020205020404" pitchFamily="49" charset="0"/>
+                <a:cs typeface="Courier New" panose="02070309020205020404" pitchFamily="49" charset="0"/>
+              </a:rPr>
+              <a:t>-list:</a:t>
+            </a:r>
+          </a:p>
+          <a:p>
+            <a:r>
+              <a:rPr lang="en-US" sz="1200" dirty="0">
+                <a:latin typeface="Courier New" panose="02070309020205020404" pitchFamily="49" charset="0"/>
+                <a:cs typeface="Courier New" panose="02070309020205020404" pitchFamily="49" charset="0"/>
+              </a:rPr>
+              <a:t>  - Scinput.0+LabelA.sds</a:t>
+            </a:r>
+          </a:p>
+          <a:p>
+            <a:r>
+              <a:rPr lang="en-US" sz="1200" dirty="0">
+                <a:latin typeface="Courier New" panose="02070309020205020404" pitchFamily="49" charset="0"/>
+                <a:cs typeface="Courier New" panose="02070309020205020404" pitchFamily="49" charset="0"/>
+              </a:rPr>
+              <a:t>  - Scinput.0+LabelB.sds</a:t>
+            </a:r>
+          </a:p>
+          <a:p>
+            <a:endParaRPr lang="en-US" sz="1200" dirty="0">
+              <a:latin typeface="Courier New" panose="02070309020205020404" pitchFamily="49" charset="0"/>
+              <a:cs typeface="Courier New" panose="02070309020205020404" pitchFamily="49" charset="0"/>
+            </a:endParaRPr>
+          </a:p>
+          <a:p>
+            <a:r>
+              <a:rPr lang="en-US" sz="1200" dirty="0">
+                <a:latin typeface="Courier New" panose="02070309020205020404" pitchFamily="49" charset="0"/>
+                <a:cs typeface="Courier New" panose="02070309020205020404" pitchFamily="49" charset="0"/>
+              </a:rPr>
+              <a:t>streams:</a:t>
+            </a:r>
+          </a:p>
+          <a:p>
+            <a:r>
+              <a:rPr lang="en-US" sz="1200" dirty="0">
+                <a:latin typeface="Courier New" panose="02070309020205020404" pitchFamily="49" charset="0"/>
+                <a:cs typeface="Courier New" panose="02070309020205020404" pitchFamily="49" charset="0"/>
+              </a:rPr>
+              <a:t>  - stream: &lt;name0&gt;        # stream name used in </a:t>
+            </a:r>
+            <a:r>
+              <a:rPr lang="en-US" sz="1200" dirty="0" err="1">
+                <a:latin typeface="Courier New" panose="02070309020205020404" pitchFamily="49" charset="0"/>
+                <a:cs typeface="Courier New" panose="02070309020205020404" pitchFamily="49" charset="0"/>
+              </a:rPr>
+              <a:t>sdsPlayOpen</a:t>
+            </a:r>
+            <a:r>
+              <a:rPr lang="en-US" sz="1200" dirty="0">
+                <a:latin typeface="Courier New" panose="02070309020205020404" pitchFamily="49" charset="0"/>
+                <a:cs typeface="Courier New" panose="02070309020205020404" pitchFamily="49" charset="0"/>
+              </a:rPr>
+              <a:t>, </a:t>
+            </a:r>
+            <a:r>
+              <a:rPr lang="en-US" sz="1200" dirty="0" err="1">
+                <a:latin typeface="Courier New" panose="02070309020205020404" pitchFamily="49" charset="0"/>
+                <a:cs typeface="Courier New" panose="02070309020205020404" pitchFamily="49" charset="0"/>
+              </a:rPr>
+              <a:t>sdsRecOpen</a:t>
+            </a:r>
+            <a:endParaRPr lang="en-US" sz="1200" dirty="0">
+              <a:latin typeface="Courier New" panose="02070309020205020404" pitchFamily="49" charset="0"/>
+              <a:cs typeface="Courier New" panose="02070309020205020404" pitchFamily="49" charset="0"/>
+            </a:endParaRPr>
+          </a:p>
+          <a:p>
+            <a:r>
+              <a:rPr lang="en-US" sz="1200" dirty="0">
+                <a:latin typeface="Courier New" panose="02070309020205020404" pitchFamily="49" charset="0"/>
+                <a:cs typeface="Courier New" panose="02070309020205020404" pitchFamily="49" charset="0"/>
+              </a:rPr>
+              <a:t>    </a:t>
+            </a:r>
+            <a:r>
+              <a:rPr lang="en-US" sz="1200" dirty="0" err="1">
+                <a:latin typeface="Courier New" panose="02070309020205020404" pitchFamily="49" charset="0"/>
+                <a:cs typeface="Courier New" panose="02070309020205020404" pitchFamily="49" charset="0"/>
+              </a:rPr>
+              <a:t>basefile</a:t>
+            </a:r>
+            <a:r>
+              <a:rPr lang="en-US" sz="1200" dirty="0">
+                <a:latin typeface="Courier New" panose="02070309020205020404" pitchFamily="49" charset="0"/>
+                <a:cs typeface="Courier New" panose="02070309020205020404" pitchFamily="49" charset="0"/>
+              </a:rPr>
+              <a:t>: &lt;name0&gt;      # alternative base file name for this stream (default is stream name)</a:t>
+            </a:r>
+          </a:p>
+          <a:p>
+            <a:r>
+              <a:rPr lang="en-US" sz="1200" dirty="0">
+                <a:latin typeface="Courier New" panose="02070309020205020404" pitchFamily="49" charset="0"/>
+                <a:cs typeface="Courier New" panose="02070309020205020404" pitchFamily="49" charset="0"/>
+              </a:rPr>
+              <a:t>    </a:t>
+            </a:r>
+            <a:r>
+              <a:rPr lang="en-US" sz="1200" dirty="0" err="1">
+                <a:latin typeface="Courier New" panose="02070309020205020404" pitchFamily="49" charset="0"/>
+                <a:cs typeface="Courier New" panose="02070309020205020404" pitchFamily="49" charset="0"/>
+              </a:rPr>
+              <a:t>dir</a:t>
+            </a:r>
+            <a:r>
+              <a:rPr lang="en-US" sz="1200" dirty="0">
+                <a:latin typeface="Courier New" panose="02070309020205020404" pitchFamily="49" charset="0"/>
+                <a:cs typeface="Courier New" panose="02070309020205020404" pitchFamily="49" charset="0"/>
+              </a:rPr>
+              <a:t>: &lt;name0&gt;              # alternative working directory for this stream (default is </a:t>
+            </a:r>
+            <a:r>
+              <a:rPr lang="en-US" sz="1200" dirty="0" err="1">
+                <a:latin typeface="Courier New" panose="02070309020205020404" pitchFamily="49" charset="0"/>
+                <a:cs typeface="Courier New" panose="02070309020205020404" pitchFamily="49" charset="0"/>
+              </a:rPr>
+              <a:t>workdir</a:t>
+            </a:r>
+            <a:r>
+              <a:rPr lang="en-US" sz="1200" dirty="0">
+                <a:latin typeface="Courier New" panose="02070309020205020404" pitchFamily="49" charset="0"/>
+                <a:cs typeface="Courier New" panose="02070309020205020404" pitchFamily="49" charset="0"/>
+              </a:rPr>
+              <a:t>)</a:t>
+            </a:r>
+          </a:p>
+          <a:p>
+            <a:endParaRPr lang="en-US" sz="1200" dirty="0">
+              <a:latin typeface="Courier New" panose="02070309020205020404" pitchFamily="49" charset="0"/>
+              <a:cs typeface="Courier New" panose="02070309020205020404" pitchFamily="49" charset="0"/>
+            </a:endParaRPr>
+          </a:p>
+          <a:p>
+            <a:r>
+              <a:rPr lang="en-US" sz="1200" dirty="0">
+                <a:latin typeface="Courier New" panose="02070309020205020404" pitchFamily="49" charset="0"/>
+                <a:cs typeface="Courier New" panose="02070309020205020404" pitchFamily="49" charset="0"/>
+              </a:rPr>
+              <a:t>  - stream: &lt;name1&gt;</a:t>
+            </a:r>
+          </a:p>
+          <a:p>
+            <a:r>
+              <a:rPr lang="en-US" sz="1200" dirty="0">
+                <a:latin typeface="Courier New" panose="02070309020205020404" pitchFamily="49" charset="0"/>
+                <a:cs typeface="Courier New" panose="02070309020205020404" pitchFamily="49" charset="0"/>
+              </a:rPr>
+              <a:t>    </a:t>
+            </a:r>
+            <a:r>
+              <a:rPr lang="en-US" sz="1200" dirty="0" err="1">
+                <a:latin typeface="Courier New" panose="02070309020205020404" pitchFamily="49" charset="0"/>
+                <a:cs typeface="Courier New" panose="02070309020205020404" pitchFamily="49" charset="0"/>
+              </a:rPr>
+              <a:t>basefile</a:t>
+            </a:r>
+            <a:r>
+              <a:rPr lang="en-US" sz="1200" dirty="0">
+                <a:latin typeface="Courier New" panose="02070309020205020404" pitchFamily="49" charset="0"/>
+                <a:cs typeface="Courier New" panose="02070309020205020404" pitchFamily="49" charset="0"/>
+              </a:rPr>
+              <a:t>: &lt;name1&gt;</a:t>
+            </a:r>
+          </a:p>
+          <a:p>
+            <a:r>
+              <a:rPr lang="en-US" sz="1200" dirty="0">
+                <a:latin typeface="Courier New" panose="02070309020205020404" pitchFamily="49" charset="0"/>
+                <a:cs typeface="Courier New" panose="02070309020205020404" pitchFamily="49" charset="0"/>
+              </a:rPr>
+              <a:t>    </a:t>
+            </a:r>
+            <a:r>
+              <a:rPr lang="en-US" sz="1200" dirty="0" err="1">
+                <a:latin typeface="Courier New" panose="02070309020205020404" pitchFamily="49" charset="0"/>
+                <a:cs typeface="Courier New" panose="02070309020205020404" pitchFamily="49" charset="0"/>
+              </a:rPr>
+              <a:t>dir</a:t>
+            </a:r>
+            <a:r>
+              <a:rPr lang="en-US" sz="1200" dirty="0">
+                <a:latin typeface="Courier New" panose="02070309020205020404" pitchFamily="49" charset="0"/>
+                <a:cs typeface="Courier New" panose="02070309020205020404" pitchFamily="49" charset="0"/>
+              </a:rPr>
+              <a:t>: &lt;name1&gt;</a:t>
+            </a:r>
+          </a:p>
+          <a:p>
+            <a:pPr marL="0" indent="0" algn="l" defTabSz="914400" rtl="0" eaLnBrk="1" latinLnBrk="0" hangingPunct="1">
+              <a:lnSpc>
+                <a:spcPct val="90000"/>
+              </a:lnSpc>
+              <a:spcBef>
+                <a:spcPts val="0"/>
+              </a:spcBef>
+              <a:spcAft>
+                <a:spcPts val="600"/>
+              </a:spcAft>
+              <a:buFont typeface="Arial" panose="020B0604020202020204" pitchFamily="34" charset="0"/>
+              <a:buNone/>
+            </a:pPr>
+            <a:endParaRPr lang="en-US" sz="1600" kern="1200" dirty="0" err="1">
+              <a:solidFill>
+                <a:schemeClr val="tx2"/>
+              </a:solidFill>
+              <a:latin typeface="+mn-lt"/>
+              <a:ea typeface="+mn-ea"/>
+              <a:cs typeface="+mn-cs"/>
+            </a:endParaRPr>
+          </a:p>
+        </p:txBody>
+      </p:sp>
+    </p:spTree>
+    <p:extLst>
+      <p:ext uri="{BB962C8B-B14F-4D97-AF65-F5344CB8AC3E}">
+        <p14:creationId xmlns:p14="http://schemas.microsoft.com/office/powerpoint/2010/main" val="603356367"/>
+      </p:ext>
+    </p:extLst>
+  </p:cSld>
+  <p:clrMapOvr>
+    <a:masterClrMapping/>
+  </p:clrMapOvr>
+</p:sld>
+</file>
+
+<file path=ppt/slides/slide8.xml><?xml version="1.0" encoding="utf-8"?>
+<p:sld xmlns:a="http://schemas.openxmlformats.org/drawingml/2006/main" xmlns:r="http://schemas.openxmlformats.org/officeDocument/2006/relationships" xmlns:p="http://schemas.openxmlformats.org/presentationml/2006/main">
+  <p:cSld>
+    <p:spTree>
+      <p:nvGrpSpPr>
+        <p:cNvPr id="1" name=""/>
+        <p:cNvGrpSpPr/>
+        <p:nvPr/>
+      </p:nvGrpSpPr>
+      <p:grpSpPr>
+        <a:xfrm>
+          <a:off x="0" y="0"/>
+          <a:ext cx="0" cy="0"/>
+          <a:chOff x="0" y="0"/>
+          <a:chExt cx="0" cy="0"/>
+        </a:xfrm>
+      </p:grpSpPr>
+      <p:sp>
+        <p:nvSpPr>
           <p:cNvPr id="34" name="Rectangle 33">
             <a:extLst>
               <a:ext uri="{FF2B5EF4-FFF2-40B4-BE49-F238E27FC236}">
@@ -52645,7 +55463,7 @@
 </p:sld>
 </file>
 
-<file path=ppt/slides/slide8.xml><?xml version="1.0" encoding="utf-8"?>
+<file path=ppt/slides/slide9.xml><?xml version="1.0" encoding="utf-8"?>
 <p:sld xmlns:a="http://schemas.openxmlformats.org/drawingml/2006/main" xmlns:r="http://schemas.openxmlformats.org/officeDocument/2006/relationships" xmlns:p="http://schemas.openxmlformats.org/presentationml/2006/main">
   <p:cSld>
     <p:spTree>
@@ -53747,893 +56565,6 @@
     <p:extLst>
       <p:ext uri="{BB962C8B-B14F-4D97-AF65-F5344CB8AC3E}">
         <p14:creationId xmlns:p14="http://schemas.microsoft.com/office/powerpoint/2010/main" val="1850966349"/>
-      </p:ext>
-    </p:extLst>
-  </p:cSld>
-  <p:clrMapOvr>
-    <a:masterClrMapping/>
-  </p:clrMapOvr>
-</p:sld>
-</file>
-
-<file path=ppt/slides/slide9.xml><?xml version="1.0" encoding="utf-8"?>
-<p:sld xmlns:a="http://schemas.openxmlformats.org/drawingml/2006/main" xmlns:r="http://schemas.openxmlformats.org/officeDocument/2006/relationships" xmlns:p="http://schemas.openxmlformats.org/presentationml/2006/main">
-  <p:cSld>
-    <p:spTree>
-      <p:nvGrpSpPr>
-        <p:cNvPr id="1" name=""/>
-        <p:cNvGrpSpPr/>
-        <p:nvPr/>
-      </p:nvGrpSpPr>
-      <p:grpSpPr>
-        <a:xfrm>
-          <a:off x="0" y="0"/>
-          <a:ext cx="0" cy="0"/>
-          <a:chOff x="0" y="0"/>
-          <a:chExt cx="0" cy="0"/>
-        </a:xfrm>
-      </p:grpSpPr>
-      <p:sp>
-        <p:nvSpPr>
-          <p:cNvPr id="2" name="Title 1">
-            <a:extLst>
-              <a:ext uri="{FF2B5EF4-FFF2-40B4-BE49-F238E27FC236}">
-                <a16:creationId xmlns:a16="http://schemas.microsoft.com/office/drawing/2014/main" id="{BFBCA5D4-C7CF-56B7-4D26-1D3745C85A28}"/>
-              </a:ext>
-            </a:extLst>
-          </p:cNvPr>
-          <p:cNvSpPr>
-            <a:spLocks noGrp="1"/>
-          </p:cNvSpPr>
-          <p:nvPr>
-            <p:ph type="title"/>
-          </p:nvPr>
-        </p:nvSpPr>
-        <p:spPr/>
-        <p:txBody>
-          <a:bodyPr/>
-          <a:lstStyle/>
-          <a:p>
-            <a:r>
-              <a:rPr lang="en-US"/>
-              <a:t>SDS Recorder </a:t>
-            </a:r>
-            <a:r>
-              <a:rPr lang="en-US">
-                <a:hlinkClick r:id="rId2"/>
-              </a:rPr>
-              <a:t>https://github.com/Arm-Examples/sds-examples</a:t>
-            </a:r>
-            <a:br>
-              <a:rPr lang="en-US"/>
-            </a:br>
-            <a:endParaRPr lang="en-US"/>
-          </a:p>
-        </p:txBody>
-      </p:sp>
-      <p:sp>
-        <p:nvSpPr>
-          <p:cNvPr id="4" name="Rectangle 3">
-            <a:extLst>
-              <a:ext uri="{FF2B5EF4-FFF2-40B4-BE49-F238E27FC236}">
-                <a16:creationId xmlns:a16="http://schemas.microsoft.com/office/drawing/2014/main" id="{268F30E4-EF9A-1A51-E8F1-2E8F1385FA61}"/>
-              </a:ext>
-            </a:extLst>
-          </p:cNvPr>
-          <p:cNvSpPr/>
-          <p:nvPr/>
-        </p:nvSpPr>
-        <p:spPr>
-          <a:xfrm>
-            <a:off x="627993" y="1411454"/>
-            <a:ext cx="4452085" cy="653684"/>
-          </a:xfrm>
-          <a:prstGeom prst="rect">
-            <a:avLst/>
-          </a:prstGeom>
-          <a:solidFill>
-            <a:schemeClr val="accent6">
-              <a:lumMod val="75000"/>
-            </a:schemeClr>
-          </a:solidFill>
-          <a:ln>
-            <a:noFill/>
-          </a:ln>
-        </p:spPr>
-        <p:style>
-          <a:lnRef idx="2">
-            <a:schemeClr val="accent1">
-              <a:shade val="50000"/>
-            </a:schemeClr>
-          </a:lnRef>
-          <a:fillRef idx="1">
-            <a:schemeClr val="accent1"/>
-          </a:fillRef>
-          <a:effectRef idx="0">
-            <a:schemeClr val="accent1"/>
-          </a:effectRef>
-          <a:fontRef idx="minor">
-            <a:schemeClr val="lt1"/>
-          </a:fontRef>
-        </p:style>
-        <p:txBody>
-          <a:bodyPr rtlCol="0" anchor="ctr"/>
-          <a:lstStyle/>
-          <a:p>
-            <a:pPr algn="ctr"/>
-            <a:r>
-              <a:rPr lang="en-US" sz="1600" b="1" dirty="0" err="1"/>
-              <a:t>SDS.csolution.yml</a:t>
-            </a:r>
-            <a:br>
-              <a:rPr lang="en-US" sz="1400" dirty="0"/>
-            </a:br>
-            <a:r>
-              <a:rPr lang="en-US" sz="1400" dirty="0"/>
-              <a:t>Data streaming test framework for DSP and </a:t>
-            </a:r>
-            <a:r>
-              <a:rPr lang="en-US" sz="1400"/>
-              <a:t>ML algorithms</a:t>
-            </a:r>
-            <a:endParaRPr lang="en-US" sz="1100" dirty="0"/>
-          </a:p>
-        </p:txBody>
-      </p:sp>
-      <p:sp>
-        <p:nvSpPr>
-          <p:cNvPr id="8" name="Rectangle 7">
-            <a:extLst>
-              <a:ext uri="{FF2B5EF4-FFF2-40B4-BE49-F238E27FC236}">
-                <a16:creationId xmlns:a16="http://schemas.microsoft.com/office/drawing/2014/main" id="{CE3974E6-B40A-AB0A-DFDB-B964F9612AEA}"/>
-              </a:ext>
-            </a:extLst>
-          </p:cNvPr>
-          <p:cNvSpPr/>
-          <p:nvPr/>
-        </p:nvSpPr>
-        <p:spPr>
-          <a:xfrm>
-            <a:off x="2942715" y="3519273"/>
-            <a:ext cx="2128632" cy="653684"/>
-          </a:xfrm>
-          <a:prstGeom prst="rect">
-            <a:avLst/>
-          </a:prstGeom>
-          <a:solidFill>
-            <a:schemeClr val="accent1"/>
-          </a:solidFill>
-          <a:ln>
-            <a:noFill/>
-          </a:ln>
-        </p:spPr>
-        <p:style>
-          <a:lnRef idx="2">
-            <a:schemeClr val="accent1">
-              <a:shade val="50000"/>
-            </a:schemeClr>
-          </a:lnRef>
-          <a:fillRef idx="1">
-            <a:schemeClr val="accent1"/>
-          </a:fillRef>
-          <a:effectRef idx="0">
-            <a:schemeClr val="accent1"/>
-          </a:effectRef>
-          <a:fontRef idx="minor">
-            <a:schemeClr val="lt1"/>
-          </a:fontRef>
-        </p:style>
-        <p:txBody>
-          <a:bodyPr rtlCol="0" anchor="ctr"/>
-          <a:lstStyle/>
-          <a:p>
-            <a:pPr algn="ctr"/>
-            <a:r>
-              <a:rPr lang="en-US" sz="1100" dirty="0"/>
-              <a:t>Record/Playback </a:t>
-            </a:r>
-            <a:br>
-              <a:rPr lang="en-US" sz="1100" dirty="0"/>
-            </a:br>
-            <a:r>
-              <a:rPr lang="en-US" sz="1100" dirty="0"/>
-              <a:t>SDS Data Files via</a:t>
-            </a:r>
-            <a:br>
-              <a:rPr lang="en-US" sz="1100" dirty="0"/>
-            </a:br>
-            <a:r>
-              <a:rPr lang="en-US" sz="1100" dirty="0"/>
-              <a:t>Network, USB, File System</a:t>
-            </a:r>
-            <a:endParaRPr lang="en-US" sz="1050" dirty="0"/>
-          </a:p>
-        </p:txBody>
-      </p:sp>
-      <p:sp>
-        <p:nvSpPr>
-          <p:cNvPr id="10" name="Rectangle 9">
-            <a:extLst>
-              <a:ext uri="{FF2B5EF4-FFF2-40B4-BE49-F238E27FC236}">
-                <a16:creationId xmlns:a16="http://schemas.microsoft.com/office/drawing/2014/main" id="{CEE742C1-9B27-441A-6C29-20D13149B32F}"/>
-              </a:ext>
-            </a:extLst>
-          </p:cNvPr>
-          <p:cNvSpPr/>
-          <p:nvPr/>
-        </p:nvSpPr>
-        <p:spPr>
-          <a:xfrm>
-            <a:off x="2942715" y="3255090"/>
-            <a:ext cx="2128632" cy="264183"/>
-          </a:xfrm>
-          <a:prstGeom prst="rect">
-            <a:avLst/>
-          </a:prstGeom>
-          <a:solidFill>
-            <a:schemeClr val="accent1">
-              <a:lumMod val="75000"/>
-            </a:schemeClr>
-          </a:solidFill>
-          <a:ln>
-            <a:noFill/>
-          </a:ln>
-        </p:spPr>
-        <p:style>
-          <a:lnRef idx="2">
-            <a:schemeClr val="accent1">
-              <a:shade val="50000"/>
-            </a:schemeClr>
-          </a:lnRef>
-          <a:fillRef idx="1">
-            <a:schemeClr val="accent1"/>
-          </a:fillRef>
-          <a:effectRef idx="0">
-            <a:schemeClr val="accent1"/>
-          </a:effectRef>
-          <a:fontRef idx="minor">
-            <a:schemeClr val="lt1"/>
-          </a:fontRef>
-        </p:style>
-        <p:txBody>
-          <a:bodyPr rtlCol="0" anchor="ctr"/>
-          <a:lstStyle/>
-          <a:p>
-            <a:pPr algn="ctr"/>
-            <a:r>
-              <a:rPr lang="en-US" sz="1400" dirty="0"/>
-              <a:t> Layer Type: SDSIO</a:t>
-            </a:r>
-          </a:p>
-        </p:txBody>
-      </p:sp>
-      <p:sp>
-        <p:nvSpPr>
-          <p:cNvPr id="16" name="Rectangle 15">
-            <a:extLst>
-              <a:ext uri="{FF2B5EF4-FFF2-40B4-BE49-F238E27FC236}">
-                <a16:creationId xmlns:a16="http://schemas.microsoft.com/office/drawing/2014/main" id="{8C61B6A3-A1BE-4248-57B1-609E5F0E8AAB}"/>
-              </a:ext>
-            </a:extLst>
-          </p:cNvPr>
-          <p:cNvSpPr/>
-          <p:nvPr/>
-        </p:nvSpPr>
-        <p:spPr>
-          <a:xfrm>
-            <a:off x="627994" y="3519273"/>
-            <a:ext cx="2128632" cy="653684"/>
-          </a:xfrm>
-          <a:prstGeom prst="rect">
-            <a:avLst/>
-          </a:prstGeom>
-          <a:solidFill>
-            <a:schemeClr val="accent1"/>
-          </a:solidFill>
-          <a:ln>
-            <a:noFill/>
-          </a:ln>
-        </p:spPr>
-        <p:style>
-          <a:lnRef idx="2">
-            <a:schemeClr val="accent1">
-              <a:shade val="50000"/>
-            </a:schemeClr>
-          </a:lnRef>
-          <a:fillRef idx="1">
-            <a:schemeClr val="accent1"/>
-          </a:fillRef>
-          <a:effectRef idx="0">
-            <a:schemeClr val="accent1"/>
-          </a:effectRef>
-          <a:fontRef idx="minor">
-            <a:schemeClr val="lt1"/>
-          </a:fontRef>
-        </p:style>
-        <p:txBody>
-          <a:bodyPr rtlCol="0" anchor="ctr"/>
-          <a:lstStyle/>
-          <a:p>
-            <a:pPr algn="ctr"/>
-            <a:r>
-              <a:rPr lang="en-US" sz="1100" dirty="0"/>
-              <a:t>Board Hardware Interface</a:t>
-            </a:r>
-            <a:br>
-              <a:rPr lang="en-US" sz="1100" dirty="0"/>
-            </a:br>
-            <a:r>
-              <a:rPr lang="en-US" sz="1100" dirty="0"/>
-              <a:t>Provided in BSP</a:t>
-            </a:r>
-            <a:endParaRPr lang="en-US" sz="1050" dirty="0"/>
-          </a:p>
-        </p:txBody>
-      </p:sp>
-      <p:sp>
-        <p:nvSpPr>
-          <p:cNvPr id="17" name="Rectangle 16">
-            <a:extLst>
-              <a:ext uri="{FF2B5EF4-FFF2-40B4-BE49-F238E27FC236}">
-                <a16:creationId xmlns:a16="http://schemas.microsoft.com/office/drawing/2014/main" id="{4DB6B1BC-4815-896E-9392-B226B5A4C231}"/>
-              </a:ext>
-            </a:extLst>
-          </p:cNvPr>
-          <p:cNvSpPr/>
-          <p:nvPr/>
-        </p:nvSpPr>
-        <p:spPr>
-          <a:xfrm>
-            <a:off x="627994" y="3255090"/>
-            <a:ext cx="2128632" cy="264183"/>
-          </a:xfrm>
-          <a:prstGeom prst="rect">
-            <a:avLst/>
-          </a:prstGeom>
-          <a:solidFill>
-            <a:schemeClr val="accent1">
-              <a:lumMod val="75000"/>
-            </a:schemeClr>
-          </a:solidFill>
-          <a:ln>
-            <a:noFill/>
-          </a:ln>
-        </p:spPr>
-        <p:style>
-          <a:lnRef idx="2">
-            <a:schemeClr val="accent1">
-              <a:shade val="50000"/>
-            </a:schemeClr>
-          </a:lnRef>
-          <a:fillRef idx="1">
-            <a:schemeClr val="accent1"/>
-          </a:fillRef>
-          <a:effectRef idx="0">
-            <a:schemeClr val="accent1"/>
-          </a:effectRef>
-          <a:fontRef idx="minor">
-            <a:schemeClr val="lt1"/>
-          </a:fontRef>
-        </p:style>
-        <p:txBody>
-          <a:bodyPr rtlCol="0" anchor="ctr"/>
-          <a:lstStyle/>
-          <a:p>
-            <a:pPr algn="ctr"/>
-            <a:r>
-              <a:rPr lang="en-US" sz="1400" dirty="0"/>
-              <a:t> Layer Type: Board</a:t>
-            </a:r>
-          </a:p>
-        </p:txBody>
-      </p:sp>
-      <p:sp>
-        <p:nvSpPr>
-          <p:cNvPr id="3" name="Rectangle 2">
-            <a:extLst>
-              <a:ext uri="{FF2B5EF4-FFF2-40B4-BE49-F238E27FC236}">
-                <a16:creationId xmlns:a16="http://schemas.microsoft.com/office/drawing/2014/main" id="{981466B6-29ED-CB94-AF4F-BC970DB65D25}"/>
-              </a:ext>
-            </a:extLst>
-          </p:cNvPr>
-          <p:cNvSpPr/>
-          <p:nvPr/>
-        </p:nvSpPr>
-        <p:spPr>
-          <a:xfrm>
-            <a:off x="627994" y="2460256"/>
-            <a:ext cx="2128632" cy="653684"/>
-          </a:xfrm>
-          <a:prstGeom prst="rect">
-            <a:avLst/>
-          </a:prstGeom>
-          <a:solidFill>
-            <a:schemeClr val="accent4">
-              <a:lumMod val="75000"/>
-            </a:schemeClr>
-          </a:solidFill>
-          <a:ln>
-            <a:noFill/>
-          </a:ln>
-        </p:spPr>
-        <p:style>
-          <a:lnRef idx="2">
-            <a:schemeClr val="accent1">
-              <a:shade val="50000"/>
-            </a:schemeClr>
-          </a:lnRef>
-          <a:fillRef idx="1">
-            <a:schemeClr val="accent1"/>
-          </a:fillRef>
-          <a:effectRef idx="0">
-            <a:schemeClr val="accent1"/>
-          </a:effectRef>
-          <a:fontRef idx="minor">
-            <a:schemeClr val="lt1"/>
-          </a:fontRef>
-        </p:style>
-        <p:txBody>
-          <a:bodyPr rtlCol="0" anchor="ctr"/>
-          <a:lstStyle/>
-          <a:p>
-            <a:pPr algn="ctr"/>
-            <a:r>
-              <a:rPr lang="en-US" sz="1100" dirty="0"/>
-              <a:t>Check SDSIO interface with</a:t>
-            </a:r>
-            <a:br>
-              <a:rPr lang="en-US" sz="1100" dirty="0"/>
-            </a:br>
-            <a:r>
-              <a:rPr lang="en-US" sz="1100" dirty="0"/>
-              <a:t>user configurable bandwidth parameters</a:t>
-            </a:r>
-            <a:endParaRPr lang="en-US" sz="1050" dirty="0"/>
-          </a:p>
-        </p:txBody>
-      </p:sp>
-      <p:sp>
-        <p:nvSpPr>
-          <p:cNvPr id="5" name="Rectangle 4">
-            <a:extLst>
-              <a:ext uri="{FF2B5EF4-FFF2-40B4-BE49-F238E27FC236}">
-                <a16:creationId xmlns:a16="http://schemas.microsoft.com/office/drawing/2014/main" id="{006CFF1E-7F8E-879E-76E9-6194FE53B86C}"/>
-              </a:ext>
-            </a:extLst>
-          </p:cNvPr>
-          <p:cNvSpPr/>
-          <p:nvPr/>
-        </p:nvSpPr>
-        <p:spPr>
-          <a:xfrm>
-            <a:off x="627994" y="2196073"/>
-            <a:ext cx="2128632" cy="264183"/>
-          </a:xfrm>
-          <a:prstGeom prst="rect">
-            <a:avLst/>
-          </a:prstGeom>
-          <a:solidFill>
-            <a:schemeClr val="accent4">
-              <a:lumMod val="50000"/>
-            </a:schemeClr>
-          </a:solidFill>
-          <a:ln>
-            <a:noFill/>
-          </a:ln>
-        </p:spPr>
-        <p:style>
-          <a:lnRef idx="2">
-            <a:schemeClr val="accent1">
-              <a:shade val="50000"/>
-            </a:schemeClr>
-          </a:lnRef>
-          <a:fillRef idx="1">
-            <a:schemeClr val="accent1"/>
-          </a:fillRef>
-          <a:effectRef idx="0">
-            <a:schemeClr val="accent1"/>
-          </a:effectRef>
-          <a:fontRef idx="minor">
-            <a:schemeClr val="lt1"/>
-          </a:fontRef>
-        </p:style>
-        <p:txBody>
-          <a:bodyPr rtlCol="0" anchor="ctr"/>
-          <a:lstStyle/>
-          <a:p>
-            <a:pPr algn="ctr"/>
-            <a:r>
-              <a:rPr lang="en-US" sz="1400" dirty="0" err="1"/>
-              <a:t>DataTest.cproject.yml</a:t>
-            </a:r>
-            <a:endParaRPr lang="en-US" sz="1400" dirty="0"/>
-          </a:p>
-        </p:txBody>
-      </p:sp>
-      <p:sp>
-        <p:nvSpPr>
-          <p:cNvPr id="6" name="Rectangle 5">
-            <a:extLst>
-              <a:ext uri="{FF2B5EF4-FFF2-40B4-BE49-F238E27FC236}">
-                <a16:creationId xmlns:a16="http://schemas.microsoft.com/office/drawing/2014/main" id="{E094A49A-EC2D-EEEF-132A-B6D2A8111BED}"/>
-              </a:ext>
-            </a:extLst>
-          </p:cNvPr>
-          <p:cNvSpPr/>
-          <p:nvPr/>
-        </p:nvSpPr>
-        <p:spPr>
-          <a:xfrm>
-            <a:off x="2942715" y="2460256"/>
-            <a:ext cx="2128632" cy="653684"/>
-          </a:xfrm>
-          <a:prstGeom prst="rect">
-            <a:avLst/>
-          </a:prstGeom>
-          <a:solidFill>
-            <a:schemeClr val="accent4">
-              <a:lumMod val="75000"/>
-            </a:schemeClr>
-          </a:solidFill>
-          <a:ln>
-            <a:noFill/>
-          </a:ln>
-        </p:spPr>
-        <p:style>
-          <a:lnRef idx="2">
-            <a:schemeClr val="accent1">
-              <a:shade val="50000"/>
-            </a:schemeClr>
-          </a:lnRef>
-          <a:fillRef idx="1">
-            <a:schemeClr val="accent1"/>
-          </a:fillRef>
-          <a:effectRef idx="0">
-            <a:schemeClr val="accent1"/>
-          </a:effectRef>
-          <a:fontRef idx="minor">
-            <a:schemeClr val="lt1"/>
-          </a:fontRef>
-        </p:style>
-        <p:txBody>
-          <a:bodyPr rtlCol="0" anchor="ctr"/>
-          <a:lstStyle/>
-          <a:p>
-            <a:pPr algn="ctr"/>
-            <a:r>
-              <a:rPr lang="en-US" sz="1100" dirty="0"/>
-              <a:t>Verify and optimized</a:t>
-            </a:r>
-            <a:br>
-              <a:rPr lang="en-US" sz="1100" dirty="0"/>
-            </a:br>
-            <a:r>
-              <a:rPr lang="en-US" sz="1100" dirty="0"/>
-              <a:t>user algorithms</a:t>
-            </a:r>
-            <a:br>
-              <a:rPr lang="en-US" sz="1100" dirty="0"/>
-            </a:br>
-            <a:r>
-              <a:rPr lang="en-US" sz="1100" dirty="0"/>
-              <a:t>with repeatable data</a:t>
-            </a:r>
-            <a:endParaRPr lang="en-US" sz="1050" dirty="0"/>
-          </a:p>
-        </p:txBody>
-      </p:sp>
-      <p:sp>
-        <p:nvSpPr>
-          <p:cNvPr id="7" name="Rectangle 6">
-            <a:extLst>
-              <a:ext uri="{FF2B5EF4-FFF2-40B4-BE49-F238E27FC236}">
-                <a16:creationId xmlns:a16="http://schemas.microsoft.com/office/drawing/2014/main" id="{02192468-F815-85E7-1987-BD05F8475585}"/>
-              </a:ext>
-            </a:extLst>
-          </p:cNvPr>
-          <p:cNvSpPr/>
-          <p:nvPr/>
-        </p:nvSpPr>
-        <p:spPr>
-          <a:xfrm>
-            <a:off x="2942715" y="2196073"/>
-            <a:ext cx="2128632" cy="264183"/>
-          </a:xfrm>
-          <a:prstGeom prst="rect">
-            <a:avLst/>
-          </a:prstGeom>
-          <a:solidFill>
-            <a:schemeClr val="accent4">
-              <a:lumMod val="50000"/>
-            </a:schemeClr>
-          </a:solidFill>
-          <a:ln>
-            <a:noFill/>
-          </a:ln>
-        </p:spPr>
-        <p:style>
-          <a:lnRef idx="2">
-            <a:schemeClr val="accent1">
-              <a:shade val="50000"/>
-            </a:schemeClr>
-          </a:lnRef>
-          <a:fillRef idx="1">
-            <a:schemeClr val="accent1"/>
-          </a:fillRef>
-          <a:effectRef idx="0">
-            <a:schemeClr val="accent1"/>
-          </a:effectRef>
-          <a:fontRef idx="minor">
-            <a:schemeClr val="lt1"/>
-          </a:fontRef>
-        </p:style>
-        <p:txBody>
-          <a:bodyPr rtlCol="0" anchor="ctr"/>
-          <a:lstStyle/>
-          <a:p>
-            <a:pPr algn="ctr"/>
-            <a:r>
-              <a:rPr lang="en-US" sz="1400" dirty="0" err="1"/>
-              <a:t>AlgorithmTest.cproject.yml</a:t>
-            </a:r>
-            <a:endParaRPr lang="en-US" sz="1400" dirty="0"/>
-          </a:p>
-        </p:txBody>
-      </p:sp>
-      <p:sp>
-        <p:nvSpPr>
-          <p:cNvPr id="20" name="Callout: Bent Line with Accent Bar 19">
-            <a:extLst>
-              <a:ext uri="{FF2B5EF4-FFF2-40B4-BE49-F238E27FC236}">
-                <a16:creationId xmlns:a16="http://schemas.microsoft.com/office/drawing/2014/main" id="{D1617B0D-C16A-73DF-D7EA-A87528EA450C}"/>
-              </a:ext>
-            </a:extLst>
-          </p:cNvPr>
-          <p:cNvSpPr/>
-          <p:nvPr/>
-        </p:nvSpPr>
-        <p:spPr>
-          <a:xfrm>
-            <a:off x="5492884" y="1431972"/>
-            <a:ext cx="1498060" cy="612648"/>
-          </a:xfrm>
-          <a:prstGeom prst="accentCallout2">
-            <a:avLst>
-              <a:gd name="adj1" fmla="val 18750"/>
-              <a:gd name="adj2" fmla="val -8333"/>
-              <a:gd name="adj3" fmla="val 18750"/>
-              <a:gd name="adj4" fmla="val -16667"/>
-              <a:gd name="adj5" fmla="val 60632"/>
-              <a:gd name="adj6" fmla="val -32482"/>
-            </a:avLst>
-          </a:prstGeom>
-          <a:noFill/>
-          <a:ln>
-            <a:solidFill>
-              <a:srgbClr val="C00000"/>
-            </a:solidFill>
-          </a:ln>
-        </p:spPr>
-        <p:style>
-          <a:lnRef idx="2">
-            <a:schemeClr val="accent1">
-              <a:shade val="50000"/>
-            </a:schemeClr>
-          </a:lnRef>
-          <a:fillRef idx="1">
-            <a:schemeClr val="accent1"/>
-          </a:fillRef>
-          <a:effectRef idx="0">
-            <a:schemeClr val="accent1"/>
-          </a:effectRef>
-          <a:fontRef idx="minor">
-            <a:schemeClr val="lt1"/>
-          </a:fontRef>
-        </p:style>
-        <p:txBody>
-          <a:bodyPr lIns="0" tIns="0" rIns="0" bIns="0" rtlCol="0" anchor="t"/>
-          <a:lstStyle/>
-          <a:p>
-            <a:r>
-              <a:rPr lang="en-US" sz="1200" dirty="0">
-                <a:solidFill>
-                  <a:schemeClr val="tx1"/>
-                </a:solidFill>
-              </a:rPr>
-              <a:t>target-types select between hardware</a:t>
-            </a:r>
-          </a:p>
-          <a:p>
-            <a:r>
-              <a:rPr lang="en-US" sz="1200" dirty="0">
-                <a:solidFill>
-                  <a:schemeClr val="tx1"/>
-                </a:solidFill>
-              </a:rPr>
-              <a:t>and simulation </a:t>
-            </a:r>
-          </a:p>
-        </p:txBody>
-      </p:sp>
-      <p:sp>
-        <p:nvSpPr>
-          <p:cNvPr id="21" name="Callout: Bent Line with Accent Bar 20">
-            <a:extLst>
-              <a:ext uri="{FF2B5EF4-FFF2-40B4-BE49-F238E27FC236}">
-                <a16:creationId xmlns:a16="http://schemas.microsoft.com/office/drawing/2014/main" id="{DCAC335D-914C-08BE-625E-F7D62ED092E1}"/>
-              </a:ext>
-            </a:extLst>
-          </p:cNvPr>
-          <p:cNvSpPr/>
-          <p:nvPr/>
-        </p:nvSpPr>
-        <p:spPr>
-          <a:xfrm>
-            <a:off x="5492884" y="2343531"/>
-            <a:ext cx="1498060" cy="612648"/>
-          </a:xfrm>
-          <a:prstGeom prst="accentCallout2">
-            <a:avLst>
-              <a:gd name="adj1" fmla="val 18750"/>
-              <a:gd name="adj2" fmla="val -8333"/>
-              <a:gd name="adj3" fmla="val 18750"/>
-              <a:gd name="adj4" fmla="val -16667"/>
-              <a:gd name="adj5" fmla="val 60632"/>
-              <a:gd name="adj6" fmla="val -32482"/>
-            </a:avLst>
-          </a:prstGeom>
-          <a:noFill/>
-          <a:ln>
-            <a:solidFill>
-              <a:srgbClr val="C00000"/>
-            </a:solidFill>
-          </a:ln>
-        </p:spPr>
-        <p:style>
-          <a:lnRef idx="2">
-            <a:schemeClr val="accent1">
-              <a:shade val="50000"/>
-            </a:schemeClr>
-          </a:lnRef>
-          <a:fillRef idx="1">
-            <a:schemeClr val="accent1"/>
-          </a:fillRef>
-          <a:effectRef idx="0">
-            <a:schemeClr val="accent1"/>
-          </a:effectRef>
-          <a:fontRef idx="minor">
-            <a:schemeClr val="lt1"/>
-          </a:fontRef>
-        </p:style>
-        <p:txBody>
-          <a:bodyPr lIns="0" tIns="0" rIns="0" bIns="0" rtlCol="0" anchor="t"/>
-          <a:lstStyle/>
-          <a:p>
-            <a:r>
-              <a:rPr lang="en-US" sz="1200" dirty="0">
-                <a:solidFill>
-                  <a:schemeClr val="tx1"/>
-                </a:solidFill>
-              </a:rPr>
-              <a:t>Add user algorithm</a:t>
-            </a:r>
-            <a:br>
-              <a:rPr lang="en-US" sz="1200" dirty="0">
-                <a:solidFill>
-                  <a:schemeClr val="tx1"/>
-                </a:solidFill>
-              </a:rPr>
-            </a:br>
-            <a:r>
-              <a:rPr lang="en-US" sz="1200" dirty="0">
-                <a:solidFill>
-                  <a:schemeClr val="tx1"/>
-                </a:solidFill>
-              </a:rPr>
-              <a:t>and data stream</a:t>
-            </a:r>
-            <a:br>
-              <a:rPr lang="en-US" sz="1200" dirty="0">
-                <a:solidFill>
-                  <a:schemeClr val="tx1"/>
-                </a:solidFill>
-              </a:rPr>
-            </a:br>
-            <a:r>
-              <a:rPr lang="en-US" sz="1200" dirty="0">
-                <a:solidFill>
-                  <a:schemeClr val="tx1"/>
-                </a:solidFill>
-              </a:rPr>
-              <a:t>input interface</a:t>
-            </a:r>
-          </a:p>
-        </p:txBody>
-      </p:sp>
-      <p:sp>
-        <p:nvSpPr>
-          <p:cNvPr id="22" name="Callout: Bent Line with Accent Bar 21">
-            <a:extLst>
-              <a:ext uri="{FF2B5EF4-FFF2-40B4-BE49-F238E27FC236}">
-                <a16:creationId xmlns:a16="http://schemas.microsoft.com/office/drawing/2014/main" id="{688DADD3-DBC8-96B6-7CE2-9CCEB7866880}"/>
-              </a:ext>
-            </a:extLst>
-          </p:cNvPr>
-          <p:cNvSpPr/>
-          <p:nvPr/>
-        </p:nvSpPr>
-        <p:spPr>
-          <a:xfrm>
-            <a:off x="5492884" y="3419606"/>
-            <a:ext cx="1498060" cy="612648"/>
-          </a:xfrm>
-          <a:prstGeom prst="accentCallout2">
-            <a:avLst>
-              <a:gd name="adj1" fmla="val 18750"/>
-              <a:gd name="adj2" fmla="val -8333"/>
-              <a:gd name="adj3" fmla="val 18750"/>
-              <a:gd name="adj4" fmla="val -16667"/>
-              <a:gd name="adj5" fmla="val 60632"/>
-              <a:gd name="adj6" fmla="val -32482"/>
-            </a:avLst>
-          </a:prstGeom>
-          <a:noFill/>
-          <a:ln>
-            <a:solidFill>
-              <a:srgbClr val="C00000"/>
-            </a:solidFill>
-          </a:ln>
-        </p:spPr>
-        <p:style>
-          <a:lnRef idx="2">
-            <a:schemeClr val="accent1">
-              <a:shade val="50000"/>
-            </a:schemeClr>
-          </a:lnRef>
-          <a:fillRef idx="1">
-            <a:schemeClr val="accent1"/>
-          </a:fillRef>
-          <a:effectRef idx="0">
-            <a:schemeClr val="accent1"/>
-          </a:effectRef>
-          <a:fontRef idx="minor">
-            <a:schemeClr val="lt1"/>
-          </a:fontRef>
-        </p:style>
-        <p:txBody>
-          <a:bodyPr lIns="0" tIns="0" rIns="0" bIns="0" rtlCol="0" anchor="t"/>
-          <a:lstStyle/>
-          <a:p>
-            <a:r>
-              <a:rPr lang="en-US" sz="1200" dirty="0">
-                <a:solidFill>
-                  <a:schemeClr val="tx1"/>
-                </a:solidFill>
-              </a:rPr>
-              <a:t>build-types select between recording</a:t>
-            </a:r>
-            <a:br>
-              <a:rPr lang="en-US" sz="1200" dirty="0">
-                <a:solidFill>
-                  <a:schemeClr val="tx1"/>
-                </a:solidFill>
-              </a:rPr>
-            </a:br>
-            <a:r>
-              <a:rPr lang="en-US" sz="1200" dirty="0">
-                <a:solidFill>
-                  <a:schemeClr val="tx1"/>
-                </a:solidFill>
-              </a:rPr>
-              <a:t>and playback</a:t>
-            </a:r>
-          </a:p>
-        </p:txBody>
-      </p:sp>
-    </p:spTree>
-    <p:extLst>
-      <p:ext uri="{BB962C8B-B14F-4D97-AF65-F5344CB8AC3E}">
-        <p14:creationId xmlns:p14="http://schemas.microsoft.com/office/powerpoint/2010/main" val="2612990511"/>
       </p:ext>
     </p:extLst>
   </p:cSld>

</xml_diff>